<commit_message>
Updating the excel spread sheet and testing out new ways to plot the heatmaps
</commit_message>
<xml_diff>
--- a/K4S_key_scripts/K4S_DA_Aims/K4S_DA_A2/K4S_DA_A2_HM_Day_Plot.pptx
+++ b/K4S_key_scripts/K4S_DA_Aims/K4S_DA_A2/K4S_DA_A2_HM_Day_Plot.pptx
@@ -5,12 +5,21 @@
     <p:sldMasterId id="2147483648" r:id="rId1"/>
   </p:sldMasterIdLst>
   <p:notesMasterIdLst>
-    <p:notesMasterId r:id="rId5"/>
+    <p:notesMasterId r:id="rId14"/>
   </p:notesMasterIdLst>
   <p:sldIdLst>
     <p:sldId id="256" r:id="rId2"/>
     <p:sldId id="257" r:id="rId3"/>
     <p:sldId id="258" r:id="rId4"/>
+    <p:sldId id="259" r:id="rId5"/>
+    <p:sldId id="260" r:id="rId6"/>
+    <p:sldId id="261" r:id="rId7"/>
+    <p:sldId id="264" r:id="rId8"/>
+    <p:sldId id="263" r:id="rId9"/>
+    <p:sldId id="265" r:id="rId10"/>
+    <p:sldId id="266" r:id="rId11"/>
+    <p:sldId id="267" r:id="rId12"/>
+    <p:sldId id="268" r:id="rId13"/>
   </p:sldIdLst>
   <p:sldSz cx="12192000" cy="6858000"/>
   <p:notesSz cx="6858000" cy="9144000"/>
@@ -199,7 +208,7 @@
           <a:p>
             <a:fld id="{110C6599-B3B8-8842-AE19-99341E40C7FB}" type="datetimeFigureOut">
               <a:rPr lang="en-US" smtClean="0"/>
-              <a:t>8/2/24</a:t>
+              <a:t>8/14/24</a:t>
             </a:fld>
             <a:endParaRPr lang="en-US"/>
           </a:p>
@@ -784,7 +793,7 @@
           <a:p>
             <a:fld id="{E1A8E377-B974-3D4F-A478-7E3B21C33EA7}" type="datetimeFigureOut">
               <a:rPr lang="en-US" smtClean="0"/>
-              <a:t>8/2/24</a:t>
+              <a:t>8/14/24</a:t>
             </a:fld>
             <a:endParaRPr lang="en-US"/>
           </a:p>
@@ -984,7 +993,7 @@
           <a:p>
             <a:fld id="{E1A8E377-B974-3D4F-A478-7E3B21C33EA7}" type="datetimeFigureOut">
               <a:rPr lang="en-US" smtClean="0"/>
-              <a:t>8/2/24</a:t>
+              <a:t>8/14/24</a:t>
             </a:fld>
             <a:endParaRPr lang="en-US"/>
           </a:p>
@@ -1194,7 +1203,7 @@
           <a:p>
             <a:fld id="{E1A8E377-B974-3D4F-A478-7E3B21C33EA7}" type="datetimeFigureOut">
               <a:rPr lang="en-US" smtClean="0"/>
-              <a:t>8/2/24</a:t>
+              <a:t>8/14/24</a:t>
             </a:fld>
             <a:endParaRPr lang="en-US"/>
           </a:p>
@@ -1394,7 +1403,7 @@
           <a:p>
             <a:fld id="{E1A8E377-B974-3D4F-A478-7E3B21C33EA7}" type="datetimeFigureOut">
               <a:rPr lang="en-US" smtClean="0"/>
-              <a:t>8/2/24</a:t>
+              <a:t>8/14/24</a:t>
             </a:fld>
             <a:endParaRPr lang="en-US"/>
           </a:p>
@@ -1670,7 +1679,7 @@
           <a:p>
             <a:fld id="{E1A8E377-B974-3D4F-A478-7E3B21C33EA7}" type="datetimeFigureOut">
               <a:rPr lang="en-US" smtClean="0"/>
-              <a:t>8/2/24</a:t>
+              <a:t>8/14/24</a:t>
             </a:fld>
             <a:endParaRPr lang="en-US"/>
           </a:p>
@@ -1938,7 +1947,7 @@
           <a:p>
             <a:fld id="{E1A8E377-B974-3D4F-A478-7E3B21C33EA7}" type="datetimeFigureOut">
               <a:rPr lang="en-US" smtClean="0"/>
-              <a:t>8/2/24</a:t>
+              <a:t>8/14/24</a:t>
             </a:fld>
             <a:endParaRPr lang="en-US"/>
           </a:p>
@@ -2353,7 +2362,7 @@
           <a:p>
             <a:fld id="{E1A8E377-B974-3D4F-A478-7E3B21C33EA7}" type="datetimeFigureOut">
               <a:rPr lang="en-US" smtClean="0"/>
-              <a:t>8/2/24</a:t>
+              <a:t>8/14/24</a:t>
             </a:fld>
             <a:endParaRPr lang="en-US"/>
           </a:p>
@@ -2495,7 +2504,7 @@
           <a:p>
             <a:fld id="{E1A8E377-B974-3D4F-A478-7E3B21C33EA7}" type="datetimeFigureOut">
               <a:rPr lang="en-US" smtClean="0"/>
-              <a:t>8/2/24</a:t>
+              <a:t>8/14/24</a:t>
             </a:fld>
             <a:endParaRPr lang="en-US"/>
           </a:p>
@@ -2608,7 +2617,7 @@
           <a:p>
             <a:fld id="{E1A8E377-B974-3D4F-A478-7E3B21C33EA7}" type="datetimeFigureOut">
               <a:rPr lang="en-US" smtClean="0"/>
-              <a:t>8/2/24</a:t>
+              <a:t>8/14/24</a:t>
             </a:fld>
             <a:endParaRPr lang="en-US"/>
           </a:p>
@@ -2921,7 +2930,7 @@
           <a:p>
             <a:fld id="{E1A8E377-B974-3D4F-A478-7E3B21C33EA7}" type="datetimeFigureOut">
               <a:rPr lang="en-US" smtClean="0"/>
-              <a:t>8/2/24</a:t>
+              <a:t>8/14/24</a:t>
             </a:fld>
             <a:endParaRPr lang="en-US"/>
           </a:p>
@@ -3210,7 +3219,7 @@
           <a:p>
             <a:fld id="{E1A8E377-B974-3D4F-A478-7E3B21C33EA7}" type="datetimeFigureOut">
               <a:rPr lang="en-US" smtClean="0"/>
-              <a:t>8/2/24</a:t>
+              <a:t>8/14/24</a:t>
             </a:fld>
             <a:endParaRPr lang="en-US"/>
           </a:p>
@@ -3453,7 +3462,7 @@
           <a:p>
             <a:fld id="{E1A8E377-B974-3D4F-A478-7E3B21C33EA7}" type="datetimeFigureOut">
               <a:rPr lang="en-US" smtClean="0"/>
-              <a:t>8/2/24</a:t>
+              <a:t>8/14/24</a:t>
             </a:fld>
             <a:endParaRPr lang="en-US"/>
           </a:p>
@@ -4439,6 +4448,813 @@
 </p:sld>
 </file>
 
+<file path=ppt/slides/slide10.xml><?xml version="1.0" encoding="utf-8"?>
+<p:sld xmlns:a="http://schemas.openxmlformats.org/drawingml/2006/main" xmlns:r="http://schemas.openxmlformats.org/officeDocument/2006/relationships" xmlns:p="http://schemas.openxmlformats.org/presentationml/2006/main">
+  <p:cSld>
+    <p:spTree>
+      <p:nvGrpSpPr>
+        <p:cNvPr id="1" name=""/>
+        <p:cNvGrpSpPr/>
+        <p:nvPr/>
+      </p:nvGrpSpPr>
+      <p:grpSpPr>
+        <a:xfrm>
+          <a:off x="0" y="0"/>
+          <a:ext cx="0" cy="0"/>
+          <a:chOff x="0" y="0"/>
+          <a:chExt cx="0" cy="0"/>
+        </a:xfrm>
+      </p:grpSpPr>
+      <p:pic>
+        <p:nvPicPr>
+          <p:cNvPr id="4" name="Picture 3">
+            <a:extLst>
+              <a:ext uri="{FF2B5EF4-FFF2-40B4-BE49-F238E27FC236}">
+                <a16:creationId xmlns:a16="http://schemas.microsoft.com/office/drawing/2014/main" id="{3E29D6A6-D834-9BA7-1C59-79E2074C7C61}"/>
+              </a:ext>
+            </a:extLst>
+          </p:cNvPr>
+          <p:cNvPicPr>
+            <a:picLocks noChangeAspect="1"/>
+          </p:cNvPicPr>
+          <p:nvPr/>
+        </p:nvPicPr>
+        <p:blipFill>
+          <a:blip r:embed="rId2"/>
+          <a:srcRect t="8748" b="16505"/>
+          <a:stretch/>
+        </p:blipFill>
+        <p:spPr>
+          <a:xfrm>
+            <a:off x="661398" y="1658471"/>
+            <a:ext cx="9557816" cy="4491318"/>
+          </a:xfrm>
+          <a:prstGeom prst="rect">
+            <a:avLst/>
+          </a:prstGeom>
+        </p:spPr>
+      </p:pic>
+      <p:pic>
+        <p:nvPicPr>
+          <p:cNvPr id="12" name="Graphic 11" descr="Sunset scene with solid fill">
+            <a:extLst>
+              <a:ext uri="{FF2B5EF4-FFF2-40B4-BE49-F238E27FC236}">
+                <a16:creationId xmlns:a16="http://schemas.microsoft.com/office/drawing/2014/main" id="{20FCA15A-7F5F-E96C-DD08-EEC7F7848C2C}"/>
+              </a:ext>
+            </a:extLst>
+          </p:cNvPr>
+          <p:cNvPicPr>
+            <a:picLocks noChangeAspect="1"/>
+          </p:cNvPicPr>
+          <p:nvPr/>
+        </p:nvPicPr>
+        <p:blipFill>
+          <a:blip r:embed="rId3">
+            <a:extLst>
+              <a:ext uri="{96DAC541-7B7A-43D3-8B79-37D633B846F1}">
+                <asvg:svgBlip xmlns:asvg="http://schemas.microsoft.com/office/drawing/2016/SVG/main" r:embed="rId4"/>
+              </a:ext>
+            </a:extLst>
+          </a:blip>
+          <a:stretch>
+            <a:fillRect/>
+          </a:stretch>
+        </p:blipFill>
+        <p:spPr>
+          <a:xfrm>
+            <a:off x="1844852" y="1225723"/>
+            <a:ext cx="576000" cy="576000"/>
+          </a:xfrm>
+          <a:prstGeom prst="rect">
+            <a:avLst/>
+          </a:prstGeom>
+        </p:spPr>
+      </p:pic>
+      <p:pic>
+        <p:nvPicPr>
+          <p:cNvPr id="15" name="Graphic 14" descr="Dim (Smaller Sun) with solid fill">
+            <a:extLst>
+              <a:ext uri="{FF2B5EF4-FFF2-40B4-BE49-F238E27FC236}">
+                <a16:creationId xmlns:a16="http://schemas.microsoft.com/office/drawing/2014/main" id="{25CB26C9-2361-2B99-3842-7080309F5609}"/>
+              </a:ext>
+            </a:extLst>
+          </p:cNvPr>
+          <p:cNvPicPr>
+            <a:picLocks noChangeAspect="1"/>
+          </p:cNvPicPr>
+          <p:nvPr/>
+        </p:nvPicPr>
+        <p:blipFill>
+          <a:blip r:embed="rId5">
+            <a:extLst>
+              <a:ext uri="{96DAC541-7B7A-43D3-8B79-37D633B846F1}">
+                <asvg:svgBlip xmlns:asvg="http://schemas.microsoft.com/office/drawing/2016/SVG/main" r:embed="rId6"/>
+              </a:ext>
+            </a:extLst>
+          </a:blip>
+          <a:stretch>
+            <a:fillRect/>
+          </a:stretch>
+        </p:blipFill>
+        <p:spPr>
+          <a:xfrm>
+            <a:off x="3949654" y="1239667"/>
+            <a:ext cx="684000" cy="548111"/>
+          </a:xfrm>
+          <a:prstGeom prst="rect">
+            <a:avLst/>
+          </a:prstGeom>
+        </p:spPr>
+      </p:pic>
+      <p:pic>
+        <p:nvPicPr>
+          <p:cNvPr id="16" name="Graphic 15" descr="Moon with solid fill">
+            <a:extLst>
+              <a:ext uri="{FF2B5EF4-FFF2-40B4-BE49-F238E27FC236}">
+                <a16:creationId xmlns:a16="http://schemas.microsoft.com/office/drawing/2014/main" id="{1CF5ED38-48B1-97E6-6163-293297603AE3}"/>
+              </a:ext>
+            </a:extLst>
+          </p:cNvPr>
+          <p:cNvPicPr>
+            <a:picLocks noChangeAspect="1"/>
+          </p:cNvPicPr>
+          <p:nvPr/>
+        </p:nvPicPr>
+        <p:blipFill>
+          <a:blip r:embed="rId7">
+            <a:extLst>
+              <a:ext uri="{96DAC541-7B7A-43D3-8B79-37D633B846F1}">
+                <asvg:svgBlip xmlns:asvg="http://schemas.microsoft.com/office/drawing/2016/SVG/main" r:embed="rId8"/>
+              </a:ext>
+            </a:extLst>
+          </a:blip>
+          <a:stretch>
+            <a:fillRect/>
+          </a:stretch>
+        </p:blipFill>
+        <p:spPr>
+          <a:xfrm>
+            <a:off x="7900347" y="1294393"/>
+            <a:ext cx="468000" cy="468000"/>
+          </a:xfrm>
+          <a:prstGeom prst="rect">
+            <a:avLst/>
+          </a:prstGeom>
+        </p:spPr>
+      </p:pic>
+    </p:spTree>
+    <p:extLst>
+      <p:ext uri="{BB962C8B-B14F-4D97-AF65-F5344CB8AC3E}">
+        <p14:creationId xmlns:p14="http://schemas.microsoft.com/office/powerpoint/2010/main" val="2197444345"/>
+      </p:ext>
+    </p:extLst>
+  </p:cSld>
+  <p:clrMapOvr>
+    <a:masterClrMapping/>
+  </p:clrMapOvr>
+</p:sld>
+</file>
+
+<file path=ppt/slides/slide11.xml><?xml version="1.0" encoding="utf-8"?>
+<p:sld xmlns:a="http://schemas.openxmlformats.org/drawingml/2006/main" xmlns:r="http://schemas.openxmlformats.org/officeDocument/2006/relationships" xmlns:p="http://schemas.openxmlformats.org/presentationml/2006/main">
+  <p:cSld>
+    <p:spTree>
+      <p:nvGrpSpPr>
+        <p:cNvPr id="1" name=""/>
+        <p:cNvGrpSpPr/>
+        <p:nvPr/>
+      </p:nvGrpSpPr>
+      <p:grpSpPr>
+        <a:xfrm>
+          <a:off x="0" y="0"/>
+          <a:ext cx="0" cy="0"/>
+          <a:chOff x="0" y="0"/>
+          <a:chExt cx="0" cy="0"/>
+        </a:xfrm>
+      </p:grpSpPr>
+      <p:pic>
+        <p:nvPicPr>
+          <p:cNvPr id="4" name="Picture 3">
+            <a:extLst>
+              <a:ext uri="{FF2B5EF4-FFF2-40B4-BE49-F238E27FC236}">
+                <a16:creationId xmlns:a16="http://schemas.microsoft.com/office/drawing/2014/main" id="{454E9E57-5D97-E398-6092-B3B80EDD73EE}"/>
+              </a:ext>
+            </a:extLst>
+          </p:cNvPr>
+          <p:cNvPicPr>
+            <a:picLocks noChangeAspect="1"/>
+          </p:cNvPicPr>
+          <p:nvPr/>
+        </p:nvPicPr>
+        <p:blipFill>
+          <a:blip r:embed="rId2"/>
+          <a:srcRect t="8748" b="16505"/>
+          <a:stretch/>
+        </p:blipFill>
+        <p:spPr>
+          <a:xfrm>
+            <a:off x="700727" y="1275013"/>
+            <a:ext cx="9557816" cy="4491318"/>
+          </a:xfrm>
+          <a:prstGeom prst="rect">
+            <a:avLst/>
+          </a:prstGeom>
+        </p:spPr>
+      </p:pic>
+      <p:sp>
+        <p:nvSpPr>
+          <p:cNvPr id="5" name="Rectangle 4">
+            <a:extLst>
+              <a:ext uri="{FF2B5EF4-FFF2-40B4-BE49-F238E27FC236}">
+                <a16:creationId xmlns:a16="http://schemas.microsoft.com/office/drawing/2014/main" id="{D163560D-F360-73B0-E5C4-E72D64BB8A1E}"/>
+              </a:ext>
+            </a:extLst>
+          </p:cNvPr>
+          <p:cNvSpPr/>
+          <p:nvPr/>
+        </p:nvSpPr>
+        <p:spPr>
+          <a:xfrm flipH="1">
+            <a:off x="1704250" y="852690"/>
+            <a:ext cx="6767635" cy="422323"/>
+          </a:xfrm>
+          <a:prstGeom prst="rect">
+            <a:avLst/>
+          </a:prstGeom>
+          <a:gradFill flip="none" rotWithShape="1">
+            <a:gsLst>
+              <a:gs pos="2000">
+                <a:srgbClr val="978874"/>
+              </a:gs>
+              <a:gs pos="0">
+                <a:srgbClr val="150E22">
+                  <a:alpha val="78821"/>
+                </a:srgbClr>
+              </a:gs>
+              <a:gs pos="96000">
+                <a:srgbClr val="150E22">
+                  <a:alpha val="78821"/>
+                </a:srgbClr>
+              </a:gs>
+              <a:gs pos="87000">
+                <a:srgbClr val="FFEAB5"/>
+              </a:gs>
+              <a:gs pos="35000">
+                <a:srgbClr val="FFEAB5"/>
+              </a:gs>
+            </a:gsLst>
+            <a:lin ang="10800000" scaled="1"/>
+            <a:tileRect/>
+          </a:gradFill>
+          <a:ln>
+            <a:noFill/>
+          </a:ln>
+        </p:spPr>
+        <p:style>
+          <a:lnRef idx="2">
+            <a:schemeClr val="accent1">
+              <a:shade val="15000"/>
+            </a:schemeClr>
+          </a:lnRef>
+          <a:fillRef idx="1">
+            <a:schemeClr val="accent1"/>
+          </a:fillRef>
+          <a:effectRef idx="0">
+            <a:schemeClr val="accent1"/>
+          </a:effectRef>
+          <a:fontRef idx="minor">
+            <a:schemeClr val="lt1"/>
+          </a:fontRef>
+        </p:style>
+        <p:txBody>
+          <a:bodyPr rtlCol="0" anchor="ctr"/>
+          <a:lstStyle/>
+          <a:p>
+            <a:pPr algn="ctr"/>
+            <a:endParaRPr lang="en-US" dirty="0"/>
+          </a:p>
+        </p:txBody>
+      </p:sp>
+      <p:pic>
+        <p:nvPicPr>
+          <p:cNvPr id="6" name="Graphic 5" descr="Dim (Smaller Sun) with solid fill">
+            <a:extLst>
+              <a:ext uri="{FF2B5EF4-FFF2-40B4-BE49-F238E27FC236}">
+                <a16:creationId xmlns:a16="http://schemas.microsoft.com/office/drawing/2014/main" id="{CBC8C40C-2AC3-D227-995D-1D4F292BE590}"/>
+              </a:ext>
+            </a:extLst>
+          </p:cNvPr>
+          <p:cNvPicPr>
+            <a:picLocks noChangeAspect="1"/>
+          </p:cNvPicPr>
+          <p:nvPr/>
+        </p:nvPicPr>
+        <p:blipFill>
+          <a:blip r:embed="rId3">
+            <a:extLst>
+              <a:ext uri="{96DAC541-7B7A-43D3-8B79-37D633B846F1}">
+                <asvg:svgBlip xmlns:asvg="http://schemas.microsoft.com/office/drawing/2016/SVG/main" r:embed="rId4"/>
+              </a:ext>
+            </a:extLst>
+          </a:blip>
+          <a:stretch>
+            <a:fillRect/>
+          </a:stretch>
+        </p:blipFill>
+        <p:spPr>
+          <a:xfrm>
+            <a:off x="5068945" y="817613"/>
+            <a:ext cx="684000" cy="548111"/>
+          </a:xfrm>
+          <a:prstGeom prst="rect">
+            <a:avLst/>
+          </a:prstGeom>
+        </p:spPr>
+      </p:pic>
+      <p:cxnSp>
+        <p:nvCxnSpPr>
+          <p:cNvPr id="7" name="Straight Connector 6">
+            <a:extLst>
+              <a:ext uri="{FF2B5EF4-FFF2-40B4-BE49-F238E27FC236}">
+                <a16:creationId xmlns:a16="http://schemas.microsoft.com/office/drawing/2014/main" id="{940C85E2-C1F1-BDA4-0A43-EB31A8157EE9}"/>
+              </a:ext>
+            </a:extLst>
+          </p:cNvPr>
+          <p:cNvCxnSpPr>
+            <a:cxnSpLocks/>
+          </p:cNvCxnSpPr>
+          <p:nvPr/>
+        </p:nvCxnSpPr>
+        <p:spPr>
+          <a:xfrm>
+            <a:off x="3924840" y="852690"/>
+            <a:ext cx="0" cy="422324"/>
+          </a:xfrm>
+          <a:prstGeom prst="line">
+            <a:avLst/>
+          </a:prstGeom>
+        </p:spPr>
+        <p:style>
+          <a:lnRef idx="2">
+            <a:schemeClr val="dk1"/>
+          </a:lnRef>
+          <a:fillRef idx="0">
+            <a:schemeClr val="dk1"/>
+          </a:fillRef>
+          <a:effectRef idx="1">
+            <a:schemeClr val="dk1"/>
+          </a:effectRef>
+          <a:fontRef idx="minor">
+            <a:schemeClr val="tx1"/>
+          </a:fontRef>
+        </p:style>
+      </p:cxnSp>
+      <p:cxnSp>
+        <p:nvCxnSpPr>
+          <p:cNvPr id="8" name="Straight Connector 7">
+            <a:extLst>
+              <a:ext uri="{FF2B5EF4-FFF2-40B4-BE49-F238E27FC236}">
+                <a16:creationId xmlns:a16="http://schemas.microsoft.com/office/drawing/2014/main" id="{BB00DEC3-48D8-DAF9-3709-83670468F2B3}"/>
+              </a:ext>
+            </a:extLst>
+          </p:cNvPr>
+          <p:cNvCxnSpPr>
+            <a:cxnSpLocks/>
+          </p:cNvCxnSpPr>
+          <p:nvPr/>
+        </p:nvCxnSpPr>
+        <p:spPr>
+          <a:xfrm>
+            <a:off x="7521480" y="852690"/>
+            <a:ext cx="0" cy="422323"/>
+          </a:xfrm>
+          <a:prstGeom prst="line">
+            <a:avLst/>
+          </a:prstGeom>
+        </p:spPr>
+        <p:style>
+          <a:lnRef idx="2">
+            <a:schemeClr val="dk1"/>
+          </a:lnRef>
+          <a:fillRef idx="0">
+            <a:schemeClr val="dk1"/>
+          </a:fillRef>
+          <a:effectRef idx="1">
+            <a:schemeClr val="dk1"/>
+          </a:effectRef>
+          <a:fontRef idx="minor">
+            <a:schemeClr val="tx1"/>
+          </a:fontRef>
+        </p:style>
+      </p:cxnSp>
+      <p:pic>
+        <p:nvPicPr>
+          <p:cNvPr id="11" name="Graphic 10" descr="Moon with solid fill">
+            <a:extLst>
+              <a:ext uri="{FF2B5EF4-FFF2-40B4-BE49-F238E27FC236}">
+                <a16:creationId xmlns:a16="http://schemas.microsoft.com/office/drawing/2014/main" id="{BB3E6365-250D-6146-B3A9-551BCF6894A6}"/>
+              </a:ext>
+            </a:extLst>
+          </p:cNvPr>
+          <p:cNvPicPr>
+            <a:picLocks noChangeAspect="1"/>
+          </p:cNvPicPr>
+          <p:nvPr/>
+        </p:nvPicPr>
+        <p:blipFill>
+          <a:blip r:embed="rId5">
+            <a:extLst>
+              <a:ext uri="{96DAC541-7B7A-43D3-8B79-37D633B846F1}">
+                <asvg:svgBlip xmlns:asvg="http://schemas.microsoft.com/office/drawing/2016/SVG/main" r:embed="rId6"/>
+              </a:ext>
+            </a:extLst>
+          </a:blip>
+          <a:stretch>
+            <a:fillRect/>
+          </a:stretch>
+        </p:blipFill>
+        <p:spPr>
+          <a:xfrm>
+            <a:off x="7893749" y="857669"/>
+            <a:ext cx="468000" cy="468000"/>
+          </a:xfrm>
+          <a:prstGeom prst="rect">
+            <a:avLst/>
+          </a:prstGeom>
+        </p:spPr>
+      </p:pic>
+      <p:pic>
+        <p:nvPicPr>
+          <p:cNvPr id="14" name="Graphic 13" descr="Sunset scene with solid fill">
+            <a:extLst>
+              <a:ext uri="{FF2B5EF4-FFF2-40B4-BE49-F238E27FC236}">
+                <a16:creationId xmlns:a16="http://schemas.microsoft.com/office/drawing/2014/main" id="{0FF92E99-701C-1D65-BE44-549CA11A56D2}"/>
+              </a:ext>
+            </a:extLst>
+          </p:cNvPr>
+          <p:cNvPicPr>
+            <a:picLocks noChangeAspect="1"/>
+          </p:cNvPicPr>
+          <p:nvPr/>
+        </p:nvPicPr>
+        <p:blipFill>
+          <a:blip r:embed="rId7">
+            <a:extLst>
+              <a:ext uri="{96DAC541-7B7A-43D3-8B79-37D633B846F1}">
+                <asvg:svgBlip xmlns:asvg="http://schemas.microsoft.com/office/drawing/2016/SVG/main" r:embed="rId8"/>
+              </a:ext>
+            </a:extLst>
+          </a:blip>
+          <a:stretch>
+            <a:fillRect/>
+          </a:stretch>
+        </p:blipFill>
+        <p:spPr>
+          <a:xfrm>
+            <a:off x="2440357" y="752194"/>
+            <a:ext cx="625161" cy="625161"/>
+          </a:xfrm>
+          <a:prstGeom prst="rect">
+            <a:avLst/>
+          </a:prstGeom>
+        </p:spPr>
+      </p:pic>
+    </p:spTree>
+    <p:extLst>
+      <p:ext uri="{BB962C8B-B14F-4D97-AF65-F5344CB8AC3E}">
+        <p14:creationId xmlns:p14="http://schemas.microsoft.com/office/powerpoint/2010/main" val="1342571480"/>
+      </p:ext>
+    </p:extLst>
+  </p:cSld>
+  <p:clrMapOvr>
+    <a:masterClrMapping/>
+  </p:clrMapOvr>
+</p:sld>
+</file>
+
+<file path=ppt/slides/slide12.xml><?xml version="1.0" encoding="utf-8"?>
+<p:sld xmlns:a="http://schemas.openxmlformats.org/drawingml/2006/main" xmlns:r="http://schemas.openxmlformats.org/officeDocument/2006/relationships" xmlns:p="http://schemas.openxmlformats.org/presentationml/2006/main">
+  <p:cSld>
+    <p:spTree>
+      <p:nvGrpSpPr>
+        <p:cNvPr id="1" name=""/>
+        <p:cNvGrpSpPr/>
+        <p:nvPr/>
+      </p:nvGrpSpPr>
+      <p:grpSpPr>
+        <a:xfrm>
+          <a:off x="0" y="0"/>
+          <a:ext cx="0" cy="0"/>
+          <a:chOff x="0" y="0"/>
+          <a:chExt cx="0" cy="0"/>
+        </a:xfrm>
+      </p:grpSpPr>
+      <p:pic>
+        <p:nvPicPr>
+          <p:cNvPr id="4" name="Picture 3">
+            <a:extLst>
+              <a:ext uri="{FF2B5EF4-FFF2-40B4-BE49-F238E27FC236}">
+                <a16:creationId xmlns:a16="http://schemas.microsoft.com/office/drawing/2014/main" id="{454E9E57-5D97-E398-6092-B3B80EDD73EE}"/>
+              </a:ext>
+            </a:extLst>
+          </p:cNvPr>
+          <p:cNvPicPr>
+            <a:picLocks noChangeAspect="1"/>
+          </p:cNvPicPr>
+          <p:nvPr/>
+        </p:nvPicPr>
+        <p:blipFill>
+          <a:blip r:embed="rId2"/>
+          <a:srcRect t="8748" b="16505"/>
+          <a:stretch/>
+        </p:blipFill>
+        <p:spPr>
+          <a:xfrm>
+            <a:off x="700727" y="1275013"/>
+            <a:ext cx="9557816" cy="4491318"/>
+          </a:xfrm>
+          <a:prstGeom prst="rect">
+            <a:avLst/>
+          </a:prstGeom>
+        </p:spPr>
+      </p:pic>
+      <p:sp>
+        <p:nvSpPr>
+          <p:cNvPr id="5" name="Rectangle 4">
+            <a:extLst>
+              <a:ext uri="{FF2B5EF4-FFF2-40B4-BE49-F238E27FC236}">
+                <a16:creationId xmlns:a16="http://schemas.microsoft.com/office/drawing/2014/main" id="{D163560D-F360-73B0-E5C4-E72D64BB8A1E}"/>
+              </a:ext>
+            </a:extLst>
+          </p:cNvPr>
+          <p:cNvSpPr/>
+          <p:nvPr/>
+        </p:nvSpPr>
+        <p:spPr>
+          <a:xfrm flipH="1">
+            <a:off x="1704250" y="852690"/>
+            <a:ext cx="6767635" cy="422323"/>
+          </a:xfrm>
+          <a:prstGeom prst="rect">
+            <a:avLst/>
+          </a:prstGeom>
+          <a:gradFill flip="none" rotWithShape="1">
+            <a:gsLst>
+              <a:gs pos="1000">
+                <a:srgbClr val="606172"/>
+              </a:gs>
+              <a:gs pos="0">
+                <a:srgbClr val="150E22">
+                  <a:alpha val="78821"/>
+                </a:srgbClr>
+              </a:gs>
+              <a:gs pos="96000">
+                <a:srgbClr val="150E22">
+                  <a:alpha val="78821"/>
+                </a:srgbClr>
+              </a:gs>
+              <a:gs pos="85000">
+                <a:schemeClr val="tx2">
+                  <a:lumMod val="10000"/>
+                  <a:lumOff val="90000"/>
+                </a:schemeClr>
+              </a:gs>
+              <a:gs pos="35000">
+                <a:schemeClr val="tx2">
+                  <a:lumMod val="10000"/>
+                  <a:lumOff val="90000"/>
+                </a:schemeClr>
+              </a:gs>
+            </a:gsLst>
+            <a:lin ang="10800000" scaled="1"/>
+            <a:tileRect/>
+          </a:gradFill>
+          <a:ln>
+            <a:noFill/>
+          </a:ln>
+        </p:spPr>
+        <p:style>
+          <a:lnRef idx="2">
+            <a:schemeClr val="accent1">
+              <a:shade val="15000"/>
+            </a:schemeClr>
+          </a:lnRef>
+          <a:fillRef idx="1">
+            <a:schemeClr val="accent1"/>
+          </a:fillRef>
+          <a:effectRef idx="0">
+            <a:schemeClr val="accent1"/>
+          </a:effectRef>
+          <a:fontRef idx="minor">
+            <a:schemeClr val="lt1"/>
+          </a:fontRef>
+        </p:style>
+        <p:txBody>
+          <a:bodyPr rtlCol="0" anchor="ctr"/>
+          <a:lstStyle/>
+          <a:p>
+            <a:pPr algn="ctr"/>
+            <a:endParaRPr lang="en-US" dirty="0"/>
+          </a:p>
+        </p:txBody>
+      </p:sp>
+      <p:pic>
+        <p:nvPicPr>
+          <p:cNvPr id="6" name="Graphic 5" descr="Dim (Smaller Sun) with solid fill">
+            <a:extLst>
+              <a:ext uri="{FF2B5EF4-FFF2-40B4-BE49-F238E27FC236}">
+                <a16:creationId xmlns:a16="http://schemas.microsoft.com/office/drawing/2014/main" id="{CBC8C40C-2AC3-D227-995D-1D4F292BE590}"/>
+              </a:ext>
+            </a:extLst>
+          </p:cNvPr>
+          <p:cNvPicPr>
+            <a:picLocks noChangeAspect="1"/>
+          </p:cNvPicPr>
+          <p:nvPr/>
+        </p:nvPicPr>
+        <p:blipFill>
+          <a:blip r:embed="rId3">
+            <a:extLst>
+              <a:ext uri="{96DAC541-7B7A-43D3-8B79-37D633B846F1}">
+                <asvg:svgBlip xmlns:asvg="http://schemas.microsoft.com/office/drawing/2016/SVG/main" r:embed="rId4"/>
+              </a:ext>
+            </a:extLst>
+          </a:blip>
+          <a:stretch>
+            <a:fillRect/>
+          </a:stretch>
+        </p:blipFill>
+        <p:spPr>
+          <a:xfrm>
+            <a:off x="5068945" y="817613"/>
+            <a:ext cx="684000" cy="548111"/>
+          </a:xfrm>
+          <a:prstGeom prst="rect">
+            <a:avLst/>
+          </a:prstGeom>
+        </p:spPr>
+      </p:pic>
+      <p:cxnSp>
+        <p:nvCxnSpPr>
+          <p:cNvPr id="7" name="Straight Connector 6">
+            <a:extLst>
+              <a:ext uri="{FF2B5EF4-FFF2-40B4-BE49-F238E27FC236}">
+                <a16:creationId xmlns:a16="http://schemas.microsoft.com/office/drawing/2014/main" id="{940C85E2-C1F1-BDA4-0A43-EB31A8157EE9}"/>
+              </a:ext>
+            </a:extLst>
+          </p:cNvPr>
+          <p:cNvCxnSpPr>
+            <a:cxnSpLocks/>
+          </p:cNvCxnSpPr>
+          <p:nvPr/>
+        </p:nvCxnSpPr>
+        <p:spPr>
+          <a:xfrm>
+            <a:off x="3924840" y="852690"/>
+            <a:ext cx="0" cy="422324"/>
+          </a:xfrm>
+          <a:prstGeom prst="line">
+            <a:avLst/>
+          </a:prstGeom>
+        </p:spPr>
+        <p:style>
+          <a:lnRef idx="2">
+            <a:schemeClr val="dk1"/>
+          </a:lnRef>
+          <a:fillRef idx="0">
+            <a:schemeClr val="dk1"/>
+          </a:fillRef>
+          <a:effectRef idx="1">
+            <a:schemeClr val="dk1"/>
+          </a:effectRef>
+          <a:fontRef idx="minor">
+            <a:schemeClr val="tx1"/>
+          </a:fontRef>
+        </p:style>
+      </p:cxnSp>
+      <p:cxnSp>
+        <p:nvCxnSpPr>
+          <p:cNvPr id="8" name="Straight Connector 7">
+            <a:extLst>
+              <a:ext uri="{FF2B5EF4-FFF2-40B4-BE49-F238E27FC236}">
+                <a16:creationId xmlns:a16="http://schemas.microsoft.com/office/drawing/2014/main" id="{BB00DEC3-48D8-DAF9-3709-83670468F2B3}"/>
+              </a:ext>
+            </a:extLst>
+          </p:cNvPr>
+          <p:cNvCxnSpPr>
+            <a:cxnSpLocks/>
+          </p:cNvCxnSpPr>
+          <p:nvPr/>
+        </p:nvCxnSpPr>
+        <p:spPr>
+          <a:xfrm>
+            <a:off x="7521480" y="852690"/>
+            <a:ext cx="0" cy="422323"/>
+          </a:xfrm>
+          <a:prstGeom prst="line">
+            <a:avLst/>
+          </a:prstGeom>
+        </p:spPr>
+        <p:style>
+          <a:lnRef idx="2">
+            <a:schemeClr val="dk1"/>
+          </a:lnRef>
+          <a:fillRef idx="0">
+            <a:schemeClr val="dk1"/>
+          </a:fillRef>
+          <a:effectRef idx="1">
+            <a:schemeClr val="dk1"/>
+          </a:effectRef>
+          <a:fontRef idx="minor">
+            <a:schemeClr val="tx1"/>
+          </a:fontRef>
+        </p:style>
+      </p:cxnSp>
+      <p:pic>
+        <p:nvPicPr>
+          <p:cNvPr id="11" name="Graphic 10" descr="Moon with solid fill">
+            <a:extLst>
+              <a:ext uri="{FF2B5EF4-FFF2-40B4-BE49-F238E27FC236}">
+                <a16:creationId xmlns:a16="http://schemas.microsoft.com/office/drawing/2014/main" id="{BB3E6365-250D-6146-B3A9-551BCF6894A6}"/>
+              </a:ext>
+            </a:extLst>
+          </p:cNvPr>
+          <p:cNvPicPr>
+            <a:picLocks noChangeAspect="1"/>
+          </p:cNvPicPr>
+          <p:nvPr/>
+        </p:nvPicPr>
+        <p:blipFill>
+          <a:blip r:embed="rId5">
+            <a:extLst>
+              <a:ext uri="{96DAC541-7B7A-43D3-8B79-37D633B846F1}">
+                <asvg:svgBlip xmlns:asvg="http://schemas.microsoft.com/office/drawing/2016/SVG/main" r:embed="rId6"/>
+              </a:ext>
+            </a:extLst>
+          </a:blip>
+          <a:stretch>
+            <a:fillRect/>
+          </a:stretch>
+        </p:blipFill>
+        <p:spPr>
+          <a:xfrm>
+            <a:off x="7893749" y="857669"/>
+            <a:ext cx="468000" cy="468000"/>
+          </a:xfrm>
+          <a:prstGeom prst="rect">
+            <a:avLst/>
+          </a:prstGeom>
+        </p:spPr>
+      </p:pic>
+      <p:pic>
+        <p:nvPicPr>
+          <p:cNvPr id="14" name="Graphic 13" descr="Sunset scene with solid fill">
+            <a:extLst>
+              <a:ext uri="{FF2B5EF4-FFF2-40B4-BE49-F238E27FC236}">
+                <a16:creationId xmlns:a16="http://schemas.microsoft.com/office/drawing/2014/main" id="{0FF92E99-701C-1D65-BE44-549CA11A56D2}"/>
+              </a:ext>
+            </a:extLst>
+          </p:cNvPr>
+          <p:cNvPicPr>
+            <a:picLocks noChangeAspect="1"/>
+          </p:cNvPicPr>
+          <p:nvPr/>
+        </p:nvPicPr>
+        <p:blipFill>
+          <a:blip r:embed="rId7">
+            <a:extLst>
+              <a:ext uri="{96DAC541-7B7A-43D3-8B79-37D633B846F1}">
+                <asvg:svgBlip xmlns:asvg="http://schemas.microsoft.com/office/drawing/2016/SVG/main" r:embed="rId8"/>
+              </a:ext>
+            </a:extLst>
+          </a:blip>
+          <a:stretch>
+            <a:fillRect/>
+          </a:stretch>
+        </p:blipFill>
+        <p:spPr>
+          <a:xfrm>
+            <a:off x="2440357" y="752194"/>
+            <a:ext cx="625161" cy="625161"/>
+          </a:xfrm>
+          <a:prstGeom prst="rect">
+            <a:avLst/>
+          </a:prstGeom>
+        </p:spPr>
+      </p:pic>
+    </p:spTree>
+    <p:extLst>
+      <p:ext uri="{BB962C8B-B14F-4D97-AF65-F5344CB8AC3E}">
+        <p14:creationId xmlns:p14="http://schemas.microsoft.com/office/powerpoint/2010/main" val="656857235"/>
+      </p:ext>
+    </p:extLst>
+  </p:cSld>
+  <p:clrMapOvr>
+    <a:masterClrMapping/>
+  </p:clrMapOvr>
+</p:sld>
+</file>
+
 <file path=ppt/slides/slide2.xml><?xml version="1.0" encoding="utf-8"?>
 <p:sld xmlns:a="http://schemas.openxmlformats.org/drawingml/2006/main" xmlns:r="http://schemas.openxmlformats.org/officeDocument/2006/relationships" xmlns:p="http://schemas.openxmlformats.org/presentationml/2006/main">
   <p:cSld>
@@ -5212,6 +6028,2011 @@
     <p:extLst>
       <p:ext uri="{BB962C8B-B14F-4D97-AF65-F5344CB8AC3E}">
         <p14:creationId xmlns:p14="http://schemas.microsoft.com/office/powerpoint/2010/main" val="3464306805"/>
+      </p:ext>
+    </p:extLst>
+  </p:cSld>
+  <p:clrMapOvr>
+    <a:masterClrMapping/>
+  </p:clrMapOvr>
+</p:sld>
+</file>
+
+<file path=ppt/slides/slide4.xml><?xml version="1.0" encoding="utf-8"?>
+<p:sld xmlns:a="http://schemas.openxmlformats.org/drawingml/2006/main" xmlns:r="http://schemas.openxmlformats.org/officeDocument/2006/relationships" xmlns:p="http://schemas.openxmlformats.org/presentationml/2006/main">
+  <p:cSld>
+    <p:spTree>
+      <p:nvGrpSpPr>
+        <p:cNvPr id="1" name=""/>
+        <p:cNvGrpSpPr/>
+        <p:nvPr/>
+      </p:nvGrpSpPr>
+      <p:grpSpPr>
+        <a:xfrm>
+          <a:off x="0" y="0"/>
+          <a:ext cx="0" cy="0"/>
+          <a:chOff x="0" y="0"/>
+          <a:chExt cx="0" cy="0"/>
+        </a:xfrm>
+      </p:grpSpPr>
+      <p:pic>
+        <p:nvPicPr>
+          <p:cNvPr id="4" name="Picture 3">
+            <a:extLst>
+              <a:ext uri="{FF2B5EF4-FFF2-40B4-BE49-F238E27FC236}">
+                <a16:creationId xmlns:a16="http://schemas.microsoft.com/office/drawing/2014/main" id="{1844EA73-0371-6BBC-A790-292887CC75CC}"/>
+              </a:ext>
+            </a:extLst>
+          </p:cNvPr>
+          <p:cNvPicPr>
+            <a:picLocks noChangeAspect="1"/>
+          </p:cNvPicPr>
+          <p:nvPr/>
+        </p:nvPicPr>
+        <p:blipFill>
+          <a:blip r:embed="rId2"/>
+          <a:stretch>
+            <a:fillRect/>
+          </a:stretch>
+        </p:blipFill>
+        <p:spPr>
+          <a:xfrm>
+            <a:off x="544856" y="424660"/>
+            <a:ext cx="9557816" cy="6008679"/>
+          </a:xfrm>
+          <a:prstGeom prst="rect">
+            <a:avLst/>
+          </a:prstGeom>
+        </p:spPr>
+      </p:pic>
+      <p:sp>
+        <p:nvSpPr>
+          <p:cNvPr id="12" name="Left Brace 11">
+            <a:extLst>
+              <a:ext uri="{FF2B5EF4-FFF2-40B4-BE49-F238E27FC236}">
+                <a16:creationId xmlns:a16="http://schemas.microsoft.com/office/drawing/2014/main" id="{B7E57170-6FFE-D5B1-08D6-55B703ADF37B}"/>
+              </a:ext>
+            </a:extLst>
+          </p:cNvPr>
+          <p:cNvSpPr/>
+          <p:nvPr/>
+        </p:nvSpPr>
+        <p:spPr>
+          <a:xfrm rot="16200000">
+            <a:off x="2531022" y="4329712"/>
+            <a:ext cx="257642" cy="2237569"/>
+          </a:xfrm>
+          <a:prstGeom prst="leftBrace">
+            <a:avLst/>
+          </a:prstGeom>
+          <a:ln w="38100">
+            <a:solidFill>
+              <a:schemeClr val="accent5">
+                <a:lumMod val="40000"/>
+                <a:lumOff val="60000"/>
+              </a:schemeClr>
+            </a:solidFill>
+          </a:ln>
+        </p:spPr>
+        <p:style>
+          <a:lnRef idx="2">
+            <a:schemeClr val="dk1"/>
+          </a:lnRef>
+          <a:fillRef idx="0">
+            <a:schemeClr val="dk1"/>
+          </a:fillRef>
+          <a:effectRef idx="1">
+            <a:schemeClr val="dk1"/>
+          </a:effectRef>
+          <a:fontRef idx="minor">
+            <a:schemeClr val="tx1"/>
+          </a:fontRef>
+        </p:style>
+        <p:txBody>
+          <a:bodyPr rtlCol="0" anchor="ctr"/>
+          <a:lstStyle/>
+          <a:p>
+            <a:pPr algn="ctr"/>
+            <a:endParaRPr lang="en-US"/>
+          </a:p>
+        </p:txBody>
+      </p:sp>
+      <p:sp>
+        <p:nvSpPr>
+          <p:cNvPr id="13" name="Left Brace 12">
+            <a:extLst>
+              <a:ext uri="{FF2B5EF4-FFF2-40B4-BE49-F238E27FC236}">
+                <a16:creationId xmlns:a16="http://schemas.microsoft.com/office/drawing/2014/main" id="{73B5A2D6-20B5-60D9-27BF-6EFEA277A6AE}"/>
+              </a:ext>
+            </a:extLst>
+          </p:cNvPr>
+          <p:cNvSpPr/>
+          <p:nvPr/>
+        </p:nvSpPr>
+        <p:spPr>
+          <a:xfrm rot="16200000">
+            <a:off x="5563692" y="3548060"/>
+            <a:ext cx="223855" cy="3793985"/>
+          </a:xfrm>
+          <a:prstGeom prst="leftBrace">
+            <a:avLst/>
+          </a:prstGeom>
+          <a:ln w="38100">
+            <a:solidFill>
+              <a:srgbClr val="FFC000"/>
+            </a:solidFill>
+          </a:ln>
+        </p:spPr>
+        <p:style>
+          <a:lnRef idx="2">
+            <a:schemeClr val="dk1"/>
+          </a:lnRef>
+          <a:fillRef idx="0">
+            <a:schemeClr val="dk1"/>
+          </a:fillRef>
+          <a:effectRef idx="1">
+            <a:schemeClr val="dk1"/>
+          </a:effectRef>
+          <a:fontRef idx="minor">
+            <a:schemeClr val="tx1"/>
+          </a:fontRef>
+        </p:style>
+        <p:txBody>
+          <a:bodyPr rtlCol="0" anchor="ctr"/>
+          <a:lstStyle/>
+          <a:p>
+            <a:pPr algn="ctr"/>
+            <a:endParaRPr lang="en-US" dirty="0"/>
+          </a:p>
+        </p:txBody>
+      </p:sp>
+      <p:pic>
+        <p:nvPicPr>
+          <p:cNvPr id="14" name="Graphic 13" descr="Dim (Smaller Sun) with solid fill">
+            <a:extLst>
+              <a:ext uri="{FF2B5EF4-FFF2-40B4-BE49-F238E27FC236}">
+                <a16:creationId xmlns:a16="http://schemas.microsoft.com/office/drawing/2014/main" id="{2A17FD34-2ACF-2065-3DD7-C06F4AB0817A}"/>
+              </a:ext>
+            </a:extLst>
+          </p:cNvPr>
+          <p:cNvPicPr>
+            <a:picLocks noChangeAspect="1"/>
+          </p:cNvPicPr>
+          <p:nvPr/>
+        </p:nvPicPr>
+        <p:blipFill>
+          <a:blip r:embed="rId3">
+            <a:extLst>
+              <a:ext uri="{96DAC541-7B7A-43D3-8B79-37D633B846F1}">
+                <asvg:svgBlip xmlns:asvg="http://schemas.microsoft.com/office/drawing/2016/SVG/main" r:embed="rId4"/>
+              </a:ext>
+            </a:extLst>
+          </a:blip>
+          <a:stretch>
+            <a:fillRect/>
+          </a:stretch>
+        </p:blipFill>
+        <p:spPr>
+          <a:xfrm>
+            <a:off x="5406690" y="5531449"/>
+            <a:ext cx="537859" cy="431004"/>
+          </a:xfrm>
+          <a:prstGeom prst="rect">
+            <a:avLst/>
+          </a:prstGeom>
+        </p:spPr>
+      </p:pic>
+      <p:pic>
+        <p:nvPicPr>
+          <p:cNvPr id="15" name="Graphic 14" descr="Sunset scene with solid fill">
+            <a:extLst>
+              <a:ext uri="{FF2B5EF4-FFF2-40B4-BE49-F238E27FC236}">
+                <a16:creationId xmlns:a16="http://schemas.microsoft.com/office/drawing/2014/main" id="{3E515650-8BD2-0DED-8D0A-EA165B4763DD}"/>
+              </a:ext>
+            </a:extLst>
+          </p:cNvPr>
+          <p:cNvPicPr>
+            <a:picLocks noChangeAspect="1"/>
+          </p:cNvPicPr>
+          <p:nvPr/>
+        </p:nvPicPr>
+        <p:blipFill>
+          <a:blip r:embed="rId5">
+            <a:extLst>
+              <a:ext uri="{96DAC541-7B7A-43D3-8B79-37D633B846F1}">
+                <asvg:svgBlip xmlns:asvg="http://schemas.microsoft.com/office/drawing/2016/SVG/main" r:embed="rId6"/>
+              </a:ext>
+            </a:extLst>
+          </a:blip>
+          <a:stretch>
+            <a:fillRect/>
+          </a:stretch>
+        </p:blipFill>
+        <p:spPr>
+          <a:xfrm>
+            <a:off x="2435564" y="5556771"/>
+            <a:ext cx="448557" cy="448557"/>
+          </a:xfrm>
+          <a:prstGeom prst="rect">
+            <a:avLst/>
+          </a:prstGeom>
+        </p:spPr>
+      </p:pic>
+      <p:pic>
+        <p:nvPicPr>
+          <p:cNvPr id="16" name="Graphic 15" descr="Moon with solid fill">
+            <a:extLst>
+              <a:ext uri="{FF2B5EF4-FFF2-40B4-BE49-F238E27FC236}">
+                <a16:creationId xmlns:a16="http://schemas.microsoft.com/office/drawing/2014/main" id="{DB6C1273-1C0C-E18E-8C57-E20E663AAF65}"/>
+              </a:ext>
+            </a:extLst>
+          </p:cNvPr>
+          <p:cNvPicPr>
+            <a:picLocks noChangeAspect="1"/>
+          </p:cNvPicPr>
+          <p:nvPr/>
+        </p:nvPicPr>
+        <p:blipFill>
+          <a:blip r:embed="rId7">
+            <a:extLst>
+              <a:ext uri="{96DAC541-7B7A-43D3-8B79-37D633B846F1}">
+                <asvg:svgBlip xmlns:asvg="http://schemas.microsoft.com/office/drawing/2016/SVG/main" r:embed="rId8"/>
+              </a:ext>
+            </a:extLst>
+          </a:blip>
+          <a:stretch>
+            <a:fillRect/>
+          </a:stretch>
+        </p:blipFill>
+        <p:spPr>
+          <a:xfrm>
+            <a:off x="7825478" y="5598683"/>
+            <a:ext cx="296536" cy="296536"/>
+          </a:xfrm>
+          <a:prstGeom prst="rect">
+            <a:avLst/>
+          </a:prstGeom>
+        </p:spPr>
+      </p:pic>
+      <p:sp>
+        <p:nvSpPr>
+          <p:cNvPr id="17" name="Left Brace 16">
+            <a:extLst>
+              <a:ext uri="{FF2B5EF4-FFF2-40B4-BE49-F238E27FC236}">
+                <a16:creationId xmlns:a16="http://schemas.microsoft.com/office/drawing/2014/main" id="{E077A77C-1BE9-A47C-CD88-50A21D114C2E}"/>
+              </a:ext>
+            </a:extLst>
+          </p:cNvPr>
+          <p:cNvSpPr/>
+          <p:nvPr/>
+        </p:nvSpPr>
+        <p:spPr>
+          <a:xfrm rot="16200000">
+            <a:off x="7846244" y="5081618"/>
+            <a:ext cx="255005" cy="758021"/>
+          </a:xfrm>
+          <a:prstGeom prst="leftBrace">
+            <a:avLst/>
+          </a:prstGeom>
+          <a:ln w="38100">
+            <a:solidFill>
+              <a:srgbClr val="002060"/>
+            </a:solidFill>
+          </a:ln>
+        </p:spPr>
+        <p:style>
+          <a:lnRef idx="2">
+            <a:schemeClr val="dk1"/>
+          </a:lnRef>
+          <a:fillRef idx="0">
+            <a:schemeClr val="dk1"/>
+          </a:fillRef>
+          <a:effectRef idx="1">
+            <a:schemeClr val="dk1"/>
+          </a:effectRef>
+          <a:fontRef idx="minor">
+            <a:schemeClr val="tx1"/>
+          </a:fontRef>
+        </p:style>
+        <p:txBody>
+          <a:bodyPr rtlCol="0" anchor="ctr"/>
+          <a:lstStyle/>
+          <a:p>
+            <a:pPr algn="ctr"/>
+            <a:endParaRPr lang="en-US"/>
+          </a:p>
+        </p:txBody>
+      </p:sp>
+    </p:spTree>
+    <p:extLst>
+      <p:ext uri="{BB962C8B-B14F-4D97-AF65-F5344CB8AC3E}">
+        <p14:creationId xmlns:p14="http://schemas.microsoft.com/office/powerpoint/2010/main" val="3851030990"/>
+      </p:ext>
+    </p:extLst>
+  </p:cSld>
+  <p:clrMapOvr>
+    <a:masterClrMapping/>
+  </p:clrMapOvr>
+</p:sld>
+</file>
+
+<file path=ppt/slides/slide5.xml><?xml version="1.0" encoding="utf-8"?>
+<p:sld xmlns:a="http://schemas.openxmlformats.org/drawingml/2006/main" xmlns:r="http://schemas.openxmlformats.org/officeDocument/2006/relationships" xmlns:p="http://schemas.openxmlformats.org/presentationml/2006/main">
+  <p:cSld>
+    <p:spTree>
+      <p:nvGrpSpPr>
+        <p:cNvPr id="1" name=""/>
+        <p:cNvGrpSpPr/>
+        <p:nvPr/>
+      </p:nvGrpSpPr>
+      <p:grpSpPr>
+        <a:xfrm>
+          <a:off x="0" y="0"/>
+          <a:ext cx="0" cy="0"/>
+          <a:chOff x="0" y="0"/>
+          <a:chExt cx="0" cy="0"/>
+        </a:xfrm>
+      </p:grpSpPr>
+      <p:pic>
+        <p:nvPicPr>
+          <p:cNvPr id="4" name="Picture 3">
+            <a:extLst>
+              <a:ext uri="{FF2B5EF4-FFF2-40B4-BE49-F238E27FC236}">
+                <a16:creationId xmlns:a16="http://schemas.microsoft.com/office/drawing/2014/main" id="{1844EA73-0371-6BBC-A790-292887CC75CC}"/>
+              </a:ext>
+            </a:extLst>
+          </p:cNvPr>
+          <p:cNvPicPr>
+            <a:picLocks noChangeAspect="1"/>
+          </p:cNvPicPr>
+          <p:nvPr/>
+        </p:nvPicPr>
+        <p:blipFill>
+          <a:blip r:embed="rId2"/>
+          <a:srcRect t="8748" b="16505"/>
+          <a:stretch/>
+        </p:blipFill>
+        <p:spPr>
+          <a:xfrm>
+            <a:off x="661398" y="1658471"/>
+            <a:ext cx="9557816" cy="4491318"/>
+          </a:xfrm>
+          <a:prstGeom prst="rect">
+            <a:avLst/>
+          </a:prstGeom>
+        </p:spPr>
+      </p:pic>
+      <p:pic>
+        <p:nvPicPr>
+          <p:cNvPr id="2" name="Graphic 1" descr="Dim (Smaller Sun) with solid fill">
+            <a:extLst>
+              <a:ext uri="{FF2B5EF4-FFF2-40B4-BE49-F238E27FC236}">
+                <a16:creationId xmlns:a16="http://schemas.microsoft.com/office/drawing/2014/main" id="{7A7DEB1E-DA8B-5375-E341-F7553CFA5856}"/>
+              </a:ext>
+            </a:extLst>
+          </p:cNvPr>
+          <p:cNvPicPr>
+            <a:picLocks noChangeAspect="1"/>
+          </p:cNvPicPr>
+          <p:nvPr/>
+        </p:nvPicPr>
+        <p:blipFill>
+          <a:blip r:embed="rId3">
+            <a:extLst>
+              <a:ext uri="{96DAC541-7B7A-43D3-8B79-37D633B846F1}">
+                <asvg:svgBlip xmlns:asvg="http://schemas.microsoft.com/office/drawing/2016/SVG/main" r:embed="rId4"/>
+              </a:ext>
+            </a:extLst>
+          </a:blip>
+          <a:stretch>
+            <a:fillRect/>
+          </a:stretch>
+        </p:blipFill>
+        <p:spPr>
+          <a:xfrm>
+            <a:off x="5411024" y="516727"/>
+            <a:ext cx="537859" cy="431004"/>
+          </a:xfrm>
+          <a:prstGeom prst="rect">
+            <a:avLst/>
+          </a:prstGeom>
+        </p:spPr>
+      </p:pic>
+      <p:pic>
+        <p:nvPicPr>
+          <p:cNvPr id="3" name="Graphic 2" descr="Sunset scene with solid fill">
+            <a:extLst>
+              <a:ext uri="{FF2B5EF4-FFF2-40B4-BE49-F238E27FC236}">
+                <a16:creationId xmlns:a16="http://schemas.microsoft.com/office/drawing/2014/main" id="{A9DB14D7-E4C3-6FCD-12E8-FD9586DB5159}"/>
+              </a:ext>
+            </a:extLst>
+          </p:cNvPr>
+          <p:cNvPicPr>
+            <a:picLocks noChangeAspect="1"/>
+          </p:cNvPicPr>
+          <p:nvPr/>
+        </p:nvPicPr>
+        <p:blipFill>
+          <a:blip r:embed="rId5">
+            <a:extLst>
+              <a:ext uri="{96DAC541-7B7A-43D3-8B79-37D633B846F1}">
+                <asvg:svgBlip xmlns:asvg="http://schemas.microsoft.com/office/drawing/2016/SVG/main" r:embed="rId6"/>
+              </a:ext>
+            </a:extLst>
+          </a:blip>
+          <a:stretch>
+            <a:fillRect/>
+          </a:stretch>
+        </p:blipFill>
+        <p:spPr>
+          <a:xfrm>
+            <a:off x="2404409" y="583528"/>
+            <a:ext cx="448557" cy="448557"/>
+          </a:xfrm>
+          <a:prstGeom prst="rect">
+            <a:avLst/>
+          </a:prstGeom>
+        </p:spPr>
+      </p:pic>
+      <p:pic>
+        <p:nvPicPr>
+          <p:cNvPr id="5" name="Graphic 4" descr="Moon with solid fill">
+            <a:extLst>
+              <a:ext uri="{FF2B5EF4-FFF2-40B4-BE49-F238E27FC236}">
+                <a16:creationId xmlns:a16="http://schemas.microsoft.com/office/drawing/2014/main" id="{41DB40FB-5D34-585E-27BB-F225E9FEEBF0}"/>
+              </a:ext>
+            </a:extLst>
+          </p:cNvPr>
+          <p:cNvPicPr>
+            <a:picLocks noChangeAspect="1"/>
+          </p:cNvPicPr>
+          <p:nvPr/>
+        </p:nvPicPr>
+        <p:blipFill>
+          <a:blip r:embed="rId7">
+            <a:extLst>
+              <a:ext uri="{96DAC541-7B7A-43D3-8B79-37D633B846F1}">
+                <asvg:svgBlip xmlns:asvg="http://schemas.microsoft.com/office/drawing/2016/SVG/main" r:embed="rId8"/>
+              </a:ext>
+            </a:extLst>
+          </a:blip>
+          <a:stretch>
+            <a:fillRect/>
+          </a:stretch>
+        </p:blipFill>
+        <p:spPr>
+          <a:xfrm>
+            <a:off x="7939423" y="543978"/>
+            <a:ext cx="296536" cy="296536"/>
+          </a:xfrm>
+          <a:prstGeom prst="rect">
+            <a:avLst/>
+          </a:prstGeom>
+        </p:spPr>
+      </p:pic>
+      <p:sp>
+        <p:nvSpPr>
+          <p:cNvPr id="6" name="Left Brace 5">
+            <a:extLst>
+              <a:ext uri="{FF2B5EF4-FFF2-40B4-BE49-F238E27FC236}">
+                <a16:creationId xmlns:a16="http://schemas.microsoft.com/office/drawing/2014/main" id="{B4C0231C-1E91-3250-91D2-88EC9216DFC3}"/>
+              </a:ext>
+            </a:extLst>
+          </p:cNvPr>
+          <p:cNvSpPr/>
+          <p:nvPr/>
+        </p:nvSpPr>
+        <p:spPr>
+          <a:xfrm rot="16200000" flipH="1">
+            <a:off x="2683775" y="513796"/>
+            <a:ext cx="256938" cy="2237569"/>
+          </a:xfrm>
+          <a:prstGeom prst="leftBrace">
+            <a:avLst/>
+          </a:prstGeom>
+          <a:ln w="38100">
+            <a:solidFill>
+              <a:schemeClr val="accent5">
+                <a:lumMod val="40000"/>
+                <a:lumOff val="60000"/>
+              </a:schemeClr>
+            </a:solidFill>
+          </a:ln>
+        </p:spPr>
+        <p:style>
+          <a:lnRef idx="2">
+            <a:schemeClr val="dk1"/>
+          </a:lnRef>
+          <a:fillRef idx="0">
+            <a:schemeClr val="dk1"/>
+          </a:fillRef>
+          <a:effectRef idx="1">
+            <a:schemeClr val="dk1"/>
+          </a:effectRef>
+          <a:fontRef idx="minor">
+            <a:schemeClr val="tx1"/>
+          </a:fontRef>
+        </p:style>
+        <p:txBody>
+          <a:bodyPr rtlCol="0" anchor="ctr"/>
+          <a:lstStyle/>
+          <a:p>
+            <a:pPr algn="ctr"/>
+            <a:endParaRPr lang="en-US"/>
+          </a:p>
+        </p:txBody>
+      </p:sp>
+      <p:sp>
+        <p:nvSpPr>
+          <p:cNvPr id="7" name="Left Brace 6">
+            <a:extLst>
+              <a:ext uri="{FF2B5EF4-FFF2-40B4-BE49-F238E27FC236}">
+                <a16:creationId xmlns:a16="http://schemas.microsoft.com/office/drawing/2014/main" id="{0290FEA6-EC53-2898-AAC2-078A604FE6AE}"/>
+              </a:ext>
+            </a:extLst>
+          </p:cNvPr>
+          <p:cNvSpPr/>
+          <p:nvPr/>
+        </p:nvSpPr>
+        <p:spPr>
+          <a:xfrm rot="16200000" flipH="1">
+            <a:off x="5716398" y="-234116"/>
+            <a:ext cx="223243" cy="3793985"/>
+          </a:xfrm>
+          <a:prstGeom prst="leftBrace">
+            <a:avLst/>
+          </a:prstGeom>
+          <a:ln w="38100">
+            <a:solidFill>
+              <a:srgbClr val="FFC000"/>
+            </a:solidFill>
+          </a:ln>
+        </p:spPr>
+        <p:style>
+          <a:lnRef idx="2">
+            <a:schemeClr val="dk1"/>
+          </a:lnRef>
+          <a:fillRef idx="0">
+            <a:schemeClr val="dk1"/>
+          </a:fillRef>
+          <a:effectRef idx="1">
+            <a:schemeClr val="dk1"/>
+          </a:effectRef>
+          <a:fontRef idx="minor">
+            <a:schemeClr val="tx1"/>
+          </a:fontRef>
+        </p:style>
+        <p:txBody>
+          <a:bodyPr rtlCol="0" anchor="ctr"/>
+          <a:lstStyle/>
+          <a:p>
+            <a:pPr algn="ctr"/>
+            <a:endParaRPr lang="en-US" dirty="0"/>
+          </a:p>
+        </p:txBody>
+      </p:sp>
+      <p:sp>
+        <p:nvSpPr>
+          <p:cNvPr id="8" name="Left Brace 7">
+            <a:extLst>
+              <a:ext uri="{FF2B5EF4-FFF2-40B4-BE49-F238E27FC236}">
+                <a16:creationId xmlns:a16="http://schemas.microsoft.com/office/drawing/2014/main" id="{25743CCD-D464-F051-ACA1-E681825E930D}"/>
+              </a:ext>
+            </a:extLst>
+          </p:cNvPr>
+          <p:cNvSpPr/>
+          <p:nvPr/>
+        </p:nvSpPr>
+        <p:spPr>
+          <a:xfrm rot="16200000" flipH="1">
+            <a:off x="7998993" y="1268335"/>
+            <a:ext cx="254308" cy="758021"/>
+          </a:xfrm>
+          <a:prstGeom prst="leftBrace">
+            <a:avLst/>
+          </a:prstGeom>
+          <a:ln w="38100">
+            <a:solidFill>
+              <a:srgbClr val="002060"/>
+            </a:solidFill>
+          </a:ln>
+        </p:spPr>
+        <p:style>
+          <a:lnRef idx="2">
+            <a:schemeClr val="dk1"/>
+          </a:lnRef>
+          <a:fillRef idx="0">
+            <a:schemeClr val="dk1"/>
+          </a:fillRef>
+          <a:effectRef idx="1">
+            <a:schemeClr val="dk1"/>
+          </a:effectRef>
+          <a:fontRef idx="minor">
+            <a:schemeClr val="tx1"/>
+          </a:fontRef>
+        </p:style>
+        <p:txBody>
+          <a:bodyPr rtlCol="0" anchor="ctr"/>
+          <a:lstStyle/>
+          <a:p>
+            <a:pPr algn="ctr"/>
+            <a:endParaRPr lang="en-US"/>
+          </a:p>
+        </p:txBody>
+      </p:sp>
+      <p:sp>
+        <p:nvSpPr>
+          <p:cNvPr id="9" name="Rectangle 8">
+            <a:extLst>
+              <a:ext uri="{FF2B5EF4-FFF2-40B4-BE49-F238E27FC236}">
+                <a16:creationId xmlns:a16="http://schemas.microsoft.com/office/drawing/2014/main" id="{65385F4F-DF20-E66A-0227-C5E9354039C0}"/>
+              </a:ext>
+            </a:extLst>
+          </p:cNvPr>
+          <p:cNvSpPr/>
+          <p:nvPr/>
+        </p:nvSpPr>
+        <p:spPr>
+          <a:xfrm flipH="1">
+            <a:off x="1693459" y="1101225"/>
+            <a:ext cx="6811699" cy="296535"/>
+          </a:xfrm>
+          <a:prstGeom prst="rect">
+            <a:avLst/>
+          </a:prstGeom>
+          <a:gradFill flip="none" rotWithShape="1">
+            <a:gsLst>
+              <a:gs pos="0">
+                <a:srgbClr val="452E71"/>
+              </a:gs>
+              <a:gs pos="3000">
+                <a:schemeClr val="tx2">
+                  <a:lumMod val="50000"/>
+                  <a:lumOff val="50000"/>
+                </a:schemeClr>
+              </a:gs>
+              <a:gs pos="96000">
+                <a:srgbClr val="150E22"/>
+              </a:gs>
+              <a:gs pos="89000">
+                <a:schemeClr val="tx2">
+                  <a:lumMod val="10000"/>
+                  <a:lumOff val="90000"/>
+                </a:schemeClr>
+              </a:gs>
+              <a:gs pos="34000">
+                <a:schemeClr val="accent4">
+                  <a:lumMod val="20000"/>
+                  <a:lumOff val="80000"/>
+                </a:schemeClr>
+              </a:gs>
+            </a:gsLst>
+            <a:lin ang="10800000" scaled="1"/>
+            <a:tileRect/>
+          </a:gradFill>
+        </p:spPr>
+        <p:style>
+          <a:lnRef idx="2">
+            <a:schemeClr val="accent1">
+              <a:shade val="15000"/>
+            </a:schemeClr>
+          </a:lnRef>
+          <a:fillRef idx="1">
+            <a:schemeClr val="accent1"/>
+          </a:fillRef>
+          <a:effectRef idx="0">
+            <a:schemeClr val="accent1"/>
+          </a:effectRef>
+          <a:fontRef idx="minor">
+            <a:schemeClr val="lt1"/>
+          </a:fontRef>
+        </p:style>
+        <p:txBody>
+          <a:bodyPr rtlCol="0" anchor="ctr"/>
+          <a:lstStyle/>
+          <a:p>
+            <a:pPr algn="ctr"/>
+            <a:endParaRPr lang="en-US" dirty="0"/>
+          </a:p>
+        </p:txBody>
+      </p:sp>
+    </p:spTree>
+    <p:extLst>
+      <p:ext uri="{BB962C8B-B14F-4D97-AF65-F5344CB8AC3E}">
+        <p14:creationId xmlns:p14="http://schemas.microsoft.com/office/powerpoint/2010/main" val="3773038743"/>
+      </p:ext>
+    </p:extLst>
+  </p:cSld>
+  <p:clrMapOvr>
+    <a:masterClrMapping/>
+  </p:clrMapOvr>
+</p:sld>
+</file>
+
+<file path=ppt/slides/slide6.xml><?xml version="1.0" encoding="utf-8"?>
+<p:sld xmlns:a="http://schemas.openxmlformats.org/drawingml/2006/main" xmlns:r="http://schemas.openxmlformats.org/officeDocument/2006/relationships" xmlns:p="http://schemas.openxmlformats.org/presentationml/2006/main">
+  <p:cSld>
+    <p:spTree>
+      <p:nvGrpSpPr>
+        <p:cNvPr id="1" name=""/>
+        <p:cNvGrpSpPr/>
+        <p:nvPr/>
+      </p:nvGrpSpPr>
+      <p:grpSpPr>
+        <a:xfrm>
+          <a:off x="0" y="0"/>
+          <a:ext cx="0" cy="0"/>
+          <a:chOff x="0" y="0"/>
+          <a:chExt cx="0" cy="0"/>
+        </a:xfrm>
+      </p:grpSpPr>
+      <p:pic>
+        <p:nvPicPr>
+          <p:cNvPr id="4" name="Picture 3">
+            <a:extLst>
+              <a:ext uri="{FF2B5EF4-FFF2-40B4-BE49-F238E27FC236}">
+                <a16:creationId xmlns:a16="http://schemas.microsoft.com/office/drawing/2014/main" id="{3E29D6A6-D834-9BA7-1C59-79E2074C7C61}"/>
+              </a:ext>
+            </a:extLst>
+          </p:cNvPr>
+          <p:cNvPicPr>
+            <a:picLocks noChangeAspect="1"/>
+          </p:cNvPicPr>
+          <p:nvPr/>
+        </p:nvPicPr>
+        <p:blipFill>
+          <a:blip r:embed="rId2"/>
+          <a:srcRect t="8748" b="16505"/>
+          <a:stretch/>
+        </p:blipFill>
+        <p:spPr>
+          <a:xfrm>
+            <a:off x="661398" y="1658471"/>
+            <a:ext cx="9557816" cy="4491318"/>
+          </a:xfrm>
+          <a:prstGeom prst="rect">
+            <a:avLst/>
+          </a:prstGeom>
+        </p:spPr>
+      </p:pic>
+      <p:sp>
+        <p:nvSpPr>
+          <p:cNvPr id="8" name="Rectangle 7">
+            <a:extLst>
+              <a:ext uri="{FF2B5EF4-FFF2-40B4-BE49-F238E27FC236}">
+                <a16:creationId xmlns:a16="http://schemas.microsoft.com/office/drawing/2014/main" id="{737D3D71-A354-CE22-66D7-334FC64CA4B8}"/>
+              </a:ext>
+            </a:extLst>
+          </p:cNvPr>
+          <p:cNvSpPr/>
+          <p:nvPr/>
+        </p:nvSpPr>
+        <p:spPr>
+          <a:xfrm flipH="1">
+            <a:off x="1716608" y="1405574"/>
+            <a:ext cx="6767635" cy="296535"/>
+          </a:xfrm>
+          <a:prstGeom prst="rect">
+            <a:avLst/>
+          </a:prstGeom>
+          <a:gradFill flip="none" rotWithShape="1">
+            <a:gsLst>
+              <a:gs pos="15000">
+                <a:schemeClr val="tx2">
+                  <a:lumMod val="50000"/>
+                  <a:lumOff val="50000"/>
+                </a:schemeClr>
+              </a:gs>
+              <a:gs pos="0">
+                <a:srgbClr val="150E22">
+                  <a:alpha val="68627"/>
+                </a:srgbClr>
+              </a:gs>
+              <a:gs pos="0">
+                <a:schemeClr val="tx2">
+                  <a:lumMod val="90000"/>
+                  <a:lumOff val="10000"/>
+                </a:schemeClr>
+              </a:gs>
+              <a:gs pos="96000">
+                <a:srgbClr val="150E22">
+                  <a:alpha val="78821"/>
+                </a:srgbClr>
+              </a:gs>
+              <a:gs pos="88000">
+                <a:schemeClr val="tx2">
+                  <a:lumMod val="10000"/>
+                  <a:lumOff val="90000"/>
+                </a:schemeClr>
+              </a:gs>
+              <a:gs pos="35000">
+                <a:schemeClr val="accent4">
+                  <a:lumMod val="20000"/>
+                  <a:lumOff val="80000"/>
+                </a:schemeClr>
+              </a:gs>
+            </a:gsLst>
+            <a:lin ang="10800000" scaled="1"/>
+            <a:tileRect/>
+          </a:gradFill>
+          <a:ln>
+            <a:noFill/>
+          </a:ln>
+        </p:spPr>
+        <p:style>
+          <a:lnRef idx="2">
+            <a:schemeClr val="accent1">
+              <a:shade val="15000"/>
+            </a:schemeClr>
+          </a:lnRef>
+          <a:fillRef idx="1">
+            <a:schemeClr val="accent1"/>
+          </a:fillRef>
+          <a:effectRef idx="0">
+            <a:schemeClr val="accent1"/>
+          </a:effectRef>
+          <a:fontRef idx="minor">
+            <a:schemeClr val="lt1"/>
+          </a:fontRef>
+        </p:style>
+        <p:txBody>
+          <a:bodyPr rtlCol="0" anchor="ctr"/>
+          <a:lstStyle/>
+          <a:p>
+            <a:pPr algn="ctr"/>
+            <a:endParaRPr lang="en-US" dirty="0"/>
+          </a:p>
+        </p:txBody>
+      </p:sp>
+      <p:cxnSp>
+        <p:nvCxnSpPr>
+          <p:cNvPr id="10" name="Straight Connector 9">
+            <a:extLst>
+              <a:ext uri="{FF2B5EF4-FFF2-40B4-BE49-F238E27FC236}">
+                <a16:creationId xmlns:a16="http://schemas.microsoft.com/office/drawing/2014/main" id="{6E349895-A86D-B330-664A-914DD46252CE}"/>
+              </a:ext>
+            </a:extLst>
+          </p:cNvPr>
+          <p:cNvCxnSpPr>
+            <a:cxnSpLocks/>
+          </p:cNvCxnSpPr>
+          <p:nvPr/>
+        </p:nvCxnSpPr>
+        <p:spPr>
+          <a:xfrm>
+            <a:off x="3900126" y="1405574"/>
+            <a:ext cx="0" cy="296535"/>
+          </a:xfrm>
+          <a:prstGeom prst="line">
+            <a:avLst/>
+          </a:prstGeom>
+        </p:spPr>
+        <p:style>
+          <a:lnRef idx="2">
+            <a:schemeClr val="dk1"/>
+          </a:lnRef>
+          <a:fillRef idx="0">
+            <a:schemeClr val="dk1"/>
+          </a:fillRef>
+          <a:effectRef idx="1">
+            <a:schemeClr val="dk1"/>
+          </a:effectRef>
+          <a:fontRef idx="minor">
+            <a:schemeClr val="tx1"/>
+          </a:fontRef>
+        </p:style>
+      </p:cxnSp>
+      <p:pic>
+        <p:nvPicPr>
+          <p:cNvPr id="12" name="Graphic 11" descr="Sunset scene with solid fill">
+            <a:extLst>
+              <a:ext uri="{FF2B5EF4-FFF2-40B4-BE49-F238E27FC236}">
+                <a16:creationId xmlns:a16="http://schemas.microsoft.com/office/drawing/2014/main" id="{20FCA15A-7F5F-E96C-DD08-EEC7F7848C2C}"/>
+              </a:ext>
+            </a:extLst>
+          </p:cNvPr>
+          <p:cNvPicPr>
+            <a:picLocks noChangeAspect="1"/>
+          </p:cNvPicPr>
+          <p:nvPr/>
+        </p:nvPicPr>
+        <p:blipFill>
+          <a:blip r:embed="rId3">
+            <a:extLst>
+              <a:ext uri="{96DAC541-7B7A-43D3-8B79-37D633B846F1}">
+                <asvg:svgBlip xmlns:asvg="http://schemas.microsoft.com/office/drawing/2016/SVG/main" r:embed="rId4"/>
+              </a:ext>
+            </a:extLst>
+          </a:blip>
+          <a:stretch>
+            <a:fillRect/>
+          </a:stretch>
+        </p:blipFill>
+        <p:spPr>
+          <a:xfrm>
+            <a:off x="2496505" y="1366748"/>
+            <a:ext cx="374186" cy="374186"/>
+          </a:xfrm>
+          <a:prstGeom prst="rect">
+            <a:avLst/>
+          </a:prstGeom>
+        </p:spPr>
+      </p:pic>
+      <p:cxnSp>
+        <p:nvCxnSpPr>
+          <p:cNvPr id="13" name="Straight Connector 12">
+            <a:extLst>
+              <a:ext uri="{FF2B5EF4-FFF2-40B4-BE49-F238E27FC236}">
+                <a16:creationId xmlns:a16="http://schemas.microsoft.com/office/drawing/2014/main" id="{2826D1D0-BBA6-21C2-A595-6578B092917B}"/>
+              </a:ext>
+            </a:extLst>
+          </p:cNvPr>
+          <p:cNvCxnSpPr>
+            <a:cxnSpLocks/>
+          </p:cNvCxnSpPr>
+          <p:nvPr/>
+        </p:nvCxnSpPr>
+        <p:spPr>
+          <a:xfrm>
+            <a:off x="7702982" y="1405574"/>
+            <a:ext cx="0" cy="296535"/>
+          </a:xfrm>
+          <a:prstGeom prst="line">
+            <a:avLst/>
+          </a:prstGeom>
+        </p:spPr>
+        <p:style>
+          <a:lnRef idx="2">
+            <a:schemeClr val="dk1"/>
+          </a:lnRef>
+          <a:fillRef idx="0">
+            <a:schemeClr val="dk1"/>
+          </a:fillRef>
+          <a:effectRef idx="1">
+            <a:schemeClr val="dk1"/>
+          </a:effectRef>
+          <a:fontRef idx="minor">
+            <a:schemeClr val="tx1"/>
+          </a:fontRef>
+        </p:style>
+      </p:cxnSp>
+      <p:pic>
+        <p:nvPicPr>
+          <p:cNvPr id="15" name="Graphic 14" descr="Dim (Smaller Sun) with solid fill">
+            <a:extLst>
+              <a:ext uri="{FF2B5EF4-FFF2-40B4-BE49-F238E27FC236}">
+                <a16:creationId xmlns:a16="http://schemas.microsoft.com/office/drawing/2014/main" id="{25CB26C9-2361-2B99-3842-7080309F5609}"/>
+              </a:ext>
+            </a:extLst>
+          </p:cNvPr>
+          <p:cNvPicPr>
+            <a:picLocks noChangeAspect="1"/>
+          </p:cNvPicPr>
+          <p:nvPr/>
+        </p:nvPicPr>
+        <p:blipFill>
+          <a:blip r:embed="rId5">
+            <a:extLst>
+              <a:ext uri="{96DAC541-7B7A-43D3-8B79-37D633B846F1}">
+                <asvg:svgBlip xmlns:asvg="http://schemas.microsoft.com/office/drawing/2016/SVG/main" r:embed="rId6"/>
+              </a:ext>
+            </a:extLst>
+          </a:blip>
+          <a:stretch>
+            <a:fillRect/>
+          </a:stretch>
+        </p:blipFill>
+        <p:spPr>
+          <a:xfrm>
+            <a:off x="5355826" y="1383755"/>
+            <a:ext cx="445728" cy="357176"/>
+          </a:xfrm>
+          <a:prstGeom prst="rect">
+            <a:avLst/>
+          </a:prstGeom>
+        </p:spPr>
+      </p:pic>
+      <p:pic>
+        <p:nvPicPr>
+          <p:cNvPr id="16" name="Graphic 15" descr="Moon with solid fill">
+            <a:extLst>
+              <a:ext uri="{FF2B5EF4-FFF2-40B4-BE49-F238E27FC236}">
+                <a16:creationId xmlns:a16="http://schemas.microsoft.com/office/drawing/2014/main" id="{1CF5ED38-48B1-97E6-6163-293297603AE3}"/>
+              </a:ext>
+            </a:extLst>
+          </p:cNvPr>
+          <p:cNvPicPr>
+            <a:picLocks noChangeAspect="1"/>
+          </p:cNvPicPr>
+          <p:nvPr/>
+        </p:nvPicPr>
+        <p:blipFill>
+          <a:blip r:embed="rId7">
+            <a:extLst>
+              <a:ext uri="{96DAC541-7B7A-43D3-8B79-37D633B846F1}">
+                <asvg:svgBlip xmlns:asvg="http://schemas.microsoft.com/office/drawing/2016/SVG/main" r:embed="rId8"/>
+              </a:ext>
+            </a:extLst>
+          </a:blip>
+          <a:stretch>
+            <a:fillRect/>
+          </a:stretch>
+        </p:blipFill>
+        <p:spPr>
+          <a:xfrm>
+            <a:off x="7945345" y="1403277"/>
+            <a:ext cx="296536" cy="296536"/>
+          </a:xfrm>
+          <a:prstGeom prst="rect">
+            <a:avLst/>
+          </a:prstGeom>
+        </p:spPr>
+      </p:pic>
+    </p:spTree>
+    <p:extLst>
+      <p:ext uri="{BB962C8B-B14F-4D97-AF65-F5344CB8AC3E}">
+        <p14:creationId xmlns:p14="http://schemas.microsoft.com/office/powerpoint/2010/main" val="2031915191"/>
+      </p:ext>
+    </p:extLst>
+  </p:cSld>
+  <p:clrMapOvr>
+    <a:masterClrMapping/>
+  </p:clrMapOvr>
+</p:sld>
+</file>
+
+<file path=ppt/slides/slide7.xml><?xml version="1.0" encoding="utf-8"?>
+<p:sld xmlns:a="http://schemas.openxmlformats.org/drawingml/2006/main" xmlns:r="http://schemas.openxmlformats.org/officeDocument/2006/relationships" xmlns:p="http://schemas.openxmlformats.org/presentationml/2006/main">
+  <p:cSld>
+    <p:spTree>
+      <p:nvGrpSpPr>
+        <p:cNvPr id="1" name=""/>
+        <p:cNvGrpSpPr/>
+        <p:nvPr/>
+      </p:nvGrpSpPr>
+      <p:grpSpPr>
+        <a:xfrm>
+          <a:off x="0" y="0"/>
+          <a:ext cx="0" cy="0"/>
+          <a:chOff x="0" y="0"/>
+          <a:chExt cx="0" cy="0"/>
+        </a:xfrm>
+      </p:grpSpPr>
+      <p:pic>
+        <p:nvPicPr>
+          <p:cNvPr id="4" name="Picture 3">
+            <a:extLst>
+              <a:ext uri="{FF2B5EF4-FFF2-40B4-BE49-F238E27FC236}">
+                <a16:creationId xmlns:a16="http://schemas.microsoft.com/office/drawing/2014/main" id="{3E29D6A6-D834-9BA7-1C59-79E2074C7C61}"/>
+              </a:ext>
+            </a:extLst>
+          </p:cNvPr>
+          <p:cNvPicPr>
+            <a:picLocks noChangeAspect="1"/>
+          </p:cNvPicPr>
+          <p:nvPr/>
+        </p:nvPicPr>
+        <p:blipFill>
+          <a:blip r:embed="rId2"/>
+          <a:srcRect t="8748" b="16505"/>
+          <a:stretch/>
+        </p:blipFill>
+        <p:spPr>
+          <a:xfrm>
+            <a:off x="661398" y="1658471"/>
+            <a:ext cx="9557816" cy="4491318"/>
+          </a:xfrm>
+          <a:prstGeom prst="rect">
+            <a:avLst/>
+          </a:prstGeom>
+        </p:spPr>
+      </p:pic>
+      <p:sp>
+        <p:nvSpPr>
+          <p:cNvPr id="8" name="Rectangle 7">
+            <a:extLst>
+              <a:ext uri="{FF2B5EF4-FFF2-40B4-BE49-F238E27FC236}">
+                <a16:creationId xmlns:a16="http://schemas.microsoft.com/office/drawing/2014/main" id="{737D3D71-A354-CE22-66D7-334FC64CA4B8}"/>
+              </a:ext>
+            </a:extLst>
+          </p:cNvPr>
+          <p:cNvSpPr/>
+          <p:nvPr/>
+        </p:nvSpPr>
+        <p:spPr>
+          <a:xfrm flipH="1">
+            <a:off x="1716608" y="1405574"/>
+            <a:ext cx="6767635" cy="296535"/>
+          </a:xfrm>
+          <a:prstGeom prst="rect">
+            <a:avLst/>
+          </a:prstGeom>
+          <a:gradFill flip="none" rotWithShape="1">
+            <a:gsLst>
+              <a:gs pos="30000">
+                <a:srgbClr val="FF3A74">
+                  <a:alpha val="17647"/>
+                </a:srgbClr>
+              </a:gs>
+              <a:gs pos="0">
+                <a:srgbClr val="150E22">
+                  <a:alpha val="68627"/>
+                </a:srgbClr>
+              </a:gs>
+              <a:gs pos="0">
+                <a:srgbClr val="FF3A74">
+                  <a:alpha val="41000"/>
+                </a:srgbClr>
+              </a:gs>
+              <a:gs pos="96000">
+                <a:srgbClr val="150E22">
+                  <a:alpha val="78821"/>
+                </a:srgbClr>
+              </a:gs>
+              <a:gs pos="88000">
+                <a:schemeClr val="tx2">
+                  <a:lumMod val="10000"/>
+                  <a:lumOff val="90000"/>
+                </a:schemeClr>
+              </a:gs>
+              <a:gs pos="35000">
+                <a:schemeClr val="accent4">
+                  <a:lumMod val="20000"/>
+                  <a:lumOff val="80000"/>
+                </a:schemeClr>
+              </a:gs>
+            </a:gsLst>
+            <a:lin ang="10800000" scaled="1"/>
+            <a:tileRect/>
+          </a:gradFill>
+          <a:ln>
+            <a:noFill/>
+          </a:ln>
+        </p:spPr>
+        <p:style>
+          <a:lnRef idx="2">
+            <a:schemeClr val="accent1">
+              <a:shade val="15000"/>
+            </a:schemeClr>
+          </a:lnRef>
+          <a:fillRef idx="1">
+            <a:schemeClr val="accent1"/>
+          </a:fillRef>
+          <a:effectRef idx="0">
+            <a:schemeClr val="accent1"/>
+          </a:effectRef>
+          <a:fontRef idx="minor">
+            <a:schemeClr val="lt1"/>
+          </a:fontRef>
+        </p:style>
+        <p:txBody>
+          <a:bodyPr rtlCol="0" anchor="ctr"/>
+          <a:lstStyle/>
+          <a:p>
+            <a:pPr algn="ctr"/>
+            <a:endParaRPr lang="en-US" dirty="0"/>
+          </a:p>
+        </p:txBody>
+      </p:sp>
+      <p:cxnSp>
+        <p:nvCxnSpPr>
+          <p:cNvPr id="10" name="Straight Connector 9">
+            <a:extLst>
+              <a:ext uri="{FF2B5EF4-FFF2-40B4-BE49-F238E27FC236}">
+                <a16:creationId xmlns:a16="http://schemas.microsoft.com/office/drawing/2014/main" id="{6E349895-A86D-B330-664A-914DD46252CE}"/>
+              </a:ext>
+            </a:extLst>
+          </p:cNvPr>
+          <p:cNvCxnSpPr>
+            <a:cxnSpLocks/>
+          </p:cNvCxnSpPr>
+          <p:nvPr/>
+        </p:nvCxnSpPr>
+        <p:spPr>
+          <a:xfrm>
+            <a:off x="3900126" y="1405574"/>
+            <a:ext cx="0" cy="296535"/>
+          </a:xfrm>
+          <a:prstGeom prst="line">
+            <a:avLst/>
+          </a:prstGeom>
+        </p:spPr>
+        <p:style>
+          <a:lnRef idx="2">
+            <a:schemeClr val="dk1"/>
+          </a:lnRef>
+          <a:fillRef idx="0">
+            <a:schemeClr val="dk1"/>
+          </a:fillRef>
+          <a:effectRef idx="1">
+            <a:schemeClr val="dk1"/>
+          </a:effectRef>
+          <a:fontRef idx="minor">
+            <a:schemeClr val="tx1"/>
+          </a:fontRef>
+        </p:style>
+      </p:cxnSp>
+      <p:pic>
+        <p:nvPicPr>
+          <p:cNvPr id="12" name="Graphic 11" descr="Sunset scene with solid fill">
+            <a:extLst>
+              <a:ext uri="{FF2B5EF4-FFF2-40B4-BE49-F238E27FC236}">
+                <a16:creationId xmlns:a16="http://schemas.microsoft.com/office/drawing/2014/main" id="{20FCA15A-7F5F-E96C-DD08-EEC7F7848C2C}"/>
+              </a:ext>
+            </a:extLst>
+          </p:cNvPr>
+          <p:cNvPicPr>
+            <a:picLocks noChangeAspect="1"/>
+          </p:cNvPicPr>
+          <p:nvPr/>
+        </p:nvPicPr>
+        <p:blipFill>
+          <a:blip r:embed="rId3">
+            <a:extLst>
+              <a:ext uri="{96DAC541-7B7A-43D3-8B79-37D633B846F1}">
+                <asvg:svgBlip xmlns:asvg="http://schemas.microsoft.com/office/drawing/2016/SVG/main" r:embed="rId4"/>
+              </a:ext>
+            </a:extLst>
+          </a:blip>
+          <a:stretch>
+            <a:fillRect/>
+          </a:stretch>
+        </p:blipFill>
+        <p:spPr>
+          <a:xfrm>
+            <a:off x="2496505" y="1366748"/>
+            <a:ext cx="374186" cy="374186"/>
+          </a:xfrm>
+          <a:prstGeom prst="rect">
+            <a:avLst/>
+          </a:prstGeom>
+        </p:spPr>
+      </p:pic>
+      <p:cxnSp>
+        <p:nvCxnSpPr>
+          <p:cNvPr id="13" name="Straight Connector 12">
+            <a:extLst>
+              <a:ext uri="{FF2B5EF4-FFF2-40B4-BE49-F238E27FC236}">
+                <a16:creationId xmlns:a16="http://schemas.microsoft.com/office/drawing/2014/main" id="{2826D1D0-BBA6-21C2-A595-6578B092917B}"/>
+              </a:ext>
+            </a:extLst>
+          </p:cNvPr>
+          <p:cNvCxnSpPr>
+            <a:cxnSpLocks/>
+          </p:cNvCxnSpPr>
+          <p:nvPr/>
+        </p:nvCxnSpPr>
+        <p:spPr>
+          <a:xfrm>
+            <a:off x="7702982" y="1405574"/>
+            <a:ext cx="0" cy="296535"/>
+          </a:xfrm>
+          <a:prstGeom prst="line">
+            <a:avLst/>
+          </a:prstGeom>
+        </p:spPr>
+        <p:style>
+          <a:lnRef idx="2">
+            <a:schemeClr val="dk1"/>
+          </a:lnRef>
+          <a:fillRef idx="0">
+            <a:schemeClr val="dk1"/>
+          </a:fillRef>
+          <a:effectRef idx="1">
+            <a:schemeClr val="dk1"/>
+          </a:effectRef>
+          <a:fontRef idx="minor">
+            <a:schemeClr val="tx1"/>
+          </a:fontRef>
+        </p:style>
+      </p:cxnSp>
+      <p:pic>
+        <p:nvPicPr>
+          <p:cNvPr id="15" name="Graphic 14" descr="Dim (Smaller Sun) with solid fill">
+            <a:extLst>
+              <a:ext uri="{FF2B5EF4-FFF2-40B4-BE49-F238E27FC236}">
+                <a16:creationId xmlns:a16="http://schemas.microsoft.com/office/drawing/2014/main" id="{25CB26C9-2361-2B99-3842-7080309F5609}"/>
+              </a:ext>
+            </a:extLst>
+          </p:cNvPr>
+          <p:cNvPicPr>
+            <a:picLocks noChangeAspect="1"/>
+          </p:cNvPicPr>
+          <p:nvPr/>
+        </p:nvPicPr>
+        <p:blipFill>
+          <a:blip r:embed="rId5">
+            <a:extLst>
+              <a:ext uri="{96DAC541-7B7A-43D3-8B79-37D633B846F1}">
+                <asvg:svgBlip xmlns:asvg="http://schemas.microsoft.com/office/drawing/2016/SVG/main" r:embed="rId6"/>
+              </a:ext>
+            </a:extLst>
+          </a:blip>
+          <a:stretch>
+            <a:fillRect/>
+          </a:stretch>
+        </p:blipFill>
+        <p:spPr>
+          <a:xfrm>
+            <a:off x="5355826" y="1383755"/>
+            <a:ext cx="445728" cy="357176"/>
+          </a:xfrm>
+          <a:prstGeom prst="rect">
+            <a:avLst/>
+          </a:prstGeom>
+        </p:spPr>
+      </p:pic>
+      <p:pic>
+        <p:nvPicPr>
+          <p:cNvPr id="16" name="Graphic 15" descr="Moon with solid fill">
+            <a:extLst>
+              <a:ext uri="{FF2B5EF4-FFF2-40B4-BE49-F238E27FC236}">
+                <a16:creationId xmlns:a16="http://schemas.microsoft.com/office/drawing/2014/main" id="{1CF5ED38-48B1-97E6-6163-293297603AE3}"/>
+              </a:ext>
+            </a:extLst>
+          </p:cNvPr>
+          <p:cNvPicPr>
+            <a:picLocks noChangeAspect="1"/>
+          </p:cNvPicPr>
+          <p:nvPr/>
+        </p:nvPicPr>
+        <p:blipFill>
+          <a:blip r:embed="rId7">
+            <a:extLst>
+              <a:ext uri="{96DAC541-7B7A-43D3-8B79-37D633B846F1}">
+                <asvg:svgBlip xmlns:asvg="http://schemas.microsoft.com/office/drawing/2016/SVG/main" r:embed="rId8"/>
+              </a:ext>
+            </a:extLst>
+          </a:blip>
+          <a:stretch>
+            <a:fillRect/>
+          </a:stretch>
+        </p:blipFill>
+        <p:spPr>
+          <a:xfrm>
+            <a:off x="7945345" y="1403277"/>
+            <a:ext cx="296536" cy="296536"/>
+          </a:xfrm>
+          <a:prstGeom prst="rect">
+            <a:avLst/>
+          </a:prstGeom>
+        </p:spPr>
+      </p:pic>
+    </p:spTree>
+    <p:extLst>
+      <p:ext uri="{BB962C8B-B14F-4D97-AF65-F5344CB8AC3E}">
+        <p14:creationId xmlns:p14="http://schemas.microsoft.com/office/powerpoint/2010/main" val="1904014805"/>
+      </p:ext>
+    </p:extLst>
+  </p:cSld>
+  <p:clrMapOvr>
+    <a:masterClrMapping/>
+  </p:clrMapOvr>
+</p:sld>
+</file>
+
+<file path=ppt/slides/slide8.xml><?xml version="1.0" encoding="utf-8"?>
+<p:sld xmlns:a="http://schemas.openxmlformats.org/drawingml/2006/main" xmlns:r="http://schemas.openxmlformats.org/officeDocument/2006/relationships" xmlns:p="http://schemas.openxmlformats.org/presentationml/2006/main">
+  <p:cSld>
+    <p:spTree>
+      <p:nvGrpSpPr>
+        <p:cNvPr id="1" name=""/>
+        <p:cNvGrpSpPr/>
+        <p:nvPr/>
+      </p:nvGrpSpPr>
+      <p:grpSpPr>
+        <a:xfrm>
+          <a:off x="0" y="0"/>
+          <a:ext cx="0" cy="0"/>
+          <a:chOff x="0" y="0"/>
+          <a:chExt cx="0" cy="0"/>
+        </a:xfrm>
+      </p:grpSpPr>
+      <p:pic>
+        <p:nvPicPr>
+          <p:cNvPr id="4" name="Picture 3">
+            <a:extLst>
+              <a:ext uri="{FF2B5EF4-FFF2-40B4-BE49-F238E27FC236}">
+                <a16:creationId xmlns:a16="http://schemas.microsoft.com/office/drawing/2014/main" id="{3E29D6A6-D834-9BA7-1C59-79E2074C7C61}"/>
+              </a:ext>
+            </a:extLst>
+          </p:cNvPr>
+          <p:cNvPicPr>
+            <a:picLocks noChangeAspect="1"/>
+          </p:cNvPicPr>
+          <p:nvPr/>
+        </p:nvPicPr>
+        <p:blipFill>
+          <a:blip r:embed="rId2"/>
+          <a:srcRect t="8748" b="16505"/>
+          <a:stretch/>
+        </p:blipFill>
+        <p:spPr>
+          <a:xfrm>
+            <a:off x="661398" y="1658471"/>
+            <a:ext cx="9557816" cy="4491318"/>
+          </a:xfrm>
+          <a:prstGeom prst="rect">
+            <a:avLst/>
+          </a:prstGeom>
+        </p:spPr>
+      </p:pic>
+      <p:sp>
+        <p:nvSpPr>
+          <p:cNvPr id="8" name="Rectangle 7">
+            <a:extLst>
+              <a:ext uri="{FF2B5EF4-FFF2-40B4-BE49-F238E27FC236}">
+                <a16:creationId xmlns:a16="http://schemas.microsoft.com/office/drawing/2014/main" id="{737D3D71-A354-CE22-66D7-334FC64CA4B8}"/>
+              </a:ext>
+            </a:extLst>
+          </p:cNvPr>
+          <p:cNvSpPr/>
+          <p:nvPr/>
+        </p:nvSpPr>
+        <p:spPr>
+          <a:xfrm flipH="1">
+            <a:off x="1716608" y="1405574"/>
+            <a:ext cx="6767635" cy="296535"/>
+          </a:xfrm>
+          <a:prstGeom prst="rect">
+            <a:avLst/>
+          </a:prstGeom>
+          <a:gradFill flip="none" rotWithShape="1">
+            <a:gsLst>
+              <a:gs pos="18000">
+                <a:srgbClr val="FF3A74">
+                  <a:alpha val="28235"/>
+                </a:srgbClr>
+              </a:gs>
+              <a:gs pos="96000">
+                <a:srgbClr val="150E22">
+                  <a:alpha val="78821"/>
+                </a:srgbClr>
+              </a:gs>
+              <a:gs pos="87000">
+                <a:srgbClr val="FFEAB5"/>
+              </a:gs>
+              <a:gs pos="37000">
+                <a:srgbClr val="FFEAB5"/>
+              </a:gs>
+            </a:gsLst>
+            <a:lin ang="10800000" scaled="1"/>
+            <a:tileRect/>
+          </a:gradFill>
+          <a:ln>
+            <a:noFill/>
+          </a:ln>
+        </p:spPr>
+        <p:style>
+          <a:lnRef idx="2">
+            <a:schemeClr val="accent1">
+              <a:shade val="15000"/>
+            </a:schemeClr>
+          </a:lnRef>
+          <a:fillRef idx="1">
+            <a:schemeClr val="accent1"/>
+          </a:fillRef>
+          <a:effectRef idx="0">
+            <a:schemeClr val="accent1"/>
+          </a:effectRef>
+          <a:fontRef idx="minor">
+            <a:schemeClr val="lt1"/>
+          </a:fontRef>
+        </p:style>
+        <p:txBody>
+          <a:bodyPr rtlCol="0" anchor="ctr"/>
+          <a:lstStyle/>
+          <a:p>
+            <a:pPr algn="ctr"/>
+            <a:endParaRPr lang="en-US" dirty="0"/>
+          </a:p>
+        </p:txBody>
+      </p:sp>
+      <p:cxnSp>
+        <p:nvCxnSpPr>
+          <p:cNvPr id="10" name="Straight Connector 9">
+            <a:extLst>
+              <a:ext uri="{FF2B5EF4-FFF2-40B4-BE49-F238E27FC236}">
+                <a16:creationId xmlns:a16="http://schemas.microsoft.com/office/drawing/2014/main" id="{6E349895-A86D-B330-664A-914DD46252CE}"/>
+              </a:ext>
+            </a:extLst>
+          </p:cNvPr>
+          <p:cNvCxnSpPr>
+            <a:cxnSpLocks/>
+          </p:cNvCxnSpPr>
+          <p:nvPr/>
+        </p:nvCxnSpPr>
+        <p:spPr>
+          <a:xfrm>
+            <a:off x="3900126" y="1405574"/>
+            <a:ext cx="0" cy="296535"/>
+          </a:xfrm>
+          <a:prstGeom prst="line">
+            <a:avLst/>
+          </a:prstGeom>
+        </p:spPr>
+        <p:style>
+          <a:lnRef idx="2">
+            <a:schemeClr val="dk1"/>
+          </a:lnRef>
+          <a:fillRef idx="0">
+            <a:schemeClr val="dk1"/>
+          </a:fillRef>
+          <a:effectRef idx="1">
+            <a:schemeClr val="dk1"/>
+          </a:effectRef>
+          <a:fontRef idx="minor">
+            <a:schemeClr val="tx1"/>
+          </a:fontRef>
+        </p:style>
+      </p:cxnSp>
+      <p:pic>
+        <p:nvPicPr>
+          <p:cNvPr id="12" name="Graphic 11" descr="Sunset scene with solid fill">
+            <a:extLst>
+              <a:ext uri="{FF2B5EF4-FFF2-40B4-BE49-F238E27FC236}">
+                <a16:creationId xmlns:a16="http://schemas.microsoft.com/office/drawing/2014/main" id="{20FCA15A-7F5F-E96C-DD08-EEC7F7848C2C}"/>
+              </a:ext>
+            </a:extLst>
+          </p:cNvPr>
+          <p:cNvPicPr>
+            <a:picLocks noChangeAspect="1"/>
+          </p:cNvPicPr>
+          <p:nvPr/>
+        </p:nvPicPr>
+        <p:blipFill>
+          <a:blip r:embed="rId3">
+            <a:extLst>
+              <a:ext uri="{96DAC541-7B7A-43D3-8B79-37D633B846F1}">
+                <asvg:svgBlip xmlns:asvg="http://schemas.microsoft.com/office/drawing/2016/SVG/main" r:embed="rId4"/>
+              </a:ext>
+            </a:extLst>
+          </a:blip>
+          <a:stretch>
+            <a:fillRect/>
+          </a:stretch>
+        </p:blipFill>
+        <p:spPr>
+          <a:xfrm>
+            <a:off x="2496505" y="1366748"/>
+            <a:ext cx="374186" cy="374186"/>
+          </a:xfrm>
+          <a:prstGeom prst="rect">
+            <a:avLst/>
+          </a:prstGeom>
+        </p:spPr>
+      </p:pic>
+      <p:cxnSp>
+        <p:nvCxnSpPr>
+          <p:cNvPr id="13" name="Straight Connector 12">
+            <a:extLst>
+              <a:ext uri="{FF2B5EF4-FFF2-40B4-BE49-F238E27FC236}">
+                <a16:creationId xmlns:a16="http://schemas.microsoft.com/office/drawing/2014/main" id="{2826D1D0-BBA6-21C2-A595-6578B092917B}"/>
+              </a:ext>
+            </a:extLst>
+          </p:cNvPr>
+          <p:cNvCxnSpPr>
+            <a:cxnSpLocks/>
+          </p:cNvCxnSpPr>
+          <p:nvPr/>
+        </p:nvCxnSpPr>
+        <p:spPr>
+          <a:xfrm>
+            <a:off x="7702982" y="1405574"/>
+            <a:ext cx="0" cy="296535"/>
+          </a:xfrm>
+          <a:prstGeom prst="line">
+            <a:avLst/>
+          </a:prstGeom>
+        </p:spPr>
+        <p:style>
+          <a:lnRef idx="2">
+            <a:schemeClr val="dk1"/>
+          </a:lnRef>
+          <a:fillRef idx="0">
+            <a:schemeClr val="dk1"/>
+          </a:fillRef>
+          <a:effectRef idx="1">
+            <a:schemeClr val="dk1"/>
+          </a:effectRef>
+          <a:fontRef idx="minor">
+            <a:schemeClr val="tx1"/>
+          </a:fontRef>
+        </p:style>
+      </p:cxnSp>
+      <p:pic>
+        <p:nvPicPr>
+          <p:cNvPr id="15" name="Graphic 14" descr="Dim (Smaller Sun) with solid fill">
+            <a:extLst>
+              <a:ext uri="{FF2B5EF4-FFF2-40B4-BE49-F238E27FC236}">
+                <a16:creationId xmlns:a16="http://schemas.microsoft.com/office/drawing/2014/main" id="{25CB26C9-2361-2B99-3842-7080309F5609}"/>
+              </a:ext>
+            </a:extLst>
+          </p:cNvPr>
+          <p:cNvPicPr>
+            <a:picLocks noChangeAspect="1"/>
+          </p:cNvPicPr>
+          <p:nvPr/>
+        </p:nvPicPr>
+        <p:blipFill>
+          <a:blip r:embed="rId5">
+            <a:extLst>
+              <a:ext uri="{96DAC541-7B7A-43D3-8B79-37D633B846F1}">
+                <asvg:svgBlip xmlns:asvg="http://schemas.microsoft.com/office/drawing/2016/SVG/main" r:embed="rId6"/>
+              </a:ext>
+            </a:extLst>
+          </a:blip>
+          <a:stretch>
+            <a:fillRect/>
+          </a:stretch>
+        </p:blipFill>
+        <p:spPr>
+          <a:xfrm>
+            <a:off x="5355826" y="1383755"/>
+            <a:ext cx="445728" cy="357176"/>
+          </a:xfrm>
+          <a:prstGeom prst="rect">
+            <a:avLst/>
+          </a:prstGeom>
+        </p:spPr>
+      </p:pic>
+      <p:pic>
+        <p:nvPicPr>
+          <p:cNvPr id="16" name="Graphic 15" descr="Moon with solid fill">
+            <a:extLst>
+              <a:ext uri="{FF2B5EF4-FFF2-40B4-BE49-F238E27FC236}">
+                <a16:creationId xmlns:a16="http://schemas.microsoft.com/office/drawing/2014/main" id="{1CF5ED38-48B1-97E6-6163-293297603AE3}"/>
+              </a:ext>
+            </a:extLst>
+          </p:cNvPr>
+          <p:cNvPicPr>
+            <a:picLocks noChangeAspect="1"/>
+          </p:cNvPicPr>
+          <p:nvPr/>
+        </p:nvPicPr>
+        <p:blipFill>
+          <a:blip r:embed="rId7">
+            <a:extLst>
+              <a:ext uri="{96DAC541-7B7A-43D3-8B79-37D633B846F1}">
+                <asvg:svgBlip xmlns:asvg="http://schemas.microsoft.com/office/drawing/2016/SVG/main" r:embed="rId8"/>
+              </a:ext>
+            </a:extLst>
+          </a:blip>
+          <a:stretch>
+            <a:fillRect/>
+          </a:stretch>
+        </p:blipFill>
+        <p:spPr>
+          <a:xfrm>
+            <a:off x="7945345" y="1403277"/>
+            <a:ext cx="296536" cy="296536"/>
+          </a:xfrm>
+          <a:prstGeom prst="rect">
+            <a:avLst/>
+          </a:prstGeom>
+        </p:spPr>
+      </p:pic>
+    </p:spTree>
+    <p:extLst>
+      <p:ext uri="{BB962C8B-B14F-4D97-AF65-F5344CB8AC3E}">
+        <p14:creationId xmlns:p14="http://schemas.microsoft.com/office/powerpoint/2010/main" val="1772071899"/>
+      </p:ext>
+    </p:extLst>
+  </p:cSld>
+  <p:clrMapOvr>
+    <a:masterClrMapping/>
+  </p:clrMapOvr>
+</p:sld>
+</file>
+
+<file path=ppt/slides/slide9.xml><?xml version="1.0" encoding="utf-8"?>
+<p:sld xmlns:a="http://schemas.openxmlformats.org/drawingml/2006/main" xmlns:r="http://schemas.openxmlformats.org/officeDocument/2006/relationships" xmlns:p="http://schemas.openxmlformats.org/presentationml/2006/main">
+  <p:cSld>
+    <p:spTree>
+      <p:nvGrpSpPr>
+        <p:cNvPr id="1" name=""/>
+        <p:cNvGrpSpPr/>
+        <p:nvPr/>
+      </p:nvGrpSpPr>
+      <p:grpSpPr>
+        <a:xfrm>
+          <a:off x="0" y="0"/>
+          <a:ext cx="0" cy="0"/>
+          <a:chOff x="0" y="0"/>
+          <a:chExt cx="0" cy="0"/>
+        </a:xfrm>
+      </p:grpSpPr>
+      <p:pic>
+        <p:nvPicPr>
+          <p:cNvPr id="4" name="Picture 3">
+            <a:extLst>
+              <a:ext uri="{FF2B5EF4-FFF2-40B4-BE49-F238E27FC236}">
+                <a16:creationId xmlns:a16="http://schemas.microsoft.com/office/drawing/2014/main" id="{3E29D6A6-D834-9BA7-1C59-79E2074C7C61}"/>
+              </a:ext>
+            </a:extLst>
+          </p:cNvPr>
+          <p:cNvPicPr>
+            <a:picLocks noChangeAspect="1"/>
+          </p:cNvPicPr>
+          <p:nvPr/>
+        </p:nvPicPr>
+        <p:blipFill>
+          <a:blip r:embed="rId2"/>
+          <a:srcRect t="8748" b="16505"/>
+          <a:stretch/>
+        </p:blipFill>
+        <p:spPr>
+          <a:xfrm>
+            <a:off x="661398" y="1658471"/>
+            <a:ext cx="9557816" cy="4491318"/>
+          </a:xfrm>
+          <a:prstGeom prst="rect">
+            <a:avLst/>
+          </a:prstGeom>
+        </p:spPr>
+      </p:pic>
+      <p:sp>
+        <p:nvSpPr>
+          <p:cNvPr id="2" name="Rectangle 1">
+            <a:extLst>
+              <a:ext uri="{FF2B5EF4-FFF2-40B4-BE49-F238E27FC236}">
+                <a16:creationId xmlns:a16="http://schemas.microsoft.com/office/drawing/2014/main" id="{C818E2F9-12CF-0794-521B-410EDBB7F9F6}"/>
+              </a:ext>
+            </a:extLst>
+          </p:cNvPr>
+          <p:cNvSpPr/>
+          <p:nvPr/>
+        </p:nvSpPr>
+        <p:spPr>
+          <a:xfrm flipH="1">
+            <a:off x="1684427" y="5853254"/>
+            <a:ext cx="6767635" cy="296535"/>
+          </a:xfrm>
+          <a:prstGeom prst="rect">
+            <a:avLst/>
+          </a:prstGeom>
+          <a:gradFill flip="none" rotWithShape="1">
+            <a:gsLst>
+              <a:gs pos="18000">
+                <a:srgbClr val="FF3A74">
+                  <a:alpha val="28235"/>
+                </a:srgbClr>
+              </a:gs>
+              <a:gs pos="96000">
+                <a:srgbClr val="150E22">
+                  <a:alpha val="78821"/>
+                </a:srgbClr>
+              </a:gs>
+              <a:gs pos="86000">
+                <a:srgbClr val="FFEAB5">
+                  <a:alpha val="57446"/>
+                </a:srgbClr>
+              </a:gs>
+              <a:gs pos="37000">
+                <a:srgbClr val="FFEAB5">
+                  <a:alpha val="46000"/>
+                </a:srgbClr>
+              </a:gs>
+            </a:gsLst>
+            <a:lin ang="10800000" scaled="1"/>
+            <a:tileRect/>
+          </a:gradFill>
+          <a:ln>
+            <a:noFill/>
+          </a:ln>
+        </p:spPr>
+        <p:style>
+          <a:lnRef idx="2">
+            <a:schemeClr val="accent1">
+              <a:shade val="15000"/>
+            </a:schemeClr>
+          </a:lnRef>
+          <a:fillRef idx="1">
+            <a:schemeClr val="accent1"/>
+          </a:fillRef>
+          <a:effectRef idx="0">
+            <a:schemeClr val="accent1"/>
+          </a:effectRef>
+          <a:fontRef idx="minor">
+            <a:schemeClr val="lt1"/>
+          </a:fontRef>
+        </p:style>
+        <p:txBody>
+          <a:bodyPr rtlCol="0" anchor="ctr"/>
+          <a:lstStyle/>
+          <a:p>
+            <a:pPr algn="ctr"/>
+            <a:endParaRPr lang="en-US" dirty="0"/>
+          </a:p>
+        </p:txBody>
+      </p:sp>
+      <p:cxnSp>
+        <p:nvCxnSpPr>
+          <p:cNvPr id="3" name="Straight Connector 2">
+            <a:extLst>
+              <a:ext uri="{FF2B5EF4-FFF2-40B4-BE49-F238E27FC236}">
+                <a16:creationId xmlns:a16="http://schemas.microsoft.com/office/drawing/2014/main" id="{69B6E18E-5BBA-CF0F-FAF7-C43177CAE4BE}"/>
+              </a:ext>
+            </a:extLst>
+          </p:cNvPr>
+          <p:cNvCxnSpPr>
+            <a:cxnSpLocks/>
+          </p:cNvCxnSpPr>
+          <p:nvPr/>
+        </p:nvCxnSpPr>
+        <p:spPr>
+          <a:xfrm>
+            <a:off x="3900126" y="5832295"/>
+            <a:ext cx="0" cy="296535"/>
+          </a:xfrm>
+          <a:prstGeom prst="line">
+            <a:avLst/>
+          </a:prstGeom>
+        </p:spPr>
+        <p:style>
+          <a:lnRef idx="2">
+            <a:schemeClr val="dk1"/>
+          </a:lnRef>
+          <a:fillRef idx="0">
+            <a:schemeClr val="dk1"/>
+          </a:fillRef>
+          <a:effectRef idx="1">
+            <a:schemeClr val="dk1"/>
+          </a:effectRef>
+          <a:fontRef idx="minor">
+            <a:schemeClr val="tx1"/>
+          </a:fontRef>
+        </p:style>
+      </p:cxnSp>
+      <p:cxnSp>
+        <p:nvCxnSpPr>
+          <p:cNvPr id="7" name="Straight Connector 6">
+            <a:extLst>
+              <a:ext uri="{FF2B5EF4-FFF2-40B4-BE49-F238E27FC236}">
+                <a16:creationId xmlns:a16="http://schemas.microsoft.com/office/drawing/2014/main" id="{678DA2FA-6DB3-BEC2-015C-8C38DF5CC658}"/>
+              </a:ext>
+            </a:extLst>
+          </p:cNvPr>
+          <p:cNvCxnSpPr>
+            <a:cxnSpLocks/>
+          </p:cNvCxnSpPr>
+          <p:nvPr/>
+        </p:nvCxnSpPr>
+        <p:spPr>
+          <a:xfrm>
+            <a:off x="7496766" y="5832294"/>
+            <a:ext cx="0" cy="296535"/>
+          </a:xfrm>
+          <a:prstGeom prst="line">
+            <a:avLst/>
+          </a:prstGeom>
+        </p:spPr>
+        <p:style>
+          <a:lnRef idx="2">
+            <a:schemeClr val="dk1"/>
+          </a:lnRef>
+          <a:fillRef idx="0">
+            <a:schemeClr val="dk1"/>
+          </a:fillRef>
+          <a:effectRef idx="1">
+            <a:schemeClr val="dk1"/>
+          </a:effectRef>
+          <a:fontRef idx="minor">
+            <a:schemeClr val="tx1"/>
+          </a:fontRef>
+        </p:style>
+      </p:cxnSp>
+      <p:pic>
+        <p:nvPicPr>
+          <p:cNvPr id="11" name="Graphic 10" descr="Sunset scene with solid fill">
+            <a:extLst>
+              <a:ext uri="{FF2B5EF4-FFF2-40B4-BE49-F238E27FC236}">
+                <a16:creationId xmlns:a16="http://schemas.microsoft.com/office/drawing/2014/main" id="{4DB22646-A6B7-6F73-E62F-FFDDCCB1A7F7}"/>
+              </a:ext>
+            </a:extLst>
+          </p:cNvPr>
+          <p:cNvPicPr>
+            <a:picLocks noChangeAspect="1"/>
+          </p:cNvPicPr>
+          <p:nvPr/>
+        </p:nvPicPr>
+        <p:blipFill>
+          <a:blip r:embed="rId3">
+            <a:extLst>
+              <a:ext uri="{96DAC541-7B7A-43D3-8B79-37D633B846F1}">
+                <asvg:svgBlip xmlns:asvg="http://schemas.microsoft.com/office/drawing/2016/SVG/main" r:embed="rId4"/>
+              </a:ext>
+            </a:extLst>
+          </a:blip>
+          <a:stretch>
+            <a:fillRect/>
+          </a:stretch>
+        </p:blipFill>
+        <p:spPr>
+          <a:xfrm>
+            <a:off x="2570645" y="6102019"/>
+            <a:ext cx="374186" cy="374186"/>
+          </a:xfrm>
+          <a:prstGeom prst="rect">
+            <a:avLst/>
+          </a:prstGeom>
+        </p:spPr>
+      </p:pic>
+      <p:pic>
+        <p:nvPicPr>
+          <p:cNvPr id="14" name="Graphic 13" descr="Dim (Smaller Sun) with solid fill">
+            <a:extLst>
+              <a:ext uri="{FF2B5EF4-FFF2-40B4-BE49-F238E27FC236}">
+                <a16:creationId xmlns:a16="http://schemas.microsoft.com/office/drawing/2014/main" id="{35FF74F9-B20D-3C3D-0F50-30602102C4C8}"/>
+              </a:ext>
+            </a:extLst>
+          </p:cNvPr>
+          <p:cNvPicPr>
+            <a:picLocks noChangeAspect="1"/>
+          </p:cNvPicPr>
+          <p:nvPr/>
+        </p:nvPicPr>
+        <p:blipFill>
+          <a:blip r:embed="rId5">
+            <a:extLst>
+              <a:ext uri="{96DAC541-7B7A-43D3-8B79-37D633B846F1}">
+                <asvg:svgBlip xmlns:asvg="http://schemas.microsoft.com/office/drawing/2016/SVG/main" r:embed="rId6"/>
+              </a:ext>
+            </a:extLst>
+          </a:blip>
+          <a:stretch>
+            <a:fillRect/>
+          </a:stretch>
+        </p:blipFill>
+        <p:spPr>
+          <a:xfrm>
+            <a:off x="5355826" y="6128829"/>
+            <a:ext cx="445728" cy="357176"/>
+          </a:xfrm>
+          <a:prstGeom prst="rect">
+            <a:avLst/>
+          </a:prstGeom>
+        </p:spPr>
+      </p:pic>
+      <p:pic>
+        <p:nvPicPr>
+          <p:cNvPr id="18" name="Graphic 17" descr="Moon with solid fill">
+            <a:extLst>
+              <a:ext uri="{FF2B5EF4-FFF2-40B4-BE49-F238E27FC236}">
+                <a16:creationId xmlns:a16="http://schemas.microsoft.com/office/drawing/2014/main" id="{B1B97E20-35E7-72A6-1139-8F7ABC0DCA7C}"/>
+              </a:ext>
+            </a:extLst>
+          </p:cNvPr>
+          <p:cNvPicPr>
+            <a:picLocks noChangeAspect="1"/>
+          </p:cNvPicPr>
+          <p:nvPr/>
+        </p:nvPicPr>
+        <p:blipFill>
+          <a:blip r:embed="rId7">
+            <a:extLst>
+              <a:ext uri="{96DAC541-7B7A-43D3-8B79-37D633B846F1}">
+                <asvg:svgBlip xmlns:asvg="http://schemas.microsoft.com/office/drawing/2016/SVG/main" r:embed="rId8"/>
+              </a:ext>
+            </a:extLst>
+          </a:blip>
+          <a:stretch>
+            <a:fillRect/>
+          </a:stretch>
+        </p:blipFill>
+        <p:spPr>
+          <a:xfrm>
+            <a:off x="7916013" y="6189469"/>
+            <a:ext cx="296536" cy="296536"/>
+          </a:xfrm>
+          <a:prstGeom prst="rect">
+            <a:avLst/>
+          </a:prstGeom>
+        </p:spPr>
+      </p:pic>
+    </p:spTree>
+    <p:extLst>
+      <p:ext uri="{BB962C8B-B14F-4D97-AF65-F5344CB8AC3E}">
+        <p14:creationId xmlns:p14="http://schemas.microsoft.com/office/powerpoint/2010/main" val="3169471280"/>
       </p:ext>
     </p:extLst>
   </p:cSld>

</xml_diff>

<commit_message>
Updating the heat maps plots and gams results
</commit_message>
<xml_diff>
--- a/K4S_key_scripts/K4S_DA_Aims/K4S_DA_A2/K4S_DA_A2_HM_Day_Plot.pptx
+++ b/K4S_key_scripts/K4S_DA_Aims/K4S_DA_A2/K4S_DA_A2_HM_Day_Plot.pptx
@@ -8,15 +8,15 @@
     <p:notesMasterId r:id="rId14"/>
   </p:notesMasterIdLst>
   <p:sldIdLst>
-    <p:sldId id="256" r:id="rId2"/>
-    <p:sldId id="257" r:id="rId3"/>
-    <p:sldId id="258" r:id="rId4"/>
-    <p:sldId id="259" r:id="rId5"/>
-    <p:sldId id="260" r:id="rId6"/>
-    <p:sldId id="261" r:id="rId7"/>
-    <p:sldId id="264" r:id="rId8"/>
-    <p:sldId id="263" r:id="rId9"/>
-    <p:sldId id="265" r:id="rId10"/>
+    <p:sldId id="257" r:id="rId2"/>
+    <p:sldId id="263" r:id="rId3"/>
+    <p:sldId id="265" r:id="rId4"/>
+    <p:sldId id="258" r:id="rId5"/>
+    <p:sldId id="256" r:id="rId6"/>
+    <p:sldId id="259" r:id="rId7"/>
+    <p:sldId id="260" r:id="rId8"/>
+    <p:sldId id="261" r:id="rId9"/>
+    <p:sldId id="264" r:id="rId10"/>
     <p:sldId id="266" r:id="rId11"/>
     <p:sldId id="267" r:id="rId12"/>
     <p:sldId id="268" r:id="rId13"/>
@@ -208,7 +208,7 @@
           <a:p>
             <a:fld id="{110C6599-B3B8-8842-AE19-99341E40C7FB}" type="datetimeFigureOut">
               <a:rPr lang="en-US" smtClean="0"/>
-              <a:t>8/14/24</a:t>
+              <a:t>8/19/24</a:t>
             </a:fld>
             <a:endParaRPr lang="en-US"/>
           </a:p>
@@ -541,7 +541,7 @@
           <a:p>
             <a:fld id="{ECF94E0E-7B1D-6242-9B71-6C021838A385}" type="slidenum">
               <a:rPr lang="en-US" smtClean="0"/>
-              <a:t>2</a:t>
+              <a:t>1</a:t>
             </a:fld>
             <a:endParaRPr lang="en-US"/>
           </a:p>
@@ -625,7 +625,7 @@
           <a:p>
             <a:fld id="{ECF94E0E-7B1D-6242-9B71-6C021838A385}" type="slidenum">
               <a:rPr lang="en-US" smtClean="0"/>
-              <a:t>3</a:t>
+              <a:t>4</a:t>
             </a:fld>
             <a:endParaRPr lang="en-US"/>
           </a:p>
@@ -793,7 +793,7 @@
           <a:p>
             <a:fld id="{E1A8E377-B974-3D4F-A478-7E3B21C33EA7}" type="datetimeFigureOut">
               <a:rPr lang="en-US" smtClean="0"/>
-              <a:t>8/14/24</a:t>
+              <a:t>8/19/24</a:t>
             </a:fld>
             <a:endParaRPr lang="en-US"/>
           </a:p>
@@ -993,7 +993,7 @@
           <a:p>
             <a:fld id="{E1A8E377-B974-3D4F-A478-7E3B21C33EA7}" type="datetimeFigureOut">
               <a:rPr lang="en-US" smtClean="0"/>
-              <a:t>8/14/24</a:t>
+              <a:t>8/19/24</a:t>
             </a:fld>
             <a:endParaRPr lang="en-US"/>
           </a:p>
@@ -1203,7 +1203,7 @@
           <a:p>
             <a:fld id="{E1A8E377-B974-3D4F-A478-7E3B21C33EA7}" type="datetimeFigureOut">
               <a:rPr lang="en-US" smtClean="0"/>
-              <a:t>8/14/24</a:t>
+              <a:t>8/19/24</a:t>
             </a:fld>
             <a:endParaRPr lang="en-US"/>
           </a:p>
@@ -1403,7 +1403,7 @@
           <a:p>
             <a:fld id="{E1A8E377-B974-3D4F-A478-7E3B21C33EA7}" type="datetimeFigureOut">
               <a:rPr lang="en-US" smtClean="0"/>
-              <a:t>8/14/24</a:t>
+              <a:t>8/19/24</a:t>
             </a:fld>
             <a:endParaRPr lang="en-US"/>
           </a:p>
@@ -1679,7 +1679,7 @@
           <a:p>
             <a:fld id="{E1A8E377-B974-3D4F-A478-7E3B21C33EA7}" type="datetimeFigureOut">
               <a:rPr lang="en-US" smtClean="0"/>
-              <a:t>8/14/24</a:t>
+              <a:t>8/19/24</a:t>
             </a:fld>
             <a:endParaRPr lang="en-US"/>
           </a:p>
@@ -1947,7 +1947,7 @@
           <a:p>
             <a:fld id="{E1A8E377-B974-3D4F-A478-7E3B21C33EA7}" type="datetimeFigureOut">
               <a:rPr lang="en-US" smtClean="0"/>
-              <a:t>8/14/24</a:t>
+              <a:t>8/19/24</a:t>
             </a:fld>
             <a:endParaRPr lang="en-US"/>
           </a:p>
@@ -2362,7 +2362,7 @@
           <a:p>
             <a:fld id="{E1A8E377-B974-3D4F-A478-7E3B21C33EA7}" type="datetimeFigureOut">
               <a:rPr lang="en-US" smtClean="0"/>
-              <a:t>8/14/24</a:t>
+              <a:t>8/19/24</a:t>
             </a:fld>
             <a:endParaRPr lang="en-US"/>
           </a:p>
@@ -2504,7 +2504,7 @@
           <a:p>
             <a:fld id="{E1A8E377-B974-3D4F-A478-7E3B21C33EA7}" type="datetimeFigureOut">
               <a:rPr lang="en-US" smtClean="0"/>
-              <a:t>8/14/24</a:t>
+              <a:t>8/19/24</a:t>
             </a:fld>
             <a:endParaRPr lang="en-US"/>
           </a:p>
@@ -2617,7 +2617,7 @@
           <a:p>
             <a:fld id="{E1A8E377-B974-3D4F-A478-7E3B21C33EA7}" type="datetimeFigureOut">
               <a:rPr lang="en-US" smtClean="0"/>
-              <a:t>8/14/24</a:t>
+              <a:t>8/19/24</a:t>
             </a:fld>
             <a:endParaRPr lang="en-US"/>
           </a:p>
@@ -2930,7 +2930,7 @@
           <a:p>
             <a:fld id="{E1A8E377-B974-3D4F-A478-7E3B21C33EA7}" type="datetimeFigureOut">
               <a:rPr lang="en-US" smtClean="0"/>
-              <a:t>8/14/24</a:t>
+              <a:t>8/19/24</a:t>
             </a:fld>
             <a:endParaRPr lang="en-US"/>
           </a:p>
@@ -3219,7 +3219,7 @@
           <a:p>
             <a:fld id="{E1A8E377-B974-3D4F-A478-7E3B21C33EA7}" type="datetimeFigureOut">
               <a:rPr lang="en-US" smtClean="0"/>
-              <a:t>8/14/24</a:t>
+              <a:t>8/19/24</a:t>
             </a:fld>
             <a:endParaRPr lang="en-US"/>
           </a:p>
@@ -3462,7 +3462,7 @@
           <a:p>
             <a:fld id="{E1A8E377-B974-3D4F-A478-7E3B21C33EA7}" type="datetimeFigureOut">
               <a:rPr lang="en-US" smtClean="0"/>
-              <a:t>8/14/24</a:t>
+              <a:t>8/19/24</a:t>
             </a:fld>
             <a:endParaRPr lang="en-US"/>
           </a:p>
@@ -3881,40 +3881,10 @@
       </p:grpSpPr>
       <p:pic>
         <p:nvPicPr>
-          <p:cNvPr id="19" name="Picture 18">
-            <a:extLst>
-              <a:ext uri="{FF2B5EF4-FFF2-40B4-BE49-F238E27FC236}">
-                <a16:creationId xmlns:a16="http://schemas.microsoft.com/office/drawing/2014/main" id="{C4FC0F62-846D-7671-9F45-24E8EEB39857}"/>
-              </a:ext>
-            </a:extLst>
-          </p:cNvPr>
-          <p:cNvPicPr>
-            <a:picLocks noChangeAspect="1"/>
-          </p:cNvPicPr>
-          <p:nvPr/>
-        </p:nvPicPr>
-        <p:blipFill>
-          <a:blip r:embed="rId2"/>
-          <a:stretch>
-            <a:fillRect/>
-          </a:stretch>
-        </p:blipFill>
-        <p:spPr>
-          <a:xfrm>
-            <a:off x="5759450" y="6591080"/>
-            <a:ext cx="673100" cy="165100"/>
-          </a:xfrm>
-          <a:prstGeom prst="rect">
-            <a:avLst/>
-          </a:prstGeom>
-        </p:spPr>
-      </p:pic>
-      <p:pic>
-        <p:nvPicPr>
-          <p:cNvPr id="21" name="Picture 20" descr="A graph of different colors&#10;&#10;Description automatically generated with medium confidence">
-            <a:extLst>
-              <a:ext uri="{FF2B5EF4-FFF2-40B4-BE49-F238E27FC236}">
-                <a16:creationId xmlns:a16="http://schemas.microsoft.com/office/drawing/2014/main" id="{C7CEBF98-F04C-3A49-688A-52BAEF93789E}"/>
+          <p:cNvPr id="5" name="Picture 4" descr="A graph of a number of data&#10;&#10;Description automatically generated with medium confidence">
+            <a:extLst>
+              <a:ext uri="{FF2B5EF4-FFF2-40B4-BE49-F238E27FC236}">
+                <a16:creationId xmlns:a16="http://schemas.microsoft.com/office/drawing/2014/main" id="{227F74A0-A0AE-61DC-409D-F791AC0BD11B}"/>
               </a:ext>
             </a:extLst>
           </p:cNvPr>
@@ -3931,28 +3901,20 @@
         </p:blipFill>
         <p:spPr>
           <a:xfrm>
-            <a:off x="995098" y="571224"/>
-            <a:ext cx="7772400" cy="5181600"/>
+            <a:off x="631438" y="325120"/>
+            <a:ext cx="9486619" cy="5963920"/>
           </a:xfrm>
           <a:prstGeom prst="rect">
             <a:avLst/>
           </a:prstGeom>
-          <a:solidFill>
-            <a:schemeClr val="bg1"/>
-          </a:solidFill>
-          <a:ln>
-            <a:solidFill>
-              <a:schemeClr val="bg1"/>
-            </a:solidFill>
-          </a:ln>
         </p:spPr>
       </p:pic>
       <p:sp>
         <p:nvSpPr>
-          <p:cNvPr id="22" name="Left Brace 21">
-            <a:extLst>
-              <a:ext uri="{FF2B5EF4-FFF2-40B4-BE49-F238E27FC236}">
-                <a16:creationId xmlns:a16="http://schemas.microsoft.com/office/drawing/2014/main" id="{80C386C9-99D1-83F7-6073-CB3D34F553A9}"/>
+          <p:cNvPr id="6" name="Left Brace 5">
+            <a:extLst>
+              <a:ext uri="{FF2B5EF4-FFF2-40B4-BE49-F238E27FC236}">
+                <a16:creationId xmlns:a16="http://schemas.microsoft.com/office/drawing/2014/main" id="{0BBEEB1A-FE7C-A702-DC5D-11606775C085}"/>
               </a:ext>
             </a:extLst>
           </p:cNvPr>
@@ -3961,8 +3923,8 @@
         </p:nvSpPr>
         <p:spPr>
           <a:xfrm rot="16200000">
-            <a:off x="2467351" y="4311728"/>
-            <a:ext cx="145118" cy="1945827"/>
+            <a:off x="2580745" y="4446812"/>
+            <a:ext cx="140024" cy="2187399"/>
           </a:xfrm>
           <a:prstGeom prst="leftBrace">
             <a:avLst/>
@@ -3993,10 +3955,10 @@
       </p:sp>
       <p:sp>
         <p:nvSpPr>
-          <p:cNvPr id="23" name="Left Brace 22">
-            <a:extLst>
-              <a:ext uri="{FF2B5EF4-FFF2-40B4-BE49-F238E27FC236}">
-                <a16:creationId xmlns:a16="http://schemas.microsoft.com/office/drawing/2014/main" id="{549B9D75-97CC-6E3A-F7CF-69C820AB7CAF}"/>
+          <p:cNvPr id="7" name="Left Brace 6">
+            <a:extLst>
+              <a:ext uri="{FF2B5EF4-FFF2-40B4-BE49-F238E27FC236}">
+                <a16:creationId xmlns:a16="http://schemas.microsoft.com/office/drawing/2014/main" id="{481C8B53-BA2E-D509-A78C-AEC720DEBEAE}"/>
               </a:ext>
             </a:extLst>
           </p:cNvPr>
@@ -4005,8 +3967,8 @@
         </p:nvSpPr>
         <p:spPr>
           <a:xfrm rot="16200000">
-            <a:off x="5116662" y="3615863"/>
-            <a:ext cx="145119" cy="3337557"/>
+            <a:off x="5607829" y="3646387"/>
+            <a:ext cx="106233" cy="3822029"/>
           </a:xfrm>
           <a:prstGeom prst="leftBrace">
             <a:avLst/>
@@ -4037,10 +3999,10 @@
       </p:sp>
       <p:sp>
         <p:nvSpPr>
-          <p:cNvPr id="24" name="Left Brace 23">
-            <a:extLst>
-              <a:ext uri="{FF2B5EF4-FFF2-40B4-BE49-F238E27FC236}">
-                <a16:creationId xmlns:a16="http://schemas.microsoft.com/office/drawing/2014/main" id="{0DEB6670-1892-2FD8-6F2C-71C5B5ECCDDA}"/>
+          <p:cNvPr id="8" name="Left Brace 7">
+            <a:extLst>
+              <a:ext uri="{FF2B5EF4-FFF2-40B4-BE49-F238E27FC236}">
+                <a16:creationId xmlns:a16="http://schemas.microsoft.com/office/drawing/2014/main" id="{4A787FC7-0A08-E703-0C46-2087A7F7CFD1}"/>
               </a:ext>
             </a:extLst>
           </p:cNvPr>
@@ -4049,8 +4011,8 @@
         </p:nvSpPr>
         <p:spPr>
           <a:xfrm rot="16200000">
-            <a:off x="7164878" y="4935083"/>
-            <a:ext cx="145121" cy="688923"/>
+            <a:off x="7915971" y="5176942"/>
+            <a:ext cx="131896" cy="760918"/>
           </a:xfrm>
           <a:prstGeom prst="leftBrace">
             <a:avLst/>
@@ -4081,10 +4043,10 @@
       </p:sp>
       <p:pic>
         <p:nvPicPr>
-          <p:cNvPr id="25" name="Graphic 24" descr="Dim (Smaller Sun) with solid fill">
-            <a:extLst>
-              <a:ext uri="{FF2B5EF4-FFF2-40B4-BE49-F238E27FC236}">
-                <a16:creationId xmlns:a16="http://schemas.microsoft.com/office/drawing/2014/main" id="{34DF8DC7-E649-7CCD-DFE1-918609AD813A}"/>
+          <p:cNvPr id="9" name="Graphic 8" descr="Dim (Smaller Sun) with solid fill">
+            <a:extLst>
+              <a:ext uri="{FF2B5EF4-FFF2-40B4-BE49-F238E27FC236}">
+                <a16:creationId xmlns:a16="http://schemas.microsoft.com/office/drawing/2014/main" id="{7D8EF5E1-069B-45C9-EE4A-682E36CBC0B3}"/>
               </a:ext>
             </a:extLst>
           </p:cNvPr>
@@ -4107,7 +4069,7 @@
         </p:blipFill>
         <p:spPr>
           <a:xfrm>
-            <a:off x="4920291" y="5373294"/>
+            <a:off x="5406765" y="5623349"/>
             <a:ext cx="537859" cy="431004"/>
           </a:xfrm>
           <a:prstGeom prst="rect">
@@ -4117,10 +4079,10 @@
       </p:pic>
       <p:pic>
         <p:nvPicPr>
-          <p:cNvPr id="26" name="Graphic 25" descr="Sunset scene with solid fill">
-            <a:extLst>
-              <a:ext uri="{FF2B5EF4-FFF2-40B4-BE49-F238E27FC236}">
-                <a16:creationId xmlns:a16="http://schemas.microsoft.com/office/drawing/2014/main" id="{3E93944A-2568-2A47-F431-72806A93C41F}"/>
+          <p:cNvPr id="10" name="Graphic 9" descr="Sunset scene with solid fill">
+            <a:extLst>
+              <a:ext uri="{FF2B5EF4-FFF2-40B4-BE49-F238E27FC236}">
+                <a16:creationId xmlns:a16="http://schemas.microsoft.com/office/drawing/2014/main" id="{7CB8D037-1AB1-AADF-64EC-C4CA992D826C}"/>
               </a:ext>
             </a:extLst>
           </p:cNvPr>
@@ -4143,7 +4105,7 @@
         </p:blipFill>
         <p:spPr>
           <a:xfrm>
-            <a:off x="2315631" y="5357201"/>
+            <a:off x="2426478" y="5563870"/>
             <a:ext cx="448557" cy="448557"/>
           </a:xfrm>
           <a:prstGeom prst="rect">
@@ -4153,10 +4115,10 @@
       </p:pic>
       <p:pic>
         <p:nvPicPr>
-          <p:cNvPr id="27" name="Graphic 26" descr="Moon with solid fill">
-            <a:extLst>
-              <a:ext uri="{FF2B5EF4-FFF2-40B4-BE49-F238E27FC236}">
-                <a16:creationId xmlns:a16="http://schemas.microsoft.com/office/drawing/2014/main" id="{EFD9C02F-2080-BFB7-E1CB-F13A93B0D6FD}"/>
+          <p:cNvPr id="11" name="Graphic 10" descr="Moon with solid fill">
+            <a:extLst>
+              <a:ext uri="{FF2B5EF4-FFF2-40B4-BE49-F238E27FC236}">
+                <a16:creationId xmlns:a16="http://schemas.microsoft.com/office/drawing/2014/main" id="{E4F33E7E-9C44-4D78-72B6-3061202E0381}"/>
               </a:ext>
             </a:extLst>
           </p:cNvPr>
@@ -4179,7 +4141,7 @@
         </p:blipFill>
         <p:spPr>
           <a:xfrm>
-            <a:off x="7050052" y="5392701"/>
+            <a:off x="7845507" y="5659658"/>
             <a:ext cx="296536" cy="296536"/>
           </a:xfrm>
           <a:prstGeom prst="rect">
@@ -4187,63 +4149,35 @@
           </a:prstGeom>
         </p:spPr>
       </p:pic>
-      <p:pic>
-        <p:nvPicPr>
-          <p:cNvPr id="29" name="Picture 28" descr="A black text on a white background&#10;&#10;Description automatically generated">
-            <a:extLst>
-              <a:ext uri="{FF2B5EF4-FFF2-40B4-BE49-F238E27FC236}">
-                <a16:creationId xmlns:a16="http://schemas.microsoft.com/office/drawing/2014/main" id="{6A29DD22-27FA-802B-7F8A-AA43FD584472}"/>
-              </a:ext>
-            </a:extLst>
-          </p:cNvPr>
-          <p:cNvPicPr>
-            <a:picLocks noChangeAspect="1"/>
-          </p:cNvPicPr>
-          <p:nvPr/>
-        </p:nvPicPr>
-        <p:blipFill>
-          <a:blip r:embed="rId10"/>
-          <a:stretch>
-            <a:fillRect/>
-          </a:stretch>
-        </p:blipFill>
-        <p:spPr>
-          <a:xfrm>
-            <a:off x="4260104" y="5909868"/>
-            <a:ext cx="660187" cy="257216"/>
+      <p:sp>
+        <p:nvSpPr>
+          <p:cNvPr id="12" name="Rectangle 11">
+            <a:extLst>
+              <a:ext uri="{FF2B5EF4-FFF2-40B4-BE49-F238E27FC236}">
+                <a16:creationId xmlns:a16="http://schemas.microsoft.com/office/drawing/2014/main" id="{017D6BD9-E74F-E6D3-9865-D3EAFA2983B4}"/>
+              </a:ext>
+            </a:extLst>
+          </p:cNvPr>
+          <p:cNvSpPr/>
+          <p:nvPr/>
+        </p:nvSpPr>
+        <p:spPr>
+          <a:xfrm>
+            <a:off x="1557055" y="5292874"/>
+            <a:ext cx="2163376" cy="224636"/>
           </a:xfrm>
           <a:prstGeom prst="rect">
             <a:avLst/>
           </a:prstGeom>
-        </p:spPr>
-      </p:pic>
-      <p:sp>
-        <p:nvSpPr>
-          <p:cNvPr id="30" name="Rectangle 29">
-            <a:extLst>
-              <a:ext uri="{FF2B5EF4-FFF2-40B4-BE49-F238E27FC236}">
-                <a16:creationId xmlns:a16="http://schemas.microsoft.com/office/drawing/2014/main" id="{79237155-8A7D-E590-B6BB-5D3C07B713CE}"/>
-              </a:ext>
-            </a:extLst>
-          </p:cNvPr>
-          <p:cNvSpPr/>
-          <p:nvPr/>
-        </p:nvSpPr>
-        <p:spPr>
-          <a:xfrm>
-            <a:off x="4099389" y="5514245"/>
-            <a:ext cx="781909" cy="238579"/>
-          </a:xfrm>
-          <a:prstGeom prst="rect">
-            <a:avLst/>
-          </a:prstGeom>
           <a:solidFill>
-            <a:schemeClr val="bg1"/>
+            <a:schemeClr val="accent5">
+              <a:lumMod val="20000"/>
+              <a:lumOff val="80000"/>
+              <a:alpha val="52157"/>
+            </a:schemeClr>
           </a:solidFill>
           <a:ln>
-            <a:solidFill>
-              <a:schemeClr val="bg1"/>
-            </a:solidFill>
+            <a:noFill/>
           </a:ln>
         </p:spPr>
         <p:style>
@@ -4273,10 +4207,10 @@
       </p:sp>
       <p:sp>
         <p:nvSpPr>
-          <p:cNvPr id="31" name="Rectangle 30">
-            <a:extLst>
-              <a:ext uri="{FF2B5EF4-FFF2-40B4-BE49-F238E27FC236}">
-                <a16:creationId xmlns:a16="http://schemas.microsoft.com/office/drawing/2014/main" id="{D3DFB28C-4700-63CF-4944-8A397752612C}"/>
+          <p:cNvPr id="13" name="Rectangle 12">
+            <a:extLst>
+              <a:ext uri="{FF2B5EF4-FFF2-40B4-BE49-F238E27FC236}">
+                <a16:creationId xmlns:a16="http://schemas.microsoft.com/office/drawing/2014/main" id="{7C6E7294-54F4-170F-6196-A6D082ACD94E}"/>
               </a:ext>
             </a:extLst>
           </p:cNvPr>
@@ -4285,18 +4219,16 @@
         </p:nvSpPr>
         <p:spPr>
           <a:xfrm>
-            <a:off x="1566996" y="5113972"/>
-            <a:ext cx="1945828" cy="145120"/>
+            <a:off x="3779431" y="5292873"/>
+            <a:ext cx="3792529" cy="211413"/>
           </a:xfrm>
           <a:prstGeom prst="rect">
             <a:avLst/>
           </a:prstGeom>
           <a:solidFill>
-            <a:schemeClr val="accent5">
-              <a:lumMod val="20000"/>
-              <a:lumOff val="80000"/>
-              <a:alpha val="52157"/>
-            </a:schemeClr>
+            <a:srgbClr val="FFD579">
+              <a:alpha val="60000"/>
+            </a:srgbClr>
           </a:solidFill>
           <a:ln>
             <a:noFill/>
@@ -4329,10 +4261,10 @@
       </p:sp>
       <p:sp>
         <p:nvSpPr>
-          <p:cNvPr id="32" name="Rectangle 31">
-            <a:extLst>
-              <a:ext uri="{FF2B5EF4-FFF2-40B4-BE49-F238E27FC236}">
-                <a16:creationId xmlns:a16="http://schemas.microsoft.com/office/drawing/2014/main" id="{53474B5C-8ED7-D6E8-FD10-ECA191C76425}"/>
+          <p:cNvPr id="14" name="Rectangle 13">
+            <a:extLst>
+              <a:ext uri="{FF2B5EF4-FFF2-40B4-BE49-F238E27FC236}">
+                <a16:creationId xmlns:a16="http://schemas.microsoft.com/office/drawing/2014/main" id="{0768538D-ACE5-4E2A-F4AE-B716957D3955}"/>
               </a:ext>
             </a:extLst>
           </p:cNvPr>
@@ -4341,15 +4273,15 @@
         </p:nvSpPr>
         <p:spPr>
           <a:xfrm>
-            <a:off x="3520443" y="5134248"/>
-            <a:ext cx="3337557" cy="124844"/>
+            <a:off x="7625599" y="5306095"/>
+            <a:ext cx="712639" cy="211413"/>
           </a:xfrm>
           <a:prstGeom prst="rect">
             <a:avLst/>
           </a:prstGeom>
           <a:solidFill>
-            <a:srgbClr val="FFD579">
-              <a:alpha val="60000"/>
+            <a:srgbClr val="00287A">
+              <a:alpha val="49020"/>
             </a:srgbClr>
           </a:solidFill>
           <a:ln>
@@ -4381,64 +4313,10 @@
           </a:p>
         </p:txBody>
       </p:sp>
-      <p:sp>
-        <p:nvSpPr>
-          <p:cNvPr id="33" name="Rectangle 32">
-            <a:extLst>
-              <a:ext uri="{FF2B5EF4-FFF2-40B4-BE49-F238E27FC236}">
-                <a16:creationId xmlns:a16="http://schemas.microsoft.com/office/drawing/2014/main" id="{E15F381E-EB69-1C0C-6EFD-544538A54806}"/>
-              </a:ext>
-            </a:extLst>
-          </p:cNvPr>
-          <p:cNvSpPr/>
-          <p:nvPr/>
-        </p:nvSpPr>
-        <p:spPr>
-          <a:xfrm>
-            <a:off x="6892977" y="5146818"/>
-            <a:ext cx="688924" cy="121595"/>
-          </a:xfrm>
-          <a:prstGeom prst="rect">
-            <a:avLst/>
-          </a:prstGeom>
-          <a:solidFill>
-            <a:srgbClr val="002060">
-              <a:alpha val="60000"/>
-            </a:srgbClr>
-          </a:solidFill>
-          <a:ln>
-            <a:noFill/>
-          </a:ln>
-        </p:spPr>
-        <p:style>
-          <a:lnRef idx="2">
-            <a:schemeClr val="accent1">
-              <a:shade val="15000"/>
-            </a:schemeClr>
-          </a:lnRef>
-          <a:fillRef idx="1">
-            <a:schemeClr val="accent1"/>
-          </a:fillRef>
-          <a:effectRef idx="0">
-            <a:schemeClr val="accent1"/>
-          </a:effectRef>
-          <a:fontRef idx="minor">
-            <a:schemeClr val="lt1"/>
-          </a:fontRef>
-        </p:style>
-        <p:txBody>
-          <a:bodyPr rtlCol="0" anchor="ctr"/>
-          <a:lstStyle/>
-          <a:p>
-            <a:pPr algn="ctr"/>
-            <a:endParaRPr lang="en-US"/>
-          </a:p>
-        </p:txBody>
-      </p:sp>
     </p:spTree>
     <p:extLst>
       <p:ext uri="{BB962C8B-B14F-4D97-AF65-F5344CB8AC3E}">
-        <p14:creationId xmlns:p14="http://schemas.microsoft.com/office/powerpoint/2010/main" val="891490945"/>
+        <p14:creationId xmlns:p14="http://schemas.microsoft.com/office/powerpoint/2010/main" val="3835173375"/>
       </p:ext>
     </p:extLst>
   </p:cSld>
@@ -4675,8 +4553,8 @@
         </p:nvSpPr>
         <p:spPr>
           <a:xfrm flipH="1">
-            <a:off x="1704250" y="852690"/>
-            <a:ext cx="6767635" cy="422323"/>
+            <a:off x="1730475" y="852690"/>
+            <a:ext cx="6741409" cy="422323"/>
           </a:xfrm>
           <a:prstGeom prst="rect">
             <a:avLst/>
@@ -5274,172 +5152,10 @@
       </p:grpSpPr>
       <p:pic>
         <p:nvPicPr>
-          <p:cNvPr id="5" name="Picture 4" descr="A graph of a number of data&#10;&#10;Description automatically generated with medium confidence">
-            <a:extLst>
-              <a:ext uri="{FF2B5EF4-FFF2-40B4-BE49-F238E27FC236}">
-                <a16:creationId xmlns:a16="http://schemas.microsoft.com/office/drawing/2014/main" id="{227F74A0-A0AE-61DC-409D-F791AC0BD11B}"/>
-              </a:ext>
-            </a:extLst>
-          </p:cNvPr>
-          <p:cNvPicPr>
-            <a:picLocks noGrp="1" noRot="1" noChangeAspect="1" noMove="1" noResize="1" noEditPoints="1" noAdjustHandles="1" noChangeArrowheads="1" noChangeShapeType="1" noCrop="1"/>
-          </p:cNvPicPr>
-          <p:nvPr/>
-        </p:nvPicPr>
-        <p:blipFill>
-          <a:blip r:embed="rId3"/>
-          <a:stretch>
-            <a:fillRect/>
-          </a:stretch>
-        </p:blipFill>
-        <p:spPr>
-          <a:xfrm>
-            <a:off x="631438" y="325120"/>
-            <a:ext cx="9486619" cy="5963920"/>
-          </a:xfrm>
-          <a:prstGeom prst="rect">
-            <a:avLst/>
-          </a:prstGeom>
-        </p:spPr>
-      </p:pic>
-      <p:sp>
-        <p:nvSpPr>
-          <p:cNvPr id="6" name="Left Brace 5">
-            <a:extLst>
-              <a:ext uri="{FF2B5EF4-FFF2-40B4-BE49-F238E27FC236}">
-                <a16:creationId xmlns:a16="http://schemas.microsoft.com/office/drawing/2014/main" id="{0BBEEB1A-FE7C-A702-DC5D-11606775C085}"/>
-              </a:ext>
-            </a:extLst>
-          </p:cNvPr>
-          <p:cNvSpPr/>
-          <p:nvPr/>
-        </p:nvSpPr>
-        <p:spPr>
-          <a:xfrm rot="16200000">
-            <a:off x="2580745" y="4446812"/>
-            <a:ext cx="140024" cy="2187399"/>
-          </a:xfrm>
-          <a:prstGeom prst="leftBrace">
-            <a:avLst/>
-          </a:prstGeom>
-        </p:spPr>
-        <p:style>
-          <a:lnRef idx="2">
-            <a:schemeClr val="dk1"/>
-          </a:lnRef>
-          <a:fillRef idx="0">
-            <a:schemeClr val="dk1"/>
-          </a:fillRef>
-          <a:effectRef idx="1">
-            <a:schemeClr val="dk1"/>
-          </a:effectRef>
-          <a:fontRef idx="minor">
-            <a:schemeClr val="tx1"/>
-          </a:fontRef>
-        </p:style>
-        <p:txBody>
-          <a:bodyPr rtlCol="0" anchor="ctr"/>
-          <a:lstStyle/>
-          <a:p>
-            <a:pPr algn="ctr"/>
-            <a:endParaRPr lang="en-US"/>
-          </a:p>
-        </p:txBody>
-      </p:sp>
-      <p:sp>
-        <p:nvSpPr>
-          <p:cNvPr id="7" name="Left Brace 6">
-            <a:extLst>
-              <a:ext uri="{FF2B5EF4-FFF2-40B4-BE49-F238E27FC236}">
-                <a16:creationId xmlns:a16="http://schemas.microsoft.com/office/drawing/2014/main" id="{481C8B53-BA2E-D509-A78C-AEC720DEBEAE}"/>
-              </a:ext>
-            </a:extLst>
-          </p:cNvPr>
-          <p:cNvSpPr/>
-          <p:nvPr/>
-        </p:nvSpPr>
-        <p:spPr>
-          <a:xfrm rot="16200000">
-            <a:off x="5607829" y="3646387"/>
-            <a:ext cx="106233" cy="3822029"/>
-          </a:xfrm>
-          <a:prstGeom prst="leftBrace">
-            <a:avLst/>
-          </a:prstGeom>
-        </p:spPr>
-        <p:style>
-          <a:lnRef idx="2">
-            <a:schemeClr val="dk1"/>
-          </a:lnRef>
-          <a:fillRef idx="0">
-            <a:schemeClr val="dk1"/>
-          </a:fillRef>
-          <a:effectRef idx="1">
-            <a:schemeClr val="dk1"/>
-          </a:effectRef>
-          <a:fontRef idx="minor">
-            <a:schemeClr val="tx1"/>
-          </a:fontRef>
-        </p:style>
-        <p:txBody>
-          <a:bodyPr rtlCol="0" anchor="ctr"/>
-          <a:lstStyle/>
-          <a:p>
-            <a:pPr algn="ctr"/>
-            <a:endParaRPr lang="en-US" dirty="0"/>
-          </a:p>
-        </p:txBody>
-      </p:sp>
-      <p:sp>
-        <p:nvSpPr>
-          <p:cNvPr id="8" name="Left Brace 7">
-            <a:extLst>
-              <a:ext uri="{FF2B5EF4-FFF2-40B4-BE49-F238E27FC236}">
-                <a16:creationId xmlns:a16="http://schemas.microsoft.com/office/drawing/2014/main" id="{4A787FC7-0A08-E703-0C46-2087A7F7CFD1}"/>
-              </a:ext>
-            </a:extLst>
-          </p:cNvPr>
-          <p:cNvSpPr/>
-          <p:nvPr/>
-        </p:nvSpPr>
-        <p:spPr>
-          <a:xfrm rot="16200000">
-            <a:off x="7915971" y="5176942"/>
-            <a:ext cx="131896" cy="760918"/>
-          </a:xfrm>
-          <a:prstGeom prst="leftBrace">
-            <a:avLst/>
-          </a:prstGeom>
-        </p:spPr>
-        <p:style>
-          <a:lnRef idx="2">
-            <a:schemeClr val="dk1"/>
-          </a:lnRef>
-          <a:fillRef idx="0">
-            <a:schemeClr val="dk1"/>
-          </a:fillRef>
-          <a:effectRef idx="1">
-            <a:schemeClr val="dk1"/>
-          </a:effectRef>
-          <a:fontRef idx="minor">
-            <a:schemeClr val="tx1"/>
-          </a:fontRef>
-        </p:style>
-        <p:txBody>
-          <a:bodyPr rtlCol="0" anchor="ctr"/>
-          <a:lstStyle/>
-          <a:p>
-            <a:pPr algn="ctr"/>
-            <a:endParaRPr lang="en-US"/>
-          </a:p>
-        </p:txBody>
-      </p:sp>
-      <p:pic>
-        <p:nvPicPr>
-          <p:cNvPr id="9" name="Graphic 8" descr="Dim (Smaller Sun) with solid fill">
-            <a:extLst>
-              <a:ext uri="{FF2B5EF4-FFF2-40B4-BE49-F238E27FC236}">
-                <a16:creationId xmlns:a16="http://schemas.microsoft.com/office/drawing/2014/main" id="{7D8EF5E1-069B-45C9-EE4A-682E36CBC0B3}"/>
+          <p:cNvPr id="4" name="Picture 3">
+            <a:extLst>
+              <a:ext uri="{FF2B5EF4-FFF2-40B4-BE49-F238E27FC236}">
+                <a16:creationId xmlns:a16="http://schemas.microsoft.com/office/drawing/2014/main" id="{3E29D6A6-D834-9BA7-1C59-79E2074C7C61}"/>
               </a:ext>
             </a:extLst>
           </p:cNvPr>
@@ -5449,126 +5165,62 @@
           <p:nvPr/>
         </p:nvPicPr>
         <p:blipFill>
-          <a:blip r:embed="rId4">
-            <a:extLst>
-              <a:ext uri="{96DAC541-7B7A-43D3-8B79-37D633B846F1}">
-                <asvg:svgBlip xmlns:asvg="http://schemas.microsoft.com/office/drawing/2016/SVG/main" r:embed="rId5"/>
-              </a:ext>
-            </a:extLst>
-          </a:blip>
-          <a:stretch>
-            <a:fillRect/>
-          </a:stretch>
+          <a:blip r:embed="rId2"/>
+          <a:srcRect t="8748" b="16505"/>
+          <a:stretch/>
         </p:blipFill>
         <p:spPr>
           <a:xfrm>
-            <a:off x="5406765" y="5623349"/>
-            <a:ext cx="537859" cy="431004"/>
+            <a:off x="661398" y="1658471"/>
+            <a:ext cx="9557816" cy="4491318"/>
           </a:xfrm>
           <a:prstGeom prst="rect">
             <a:avLst/>
           </a:prstGeom>
         </p:spPr>
       </p:pic>
-      <p:pic>
-        <p:nvPicPr>
-          <p:cNvPr id="10" name="Graphic 9" descr="Sunset scene with solid fill">
-            <a:extLst>
-              <a:ext uri="{FF2B5EF4-FFF2-40B4-BE49-F238E27FC236}">
-                <a16:creationId xmlns:a16="http://schemas.microsoft.com/office/drawing/2014/main" id="{7CB8D037-1AB1-AADF-64EC-C4CA992D826C}"/>
-              </a:ext>
-            </a:extLst>
-          </p:cNvPr>
-          <p:cNvPicPr>
-            <a:picLocks noChangeAspect="1"/>
-          </p:cNvPicPr>
-          <p:nvPr/>
-        </p:nvPicPr>
-        <p:blipFill>
-          <a:blip r:embed="rId6">
-            <a:extLst>
-              <a:ext uri="{96DAC541-7B7A-43D3-8B79-37D633B846F1}">
-                <asvg:svgBlip xmlns:asvg="http://schemas.microsoft.com/office/drawing/2016/SVG/main" r:embed="rId7"/>
-              </a:ext>
-            </a:extLst>
-          </a:blip>
-          <a:stretch>
-            <a:fillRect/>
-          </a:stretch>
-        </p:blipFill>
-        <p:spPr>
-          <a:xfrm>
-            <a:off x="2426478" y="5563870"/>
-            <a:ext cx="448557" cy="448557"/>
+      <p:sp>
+        <p:nvSpPr>
+          <p:cNvPr id="8" name="Rectangle 7">
+            <a:extLst>
+              <a:ext uri="{FF2B5EF4-FFF2-40B4-BE49-F238E27FC236}">
+                <a16:creationId xmlns:a16="http://schemas.microsoft.com/office/drawing/2014/main" id="{737D3D71-A354-CE22-66D7-334FC64CA4B8}"/>
+              </a:ext>
+            </a:extLst>
+          </p:cNvPr>
+          <p:cNvSpPr/>
+          <p:nvPr/>
+        </p:nvSpPr>
+        <p:spPr>
+          <a:xfrm flipH="1">
+            <a:off x="1716608" y="1405574"/>
+            <a:ext cx="6767635" cy="296535"/>
           </a:xfrm>
           <a:prstGeom prst="rect">
             <a:avLst/>
           </a:prstGeom>
-        </p:spPr>
-      </p:pic>
-      <p:pic>
-        <p:nvPicPr>
-          <p:cNvPr id="11" name="Graphic 10" descr="Moon with solid fill">
-            <a:extLst>
-              <a:ext uri="{FF2B5EF4-FFF2-40B4-BE49-F238E27FC236}">
-                <a16:creationId xmlns:a16="http://schemas.microsoft.com/office/drawing/2014/main" id="{E4F33E7E-9C44-4D78-72B6-3061202E0381}"/>
-              </a:ext>
-            </a:extLst>
-          </p:cNvPr>
-          <p:cNvPicPr>
-            <a:picLocks noChangeAspect="1"/>
-          </p:cNvPicPr>
-          <p:nvPr/>
-        </p:nvPicPr>
-        <p:blipFill>
-          <a:blip r:embed="rId8">
-            <a:extLst>
-              <a:ext uri="{96DAC541-7B7A-43D3-8B79-37D633B846F1}">
-                <asvg:svgBlip xmlns:asvg="http://schemas.microsoft.com/office/drawing/2016/SVG/main" r:embed="rId9"/>
-              </a:ext>
-            </a:extLst>
-          </a:blip>
-          <a:stretch>
-            <a:fillRect/>
-          </a:stretch>
-        </p:blipFill>
-        <p:spPr>
-          <a:xfrm>
-            <a:off x="7845507" y="5659658"/>
-            <a:ext cx="296536" cy="296536"/>
-          </a:xfrm>
-          <a:prstGeom prst="rect">
-            <a:avLst/>
-          </a:prstGeom>
-        </p:spPr>
-      </p:pic>
-      <p:sp>
-        <p:nvSpPr>
-          <p:cNvPr id="12" name="Rectangle 11">
-            <a:extLst>
-              <a:ext uri="{FF2B5EF4-FFF2-40B4-BE49-F238E27FC236}">
-                <a16:creationId xmlns:a16="http://schemas.microsoft.com/office/drawing/2014/main" id="{017D6BD9-E74F-E6D3-9865-D3EAFA2983B4}"/>
-              </a:ext>
-            </a:extLst>
-          </p:cNvPr>
-          <p:cNvSpPr/>
-          <p:nvPr/>
-        </p:nvSpPr>
-        <p:spPr>
-          <a:xfrm>
-            <a:off x="1557055" y="5292874"/>
-            <a:ext cx="2163376" cy="224636"/>
-          </a:xfrm>
-          <a:prstGeom prst="rect">
-            <a:avLst/>
-          </a:prstGeom>
-          <a:solidFill>
-            <a:schemeClr val="accent5">
-              <a:lumMod val="20000"/>
-              <a:lumOff val="80000"/>
-              <a:alpha val="52157"/>
-            </a:schemeClr>
-          </a:solidFill>
+          <a:gradFill flip="none" rotWithShape="1">
+            <a:gsLst>
+              <a:gs pos="18000">
+                <a:srgbClr val="FF3A74">
+                  <a:alpha val="28235"/>
+                </a:srgbClr>
+              </a:gs>
+              <a:gs pos="96000">
+                <a:srgbClr val="150E22">
+                  <a:alpha val="78821"/>
+                </a:srgbClr>
+              </a:gs>
+              <a:gs pos="87000">
+                <a:srgbClr val="FFEAB5"/>
+              </a:gs>
+              <a:gs pos="37000">
+                <a:srgbClr val="FFEAB5"/>
+              </a:gs>
+            </a:gsLst>
+            <a:lin ang="10800000" scaled="1"/>
+            <a:tileRect/>
+          </a:gradFill>
           <a:ln>
             <a:noFill/>
           </a:ln>
@@ -5594,122 +5246,198 @@
           <a:lstStyle/>
           <a:p>
             <a:pPr algn="ctr"/>
-            <a:endParaRPr lang="en-US"/>
-          </a:p>
-        </p:txBody>
-      </p:sp>
-      <p:sp>
-        <p:nvSpPr>
-          <p:cNvPr id="13" name="Rectangle 12">
-            <a:extLst>
-              <a:ext uri="{FF2B5EF4-FFF2-40B4-BE49-F238E27FC236}">
-                <a16:creationId xmlns:a16="http://schemas.microsoft.com/office/drawing/2014/main" id="{7C6E7294-54F4-170F-6196-A6D082ACD94E}"/>
-              </a:ext>
-            </a:extLst>
-          </p:cNvPr>
-          <p:cNvSpPr/>
-          <p:nvPr/>
-        </p:nvSpPr>
-        <p:spPr>
-          <a:xfrm>
-            <a:off x="3779431" y="5292873"/>
-            <a:ext cx="3792529" cy="211413"/>
-          </a:xfrm>
-          <a:prstGeom prst="rect">
-            <a:avLst/>
-          </a:prstGeom>
-          <a:solidFill>
-            <a:srgbClr val="FFD579">
-              <a:alpha val="60000"/>
-            </a:srgbClr>
-          </a:solidFill>
-          <a:ln>
-            <a:noFill/>
-          </a:ln>
+            <a:endParaRPr lang="en-US" dirty="0"/>
+          </a:p>
+        </p:txBody>
+      </p:sp>
+      <p:cxnSp>
+        <p:nvCxnSpPr>
+          <p:cNvPr id="10" name="Straight Connector 9">
+            <a:extLst>
+              <a:ext uri="{FF2B5EF4-FFF2-40B4-BE49-F238E27FC236}">
+                <a16:creationId xmlns:a16="http://schemas.microsoft.com/office/drawing/2014/main" id="{6E349895-A86D-B330-664A-914DD46252CE}"/>
+              </a:ext>
+            </a:extLst>
+          </p:cNvPr>
+          <p:cNvCxnSpPr>
+            <a:cxnSpLocks/>
+          </p:cNvCxnSpPr>
+          <p:nvPr/>
+        </p:nvCxnSpPr>
+        <p:spPr>
+          <a:xfrm>
+            <a:off x="3900126" y="1405574"/>
+            <a:ext cx="0" cy="296535"/>
+          </a:xfrm>
+          <a:prstGeom prst="line">
+            <a:avLst/>
+          </a:prstGeom>
         </p:spPr>
         <p:style>
           <a:lnRef idx="2">
-            <a:schemeClr val="accent1">
-              <a:shade val="15000"/>
-            </a:schemeClr>
+            <a:schemeClr val="dk1"/>
           </a:lnRef>
-          <a:fillRef idx="1">
-            <a:schemeClr val="accent1"/>
+          <a:fillRef idx="0">
+            <a:schemeClr val="dk1"/>
           </a:fillRef>
-          <a:effectRef idx="0">
-            <a:schemeClr val="accent1"/>
+          <a:effectRef idx="1">
+            <a:schemeClr val="dk1"/>
           </a:effectRef>
           <a:fontRef idx="minor">
-            <a:schemeClr val="lt1"/>
+            <a:schemeClr val="tx1"/>
           </a:fontRef>
         </p:style>
-        <p:txBody>
-          <a:bodyPr rtlCol="0" anchor="ctr"/>
-          <a:lstStyle/>
-          <a:p>
-            <a:pPr algn="ctr"/>
-            <a:endParaRPr lang="en-US"/>
-          </a:p>
-        </p:txBody>
-      </p:sp>
-      <p:sp>
-        <p:nvSpPr>
-          <p:cNvPr id="14" name="Rectangle 13">
-            <a:extLst>
-              <a:ext uri="{FF2B5EF4-FFF2-40B4-BE49-F238E27FC236}">
-                <a16:creationId xmlns:a16="http://schemas.microsoft.com/office/drawing/2014/main" id="{0768538D-ACE5-4E2A-F4AE-B716957D3955}"/>
-              </a:ext>
-            </a:extLst>
-          </p:cNvPr>
-          <p:cNvSpPr/>
-          <p:nvPr/>
-        </p:nvSpPr>
-        <p:spPr>
-          <a:xfrm>
-            <a:off x="7625599" y="5306095"/>
-            <a:ext cx="712639" cy="211413"/>
+      </p:cxnSp>
+      <p:pic>
+        <p:nvPicPr>
+          <p:cNvPr id="12" name="Graphic 11" descr="Sunset scene with solid fill">
+            <a:extLst>
+              <a:ext uri="{FF2B5EF4-FFF2-40B4-BE49-F238E27FC236}">
+                <a16:creationId xmlns:a16="http://schemas.microsoft.com/office/drawing/2014/main" id="{20FCA15A-7F5F-E96C-DD08-EEC7F7848C2C}"/>
+              </a:ext>
+            </a:extLst>
+          </p:cNvPr>
+          <p:cNvPicPr>
+            <a:picLocks noChangeAspect="1"/>
+          </p:cNvPicPr>
+          <p:nvPr/>
+        </p:nvPicPr>
+        <p:blipFill>
+          <a:blip r:embed="rId3">
+            <a:extLst>
+              <a:ext uri="{96DAC541-7B7A-43D3-8B79-37D633B846F1}">
+                <asvg:svgBlip xmlns:asvg="http://schemas.microsoft.com/office/drawing/2016/SVG/main" r:embed="rId4"/>
+              </a:ext>
+            </a:extLst>
+          </a:blip>
+          <a:stretch>
+            <a:fillRect/>
+          </a:stretch>
+        </p:blipFill>
+        <p:spPr>
+          <a:xfrm>
+            <a:off x="2496505" y="1366748"/>
+            <a:ext cx="374186" cy="374186"/>
           </a:xfrm>
           <a:prstGeom prst="rect">
             <a:avLst/>
           </a:prstGeom>
-          <a:solidFill>
-            <a:srgbClr val="00287A">
-              <a:alpha val="49020"/>
-            </a:srgbClr>
-          </a:solidFill>
-          <a:ln>
-            <a:noFill/>
-          </a:ln>
+        </p:spPr>
+      </p:pic>
+      <p:cxnSp>
+        <p:nvCxnSpPr>
+          <p:cNvPr id="13" name="Straight Connector 12">
+            <a:extLst>
+              <a:ext uri="{FF2B5EF4-FFF2-40B4-BE49-F238E27FC236}">
+                <a16:creationId xmlns:a16="http://schemas.microsoft.com/office/drawing/2014/main" id="{2826D1D0-BBA6-21C2-A595-6578B092917B}"/>
+              </a:ext>
+            </a:extLst>
+          </p:cNvPr>
+          <p:cNvCxnSpPr>
+            <a:cxnSpLocks/>
+          </p:cNvCxnSpPr>
+          <p:nvPr/>
+        </p:nvCxnSpPr>
+        <p:spPr>
+          <a:xfrm>
+            <a:off x="7702982" y="1405574"/>
+            <a:ext cx="0" cy="296535"/>
+          </a:xfrm>
+          <a:prstGeom prst="line">
+            <a:avLst/>
+          </a:prstGeom>
         </p:spPr>
         <p:style>
           <a:lnRef idx="2">
-            <a:schemeClr val="accent1">
-              <a:shade val="15000"/>
-            </a:schemeClr>
+            <a:schemeClr val="dk1"/>
           </a:lnRef>
-          <a:fillRef idx="1">
-            <a:schemeClr val="accent1"/>
+          <a:fillRef idx="0">
+            <a:schemeClr val="dk1"/>
           </a:fillRef>
-          <a:effectRef idx="0">
-            <a:schemeClr val="accent1"/>
+          <a:effectRef idx="1">
+            <a:schemeClr val="dk1"/>
           </a:effectRef>
           <a:fontRef idx="minor">
-            <a:schemeClr val="lt1"/>
+            <a:schemeClr val="tx1"/>
           </a:fontRef>
         </p:style>
-        <p:txBody>
-          <a:bodyPr rtlCol="0" anchor="ctr"/>
-          <a:lstStyle/>
-          <a:p>
-            <a:pPr algn="ctr"/>
-            <a:endParaRPr lang="en-US"/>
-          </a:p>
-        </p:txBody>
-      </p:sp>
+      </p:cxnSp>
+      <p:pic>
+        <p:nvPicPr>
+          <p:cNvPr id="15" name="Graphic 14" descr="Dim (Smaller Sun) with solid fill">
+            <a:extLst>
+              <a:ext uri="{FF2B5EF4-FFF2-40B4-BE49-F238E27FC236}">
+                <a16:creationId xmlns:a16="http://schemas.microsoft.com/office/drawing/2014/main" id="{25CB26C9-2361-2B99-3842-7080309F5609}"/>
+              </a:ext>
+            </a:extLst>
+          </p:cNvPr>
+          <p:cNvPicPr>
+            <a:picLocks noChangeAspect="1"/>
+          </p:cNvPicPr>
+          <p:nvPr/>
+        </p:nvPicPr>
+        <p:blipFill>
+          <a:blip r:embed="rId5">
+            <a:extLst>
+              <a:ext uri="{96DAC541-7B7A-43D3-8B79-37D633B846F1}">
+                <asvg:svgBlip xmlns:asvg="http://schemas.microsoft.com/office/drawing/2016/SVG/main" r:embed="rId6"/>
+              </a:ext>
+            </a:extLst>
+          </a:blip>
+          <a:stretch>
+            <a:fillRect/>
+          </a:stretch>
+        </p:blipFill>
+        <p:spPr>
+          <a:xfrm>
+            <a:off x="5355826" y="1383755"/>
+            <a:ext cx="445728" cy="357176"/>
+          </a:xfrm>
+          <a:prstGeom prst="rect">
+            <a:avLst/>
+          </a:prstGeom>
+        </p:spPr>
+      </p:pic>
+      <p:pic>
+        <p:nvPicPr>
+          <p:cNvPr id="16" name="Graphic 15" descr="Moon with solid fill">
+            <a:extLst>
+              <a:ext uri="{FF2B5EF4-FFF2-40B4-BE49-F238E27FC236}">
+                <a16:creationId xmlns:a16="http://schemas.microsoft.com/office/drawing/2014/main" id="{1CF5ED38-48B1-97E6-6163-293297603AE3}"/>
+              </a:ext>
+            </a:extLst>
+          </p:cNvPr>
+          <p:cNvPicPr>
+            <a:picLocks noChangeAspect="1"/>
+          </p:cNvPicPr>
+          <p:nvPr/>
+        </p:nvPicPr>
+        <p:blipFill>
+          <a:blip r:embed="rId7">
+            <a:extLst>
+              <a:ext uri="{96DAC541-7B7A-43D3-8B79-37D633B846F1}">
+                <asvg:svgBlip xmlns:asvg="http://schemas.microsoft.com/office/drawing/2016/SVG/main" r:embed="rId8"/>
+              </a:ext>
+            </a:extLst>
+          </a:blip>
+          <a:stretch>
+            <a:fillRect/>
+          </a:stretch>
+        </p:blipFill>
+        <p:spPr>
+          <a:xfrm>
+            <a:off x="7945345" y="1403277"/>
+            <a:ext cx="296536" cy="296536"/>
+          </a:xfrm>
+          <a:prstGeom prst="rect">
+            <a:avLst/>
+          </a:prstGeom>
+        </p:spPr>
+      </p:pic>
     </p:spTree>
     <p:extLst>
       <p:ext uri="{BB962C8B-B14F-4D97-AF65-F5344CB8AC3E}">
-        <p14:creationId xmlns:p14="http://schemas.microsoft.com/office/powerpoint/2010/main" val="3835173375"/>
+        <p14:creationId xmlns:p14="http://schemas.microsoft.com/office/powerpoint/2010/main" val="4082684988"/>
       </p:ext>
     </p:extLst>
   </p:cSld>
@@ -5738,28 +5466,27 @@
       </p:grpSpPr>
       <p:pic>
         <p:nvPicPr>
-          <p:cNvPr id="5" name="Picture 4" descr="A graph of a number of data&#10;&#10;Description automatically generated with medium confidence">
-            <a:extLst>
-              <a:ext uri="{FF2B5EF4-FFF2-40B4-BE49-F238E27FC236}">
-                <a16:creationId xmlns:a16="http://schemas.microsoft.com/office/drawing/2014/main" id="{227F74A0-A0AE-61DC-409D-F791AC0BD11B}"/>
+          <p:cNvPr id="4" name="Picture 3">
+            <a:extLst>
+              <a:ext uri="{FF2B5EF4-FFF2-40B4-BE49-F238E27FC236}">
+                <a16:creationId xmlns:a16="http://schemas.microsoft.com/office/drawing/2014/main" id="{3E29D6A6-D834-9BA7-1C59-79E2074C7C61}"/>
               </a:ext>
             </a:extLst>
           </p:cNvPr>
           <p:cNvPicPr>
-            <a:picLocks noGrp="1" noRot="1" noChangeAspect="1" noMove="1" noResize="1" noEditPoints="1" noAdjustHandles="1" noChangeArrowheads="1" noChangeShapeType="1" noCrop="1"/>
+            <a:picLocks noChangeAspect="1"/>
           </p:cNvPicPr>
           <p:nvPr/>
         </p:nvPicPr>
         <p:blipFill>
-          <a:blip r:embed="rId3"/>
-          <a:stretch>
-            <a:fillRect/>
-          </a:stretch>
+          <a:blip r:embed="rId2"/>
+          <a:srcRect t="8748" b="16505"/>
+          <a:stretch/>
         </p:blipFill>
         <p:spPr>
           <a:xfrm>
-            <a:off x="631438" y="325120"/>
-            <a:ext cx="9486619" cy="5963920"/>
+            <a:off x="661398" y="1658471"/>
+            <a:ext cx="9557816" cy="4491318"/>
           </a:xfrm>
           <a:prstGeom prst="rect">
             <a:avLst/>
@@ -5768,10 +5495,10 @@
       </p:pic>
       <p:sp>
         <p:nvSpPr>
-          <p:cNvPr id="6" name="Left Brace 5">
-            <a:extLst>
-              <a:ext uri="{FF2B5EF4-FFF2-40B4-BE49-F238E27FC236}">
-                <a16:creationId xmlns:a16="http://schemas.microsoft.com/office/drawing/2014/main" id="{0BBEEB1A-FE7C-A702-DC5D-11606775C085}"/>
+          <p:cNvPr id="2" name="Rectangle 1">
+            <a:extLst>
+              <a:ext uri="{FF2B5EF4-FFF2-40B4-BE49-F238E27FC236}">
+                <a16:creationId xmlns:a16="http://schemas.microsoft.com/office/drawing/2014/main" id="{C818E2F9-12CF-0794-521B-410EDBB7F9F6}"/>
               </a:ext>
             </a:extLst>
           </p:cNvPr>
@@ -5779,21 +5506,90 @@
           <p:nvPr/>
         </p:nvSpPr>
         <p:spPr>
-          <a:xfrm rot="16200000">
-            <a:off x="2513979" y="4463700"/>
-            <a:ext cx="255005" cy="2187399"/>
-          </a:xfrm>
-          <a:prstGeom prst="leftBrace">
-            <a:avLst/>
-          </a:prstGeom>
-          <a:ln w="38100">
-            <a:solidFill>
-              <a:schemeClr val="accent5">
-                <a:lumMod val="40000"/>
-                <a:lumOff val="60000"/>
-              </a:schemeClr>
-            </a:solidFill>
+          <a:xfrm flipH="1">
+            <a:off x="1684427" y="5853254"/>
+            <a:ext cx="6767635" cy="296535"/>
+          </a:xfrm>
+          <a:prstGeom prst="rect">
+            <a:avLst/>
+          </a:prstGeom>
+          <a:gradFill flip="none" rotWithShape="1">
+            <a:gsLst>
+              <a:gs pos="18000">
+                <a:srgbClr val="FF3A74">
+                  <a:alpha val="28235"/>
+                </a:srgbClr>
+              </a:gs>
+              <a:gs pos="96000">
+                <a:srgbClr val="150E22">
+                  <a:alpha val="78821"/>
+                </a:srgbClr>
+              </a:gs>
+              <a:gs pos="86000">
+                <a:srgbClr val="FFEAB5">
+                  <a:alpha val="57446"/>
+                </a:srgbClr>
+              </a:gs>
+              <a:gs pos="37000">
+                <a:srgbClr val="FFEAB5">
+                  <a:alpha val="46000"/>
+                </a:srgbClr>
+              </a:gs>
+            </a:gsLst>
+            <a:lin ang="10800000" scaled="1"/>
+            <a:tileRect/>
+          </a:gradFill>
+          <a:ln>
+            <a:noFill/>
           </a:ln>
+        </p:spPr>
+        <p:style>
+          <a:lnRef idx="2">
+            <a:schemeClr val="accent1">
+              <a:shade val="15000"/>
+            </a:schemeClr>
+          </a:lnRef>
+          <a:fillRef idx="1">
+            <a:schemeClr val="accent1"/>
+          </a:fillRef>
+          <a:effectRef idx="0">
+            <a:schemeClr val="accent1"/>
+          </a:effectRef>
+          <a:fontRef idx="minor">
+            <a:schemeClr val="lt1"/>
+          </a:fontRef>
+        </p:style>
+        <p:txBody>
+          <a:bodyPr rtlCol="0" anchor="ctr"/>
+          <a:lstStyle/>
+          <a:p>
+            <a:pPr algn="ctr"/>
+            <a:endParaRPr lang="en-US" dirty="0"/>
+          </a:p>
+        </p:txBody>
+      </p:sp>
+      <p:cxnSp>
+        <p:nvCxnSpPr>
+          <p:cNvPr id="3" name="Straight Connector 2">
+            <a:extLst>
+              <a:ext uri="{FF2B5EF4-FFF2-40B4-BE49-F238E27FC236}">
+                <a16:creationId xmlns:a16="http://schemas.microsoft.com/office/drawing/2014/main" id="{69B6E18E-5BBA-CF0F-FAF7-C43177CAE4BE}"/>
+              </a:ext>
+            </a:extLst>
+          </p:cNvPr>
+          <p:cNvCxnSpPr>
+            <a:cxnSpLocks/>
+          </p:cNvCxnSpPr>
+          <p:nvPr/>
+        </p:nvCxnSpPr>
+        <p:spPr>
+          <a:xfrm>
+            <a:off x="3900126" y="5832295"/>
+            <a:ext cx="0" cy="296535"/>
+          </a:xfrm>
+          <a:prstGeom prst="line">
+            <a:avLst/>
+          </a:prstGeom>
         </p:spPr>
         <p:style>
           <a:lnRef idx="2">
@@ -5809,40 +5605,29 @@
             <a:schemeClr val="tx1"/>
           </a:fontRef>
         </p:style>
-        <p:txBody>
-          <a:bodyPr rtlCol="0" anchor="ctr"/>
-          <a:lstStyle/>
-          <a:p>
-            <a:pPr algn="ctr"/>
-            <a:endParaRPr lang="en-US"/>
-          </a:p>
-        </p:txBody>
-      </p:sp>
-      <p:sp>
-        <p:nvSpPr>
-          <p:cNvPr id="7" name="Left Brace 6">
-            <a:extLst>
-              <a:ext uri="{FF2B5EF4-FFF2-40B4-BE49-F238E27FC236}">
-                <a16:creationId xmlns:a16="http://schemas.microsoft.com/office/drawing/2014/main" id="{481C8B53-BA2E-D509-A78C-AEC720DEBEAE}"/>
-              </a:ext>
-            </a:extLst>
-          </p:cNvPr>
-          <p:cNvSpPr/>
-          <p:nvPr/>
-        </p:nvSpPr>
-        <p:spPr>
-          <a:xfrm rot="16200000">
-            <a:off x="5557712" y="3629492"/>
-            <a:ext cx="221218" cy="3822029"/>
-          </a:xfrm>
-          <a:prstGeom prst="leftBrace">
-            <a:avLst/>
-          </a:prstGeom>
-          <a:ln w="38100">
-            <a:solidFill>
-              <a:srgbClr val="FFC000"/>
-            </a:solidFill>
-          </a:ln>
+      </p:cxnSp>
+      <p:cxnSp>
+        <p:nvCxnSpPr>
+          <p:cNvPr id="7" name="Straight Connector 6">
+            <a:extLst>
+              <a:ext uri="{FF2B5EF4-FFF2-40B4-BE49-F238E27FC236}">
+                <a16:creationId xmlns:a16="http://schemas.microsoft.com/office/drawing/2014/main" id="{678DA2FA-6DB3-BEC2-015C-8C38DF5CC658}"/>
+              </a:ext>
+            </a:extLst>
+          </p:cNvPr>
+          <p:cNvCxnSpPr>
+            <a:cxnSpLocks/>
+          </p:cNvCxnSpPr>
+          <p:nvPr/>
+        </p:nvCxnSpPr>
+        <p:spPr>
+          <a:xfrm>
+            <a:off x="7496766" y="5832294"/>
+            <a:ext cx="0" cy="296535"/>
+          </a:xfrm>
+          <a:prstGeom prst="line">
+            <a:avLst/>
+          </a:prstGeom>
         </p:spPr>
         <p:style>
           <a:lnRef idx="2">
@@ -5858,21 +5643,13 @@
             <a:schemeClr val="tx1"/>
           </a:fontRef>
         </p:style>
-        <p:txBody>
-          <a:bodyPr rtlCol="0" anchor="ctr"/>
-          <a:lstStyle/>
-          <a:p>
-            <a:pPr algn="ctr"/>
-            <a:endParaRPr lang="en-US" dirty="0"/>
-          </a:p>
-        </p:txBody>
-      </p:sp>
+      </p:cxnSp>
       <p:pic>
         <p:nvPicPr>
-          <p:cNvPr id="9" name="Graphic 8" descr="Dim (Smaller Sun) with solid fill">
-            <a:extLst>
-              <a:ext uri="{FF2B5EF4-FFF2-40B4-BE49-F238E27FC236}">
-                <a16:creationId xmlns:a16="http://schemas.microsoft.com/office/drawing/2014/main" id="{7D8EF5E1-069B-45C9-EE4A-682E36CBC0B3}"/>
+          <p:cNvPr id="11" name="Graphic 10" descr="Sunset scene with solid fill">
+            <a:extLst>
+              <a:ext uri="{FF2B5EF4-FFF2-40B4-BE49-F238E27FC236}">
+                <a16:creationId xmlns:a16="http://schemas.microsoft.com/office/drawing/2014/main" id="{4DB22646-A6B7-6F73-E62F-FFDDCCB1A7F7}"/>
               </a:ext>
             </a:extLst>
           </p:cNvPr>
@@ -5882,10 +5659,10 @@
           <p:nvPr/>
         </p:nvPicPr>
         <p:blipFill>
-          <a:blip r:embed="rId4">
+          <a:blip r:embed="rId3">
             <a:extLst>
               <a:ext uri="{96DAC541-7B7A-43D3-8B79-37D633B846F1}">
-                <asvg:svgBlip xmlns:asvg="http://schemas.microsoft.com/office/drawing/2016/SVG/main" r:embed="rId5"/>
+                <asvg:svgBlip xmlns:asvg="http://schemas.microsoft.com/office/drawing/2016/SVG/main" r:embed="rId4"/>
               </a:ext>
             </a:extLst>
           </a:blip>
@@ -5895,8 +5672,8 @@
         </p:blipFill>
         <p:spPr>
           <a:xfrm>
-            <a:off x="5399391" y="5651116"/>
-            <a:ext cx="537859" cy="431004"/>
+            <a:off x="2570645" y="6102019"/>
+            <a:ext cx="374186" cy="374186"/>
           </a:xfrm>
           <a:prstGeom prst="rect">
             <a:avLst/>
@@ -5905,10 +5682,10 @@
       </p:pic>
       <p:pic>
         <p:nvPicPr>
-          <p:cNvPr id="10" name="Graphic 9" descr="Sunset scene with solid fill">
-            <a:extLst>
-              <a:ext uri="{FF2B5EF4-FFF2-40B4-BE49-F238E27FC236}">
-                <a16:creationId xmlns:a16="http://schemas.microsoft.com/office/drawing/2014/main" id="{7CB8D037-1AB1-AADF-64EC-C4CA992D826C}"/>
+          <p:cNvPr id="14" name="Graphic 13" descr="Dim (Smaller Sun) with solid fill">
+            <a:extLst>
+              <a:ext uri="{FF2B5EF4-FFF2-40B4-BE49-F238E27FC236}">
+                <a16:creationId xmlns:a16="http://schemas.microsoft.com/office/drawing/2014/main" id="{35FF74F9-B20D-3C3D-0F50-30602102C4C8}"/>
               </a:ext>
             </a:extLst>
           </p:cNvPr>
@@ -5918,10 +5695,10 @@
           <p:nvPr/>
         </p:nvPicPr>
         <p:blipFill>
-          <a:blip r:embed="rId6">
+          <a:blip r:embed="rId5">
             <a:extLst>
               <a:ext uri="{96DAC541-7B7A-43D3-8B79-37D633B846F1}">
-                <asvg:svgBlip xmlns:asvg="http://schemas.microsoft.com/office/drawing/2016/SVG/main" r:embed="rId7"/>
+                <asvg:svgBlip xmlns:asvg="http://schemas.microsoft.com/office/drawing/2016/SVG/main" r:embed="rId6"/>
               </a:ext>
             </a:extLst>
           </a:blip>
@@ -5931,8 +5708,8 @@
         </p:blipFill>
         <p:spPr>
           <a:xfrm>
-            <a:off x="2417203" y="5633563"/>
-            <a:ext cx="448557" cy="448557"/>
+            <a:off x="5355826" y="6128829"/>
+            <a:ext cx="445728" cy="357176"/>
           </a:xfrm>
           <a:prstGeom prst="rect">
             <a:avLst/>
@@ -5941,10 +5718,10 @@
       </p:pic>
       <p:pic>
         <p:nvPicPr>
-          <p:cNvPr id="11" name="Graphic 10" descr="Moon with solid fill">
-            <a:extLst>
-              <a:ext uri="{FF2B5EF4-FFF2-40B4-BE49-F238E27FC236}">
-                <a16:creationId xmlns:a16="http://schemas.microsoft.com/office/drawing/2014/main" id="{E4F33E7E-9C44-4D78-72B6-3061202E0381}"/>
+          <p:cNvPr id="18" name="Graphic 17" descr="Moon with solid fill">
+            <a:extLst>
+              <a:ext uri="{FF2B5EF4-FFF2-40B4-BE49-F238E27FC236}">
+                <a16:creationId xmlns:a16="http://schemas.microsoft.com/office/drawing/2014/main" id="{B1B97E20-35E7-72A6-1139-8F7ABC0DCA7C}"/>
               </a:ext>
             </a:extLst>
           </p:cNvPr>
@@ -5954,10 +5731,10 @@
           <p:nvPr/>
         </p:nvPicPr>
         <p:blipFill>
-          <a:blip r:embed="rId8">
+          <a:blip r:embed="rId7">
             <a:extLst>
               <a:ext uri="{96DAC541-7B7A-43D3-8B79-37D633B846F1}">
-                <asvg:svgBlip xmlns:asvg="http://schemas.microsoft.com/office/drawing/2016/SVG/main" r:embed="rId9"/>
+                <asvg:svgBlip xmlns:asvg="http://schemas.microsoft.com/office/drawing/2016/SVG/main" r:embed="rId8"/>
               </a:ext>
             </a:extLst>
           </a:blip>
@@ -5967,7 +5744,7 @@
         </p:blipFill>
         <p:spPr>
           <a:xfrm>
-            <a:off x="7832202" y="5689117"/>
+            <a:off x="7916013" y="6189469"/>
             <a:ext cx="296536" cy="296536"/>
           </a:xfrm>
           <a:prstGeom prst="rect">
@@ -5975,59 +5752,10 @@
           </a:prstGeom>
         </p:spPr>
       </p:pic>
-      <p:sp>
-        <p:nvSpPr>
-          <p:cNvPr id="2" name="Left Brace 1">
-            <a:extLst>
-              <a:ext uri="{FF2B5EF4-FFF2-40B4-BE49-F238E27FC236}">
-                <a16:creationId xmlns:a16="http://schemas.microsoft.com/office/drawing/2014/main" id="{73702A70-8991-F02A-7D71-3DBD09F076D6}"/>
-              </a:ext>
-            </a:extLst>
-          </p:cNvPr>
-          <p:cNvSpPr/>
-          <p:nvPr/>
-        </p:nvSpPr>
-        <p:spPr>
-          <a:xfrm rot="16200000">
-            <a:off x="7852968" y="5175754"/>
-            <a:ext cx="255005" cy="758021"/>
-          </a:xfrm>
-          <a:prstGeom prst="leftBrace">
-            <a:avLst/>
-          </a:prstGeom>
-          <a:ln w="38100">
-            <a:solidFill>
-              <a:srgbClr val="002060"/>
-            </a:solidFill>
-          </a:ln>
-        </p:spPr>
-        <p:style>
-          <a:lnRef idx="2">
-            <a:schemeClr val="dk1"/>
-          </a:lnRef>
-          <a:fillRef idx="0">
-            <a:schemeClr val="dk1"/>
-          </a:fillRef>
-          <a:effectRef idx="1">
-            <a:schemeClr val="dk1"/>
-          </a:effectRef>
-          <a:fontRef idx="minor">
-            <a:schemeClr val="tx1"/>
-          </a:fontRef>
-        </p:style>
-        <p:txBody>
-          <a:bodyPr rtlCol="0" anchor="ctr"/>
-          <a:lstStyle/>
-          <a:p>
-            <a:pPr algn="ctr"/>
-            <a:endParaRPr lang="en-US"/>
-          </a:p>
-        </p:txBody>
-      </p:sp>
     </p:spTree>
     <p:extLst>
       <p:ext uri="{BB962C8B-B14F-4D97-AF65-F5344CB8AC3E}">
-        <p14:creationId xmlns:p14="http://schemas.microsoft.com/office/powerpoint/2010/main" val="3464306805"/>
+        <p14:creationId xmlns:p14="http://schemas.microsoft.com/office/powerpoint/2010/main" val="4219020307"/>
       </p:ext>
     </p:extLst>
   </p:cSld>
@@ -6056,28 +5784,28 @@
       </p:grpSpPr>
       <p:pic>
         <p:nvPicPr>
-          <p:cNvPr id="4" name="Picture 3">
-            <a:extLst>
-              <a:ext uri="{FF2B5EF4-FFF2-40B4-BE49-F238E27FC236}">
-                <a16:creationId xmlns:a16="http://schemas.microsoft.com/office/drawing/2014/main" id="{1844EA73-0371-6BBC-A790-292887CC75CC}"/>
+          <p:cNvPr id="5" name="Picture 4" descr="A graph of a number of data&#10;&#10;Description automatically generated with medium confidence">
+            <a:extLst>
+              <a:ext uri="{FF2B5EF4-FFF2-40B4-BE49-F238E27FC236}">
+                <a16:creationId xmlns:a16="http://schemas.microsoft.com/office/drawing/2014/main" id="{227F74A0-A0AE-61DC-409D-F791AC0BD11B}"/>
               </a:ext>
             </a:extLst>
           </p:cNvPr>
           <p:cNvPicPr>
-            <a:picLocks noChangeAspect="1"/>
+            <a:picLocks noGrp="1" noRot="1" noChangeAspect="1" noMove="1" noResize="1" noEditPoints="1" noAdjustHandles="1" noChangeArrowheads="1" noChangeShapeType="1" noCrop="1"/>
           </p:cNvPicPr>
           <p:nvPr/>
         </p:nvPicPr>
         <p:blipFill>
-          <a:blip r:embed="rId2"/>
+          <a:blip r:embed="rId3"/>
           <a:stretch>
             <a:fillRect/>
           </a:stretch>
         </p:blipFill>
         <p:spPr>
           <a:xfrm>
-            <a:off x="544856" y="424660"/>
-            <a:ext cx="9557816" cy="6008679"/>
+            <a:off x="631438" y="325120"/>
+            <a:ext cx="9486619" cy="5963920"/>
           </a:xfrm>
           <a:prstGeom prst="rect">
             <a:avLst/>
@@ -6086,10 +5814,10 @@
       </p:pic>
       <p:sp>
         <p:nvSpPr>
-          <p:cNvPr id="12" name="Left Brace 11">
-            <a:extLst>
-              <a:ext uri="{FF2B5EF4-FFF2-40B4-BE49-F238E27FC236}">
-                <a16:creationId xmlns:a16="http://schemas.microsoft.com/office/drawing/2014/main" id="{B7E57170-6FFE-D5B1-08D6-55B703ADF37B}"/>
+          <p:cNvPr id="6" name="Left Brace 5">
+            <a:extLst>
+              <a:ext uri="{FF2B5EF4-FFF2-40B4-BE49-F238E27FC236}">
+                <a16:creationId xmlns:a16="http://schemas.microsoft.com/office/drawing/2014/main" id="{0BBEEB1A-FE7C-A702-DC5D-11606775C085}"/>
               </a:ext>
             </a:extLst>
           </p:cNvPr>
@@ -6098,8 +5826,8 @@
         </p:nvSpPr>
         <p:spPr>
           <a:xfrm rot="16200000">
-            <a:off x="2531022" y="4329712"/>
-            <a:ext cx="257642" cy="2237569"/>
+            <a:off x="2513979" y="4463700"/>
+            <a:ext cx="255005" cy="2187399"/>
           </a:xfrm>
           <a:prstGeom prst="leftBrace">
             <a:avLst/>
@@ -6138,10 +5866,10 @@
       </p:sp>
       <p:sp>
         <p:nvSpPr>
-          <p:cNvPr id="13" name="Left Brace 12">
-            <a:extLst>
-              <a:ext uri="{FF2B5EF4-FFF2-40B4-BE49-F238E27FC236}">
-                <a16:creationId xmlns:a16="http://schemas.microsoft.com/office/drawing/2014/main" id="{73B5A2D6-20B5-60D9-27BF-6EFEA277A6AE}"/>
+          <p:cNvPr id="7" name="Left Brace 6">
+            <a:extLst>
+              <a:ext uri="{FF2B5EF4-FFF2-40B4-BE49-F238E27FC236}">
+                <a16:creationId xmlns:a16="http://schemas.microsoft.com/office/drawing/2014/main" id="{481C8B53-BA2E-D509-A78C-AEC720DEBEAE}"/>
               </a:ext>
             </a:extLst>
           </p:cNvPr>
@@ -6150,8 +5878,8 @@
         </p:nvSpPr>
         <p:spPr>
           <a:xfrm rot="16200000">
-            <a:off x="5563692" y="3548060"/>
-            <a:ext cx="223855" cy="3793985"/>
+            <a:off x="5557712" y="3629492"/>
+            <a:ext cx="221218" cy="3822029"/>
           </a:xfrm>
           <a:prstGeom prst="leftBrace">
             <a:avLst/>
@@ -6187,10 +5915,10 @@
       </p:sp>
       <p:pic>
         <p:nvPicPr>
-          <p:cNvPr id="14" name="Graphic 13" descr="Dim (Smaller Sun) with solid fill">
-            <a:extLst>
-              <a:ext uri="{FF2B5EF4-FFF2-40B4-BE49-F238E27FC236}">
-                <a16:creationId xmlns:a16="http://schemas.microsoft.com/office/drawing/2014/main" id="{2A17FD34-2ACF-2065-3DD7-C06F4AB0817A}"/>
+          <p:cNvPr id="9" name="Graphic 8" descr="Dim (Smaller Sun) with solid fill">
+            <a:extLst>
+              <a:ext uri="{FF2B5EF4-FFF2-40B4-BE49-F238E27FC236}">
+                <a16:creationId xmlns:a16="http://schemas.microsoft.com/office/drawing/2014/main" id="{7D8EF5E1-069B-45C9-EE4A-682E36CBC0B3}"/>
               </a:ext>
             </a:extLst>
           </p:cNvPr>
@@ -6200,10 +5928,10 @@
           <p:nvPr/>
         </p:nvPicPr>
         <p:blipFill>
-          <a:blip r:embed="rId3">
+          <a:blip r:embed="rId4">
             <a:extLst>
               <a:ext uri="{96DAC541-7B7A-43D3-8B79-37D633B846F1}">
-                <asvg:svgBlip xmlns:asvg="http://schemas.microsoft.com/office/drawing/2016/SVG/main" r:embed="rId4"/>
+                <asvg:svgBlip xmlns:asvg="http://schemas.microsoft.com/office/drawing/2016/SVG/main" r:embed="rId5"/>
               </a:ext>
             </a:extLst>
           </a:blip>
@@ -6213,7 +5941,7 @@
         </p:blipFill>
         <p:spPr>
           <a:xfrm>
-            <a:off x="5406690" y="5531449"/>
+            <a:off x="5399391" y="5651116"/>
             <a:ext cx="537859" cy="431004"/>
           </a:xfrm>
           <a:prstGeom prst="rect">
@@ -6223,10 +5951,10 @@
       </p:pic>
       <p:pic>
         <p:nvPicPr>
-          <p:cNvPr id="15" name="Graphic 14" descr="Sunset scene with solid fill">
-            <a:extLst>
-              <a:ext uri="{FF2B5EF4-FFF2-40B4-BE49-F238E27FC236}">
-                <a16:creationId xmlns:a16="http://schemas.microsoft.com/office/drawing/2014/main" id="{3E515650-8BD2-0DED-8D0A-EA165B4763DD}"/>
+          <p:cNvPr id="10" name="Graphic 9" descr="Sunset scene with solid fill">
+            <a:extLst>
+              <a:ext uri="{FF2B5EF4-FFF2-40B4-BE49-F238E27FC236}">
+                <a16:creationId xmlns:a16="http://schemas.microsoft.com/office/drawing/2014/main" id="{7CB8D037-1AB1-AADF-64EC-C4CA992D826C}"/>
               </a:ext>
             </a:extLst>
           </p:cNvPr>
@@ -6236,10 +5964,10 @@
           <p:nvPr/>
         </p:nvPicPr>
         <p:blipFill>
-          <a:blip r:embed="rId5">
+          <a:blip r:embed="rId6">
             <a:extLst>
               <a:ext uri="{96DAC541-7B7A-43D3-8B79-37D633B846F1}">
-                <asvg:svgBlip xmlns:asvg="http://schemas.microsoft.com/office/drawing/2016/SVG/main" r:embed="rId6"/>
+                <asvg:svgBlip xmlns:asvg="http://schemas.microsoft.com/office/drawing/2016/SVG/main" r:embed="rId7"/>
               </a:ext>
             </a:extLst>
           </a:blip>
@@ -6249,7 +5977,7 @@
         </p:blipFill>
         <p:spPr>
           <a:xfrm>
-            <a:off x="2435564" y="5556771"/>
+            <a:off x="2417203" y="5633563"/>
             <a:ext cx="448557" cy="448557"/>
           </a:xfrm>
           <a:prstGeom prst="rect">
@@ -6259,10 +5987,10 @@
       </p:pic>
       <p:pic>
         <p:nvPicPr>
-          <p:cNvPr id="16" name="Graphic 15" descr="Moon with solid fill">
-            <a:extLst>
-              <a:ext uri="{FF2B5EF4-FFF2-40B4-BE49-F238E27FC236}">
-                <a16:creationId xmlns:a16="http://schemas.microsoft.com/office/drawing/2014/main" id="{DB6C1273-1C0C-E18E-8C57-E20E663AAF65}"/>
+          <p:cNvPr id="11" name="Graphic 10" descr="Moon with solid fill">
+            <a:extLst>
+              <a:ext uri="{FF2B5EF4-FFF2-40B4-BE49-F238E27FC236}">
+                <a16:creationId xmlns:a16="http://schemas.microsoft.com/office/drawing/2014/main" id="{E4F33E7E-9C44-4D78-72B6-3061202E0381}"/>
               </a:ext>
             </a:extLst>
           </p:cNvPr>
@@ -6272,10 +6000,10 @@
           <p:nvPr/>
         </p:nvPicPr>
         <p:blipFill>
-          <a:blip r:embed="rId7">
+          <a:blip r:embed="rId8">
             <a:extLst>
               <a:ext uri="{96DAC541-7B7A-43D3-8B79-37D633B846F1}">
-                <asvg:svgBlip xmlns:asvg="http://schemas.microsoft.com/office/drawing/2016/SVG/main" r:embed="rId8"/>
+                <asvg:svgBlip xmlns:asvg="http://schemas.microsoft.com/office/drawing/2016/SVG/main" r:embed="rId9"/>
               </a:ext>
             </a:extLst>
           </a:blip>
@@ -6285,7 +6013,7 @@
         </p:blipFill>
         <p:spPr>
           <a:xfrm>
-            <a:off x="7825478" y="5598683"/>
+            <a:off x="7832202" y="5689117"/>
             <a:ext cx="296536" cy="296536"/>
           </a:xfrm>
           <a:prstGeom prst="rect">
@@ -6295,10 +6023,10 @@
       </p:pic>
       <p:sp>
         <p:nvSpPr>
-          <p:cNvPr id="17" name="Left Brace 16">
-            <a:extLst>
-              <a:ext uri="{FF2B5EF4-FFF2-40B4-BE49-F238E27FC236}">
-                <a16:creationId xmlns:a16="http://schemas.microsoft.com/office/drawing/2014/main" id="{E077A77C-1BE9-A47C-CD88-50A21D114C2E}"/>
+          <p:cNvPr id="2" name="Left Brace 1">
+            <a:extLst>
+              <a:ext uri="{FF2B5EF4-FFF2-40B4-BE49-F238E27FC236}">
+                <a16:creationId xmlns:a16="http://schemas.microsoft.com/office/drawing/2014/main" id="{73702A70-8991-F02A-7D71-3DBD09F076D6}"/>
               </a:ext>
             </a:extLst>
           </p:cNvPr>
@@ -6307,7 +6035,7 @@
         </p:nvSpPr>
         <p:spPr>
           <a:xfrm rot="16200000">
-            <a:off x="7846244" y="5081618"/>
+            <a:off x="7852968" y="5175754"/>
             <a:ext cx="255005" cy="758021"/>
           </a:xfrm>
           <a:prstGeom prst="leftBrace">
@@ -6345,6 +6073,910 @@
     </p:spTree>
     <p:extLst>
       <p:ext uri="{BB962C8B-B14F-4D97-AF65-F5344CB8AC3E}">
+        <p14:creationId xmlns:p14="http://schemas.microsoft.com/office/powerpoint/2010/main" val="3464306805"/>
+      </p:ext>
+    </p:extLst>
+  </p:cSld>
+  <p:clrMapOvr>
+    <a:masterClrMapping/>
+  </p:clrMapOvr>
+</p:sld>
+</file>
+
+<file path=ppt/slides/slide5.xml><?xml version="1.0" encoding="utf-8"?>
+<p:sld xmlns:a="http://schemas.openxmlformats.org/drawingml/2006/main" xmlns:r="http://schemas.openxmlformats.org/officeDocument/2006/relationships" xmlns:p="http://schemas.openxmlformats.org/presentationml/2006/main">
+  <p:cSld>
+    <p:spTree>
+      <p:nvGrpSpPr>
+        <p:cNvPr id="1" name=""/>
+        <p:cNvGrpSpPr/>
+        <p:nvPr/>
+      </p:nvGrpSpPr>
+      <p:grpSpPr>
+        <a:xfrm>
+          <a:off x="0" y="0"/>
+          <a:ext cx="0" cy="0"/>
+          <a:chOff x="0" y="0"/>
+          <a:chExt cx="0" cy="0"/>
+        </a:xfrm>
+      </p:grpSpPr>
+      <p:pic>
+        <p:nvPicPr>
+          <p:cNvPr id="19" name="Picture 18">
+            <a:extLst>
+              <a:ext uri="{FF2B5EF4-FFF2-40B4-BE49-F238E27FC236}">
+                <a16:creationId xmlns:a16="http://schemas.microsoft.com/office/drawing/2014/main" id="{C4FC0F62-846D-7671-9F45-24E8EEB39857}"/>
+              </a:ext>
+            </a:extLst>
+          </p:cNvPr>
+          <p:cNvPicPr>
+            <a:picLocks noChangeAspect="1"/>
+          </p:cNvPicPr>
+          <p:nvPr/>
+        </p:nvPicPr>
+        <p:blipFill>
+          <a:blip r:embed="rId2"/>
+          <a:stretch>
+            <a:fillRect/>
+          </a:stretch>
+        </p:blipFill>
+        <p:spPr>
+          <a:xfrm>
+            <a:off x="5759450" y="6591080"/>
+            <a:ext cx="673100" cy="165100"/>
+          </a:xfrm>
+          <a:prstGeom prst="rect">
+            <a:avLst/>
+          </a:prstGeom>
+        </p:spPr>
+      </p:pic>
+      <p:pic>
+        <p:nvPicPr>
+          <p:cNvPr id="21" name="Picture 20" descr="A graph of different colors&#10;&#10;Description automatically generated with medium confidence">
+            <a:extLst>
+              <a:ext uri="{FF2B5EF4-FFF2-40B4-BE49-F238E27FC236}">
+                <a16:creationId xmlns:a16="http://schemas.microsoft.com/office/drawing/2014/main" id="{C7CEBF98-F04C-3A49-688A-52BAEF93789E}"/>
+              </a:ext>
+            </a:extLst>
+          </p:cNvPr>
+          <p:cNvPicPr>
+            <a:picLocks noGrp="1" noRot="1" noChangeAspect="1" noMove="1" noResize="1" noEditPoints="1" noAdjustHandles="1" noChangeArrowheads="1" noChangeShapeType="1" noCrop="1"/>
+          </p:cNvPicPr>
+          <p:nvPr/>
+        </p:nvPicPr>
+        <p:blipFill>
+          <a:blip r:embed="rId3"/>
+          <a:stretch>
+            <a:fillRect/>
+          </a:stretch>
+        </p:blipFill>
+        <p:spPr>
+          <a:xfrm>
+            <a:off x="995098" y="571224"/>
+            <a:ext cx="7772400" cy="5181600"/>
+          </a:xfrm>
+          <a:prstGeom prst="rect">
+            <a:avLst/>
+          </a:prstGeom>
+          <a:solidFill>
+            <a:schemeClr val="bg1"/>
+          </a:solidFill>
+          <a:ln>
+            <a:solidFill>
+              <a:schemeClr val="bg1"/>
+            </a:solidFill>
+          </a:ln>
+        </p:spPr>
+      </p:pic>
+      <p:sp>
+        <p:nvSpPr>
+          <p:cNvPr id="22" name="Left Brace 21">
+            <a:extLst>
+              <a:ext uri="{FF2B5EF4-FFF2-40B4-BE49-F238E27FC236}">
+                <a16:creationId xmlns:a16="http://schemas.microsoft.com/office/drawing/2014/main" id="{80C386C9-99D1-83F7-6073-CB3D34F553A9}"/>
+              </a:ext>
+            </a:extLst>
+          </p:cNvPr>
+          <p:cNvSpPr/>
+          <p:nvPr/>
+        </p:nvSpPr>
+        <p:spPr>
+          <a:xfrm rot="16200000">
+            <a:off x="2467351" y="4311728"/>
+            <a:ext cx="145118" cy="1945827"/>
+          </a:xfrm>
+          <a:prstGeom prst="leftBrace">
+            <a:avLst/>
+          </a:prstGeom>
+        </p:spPr>
+        <p:style>
+          <a:lnRef idx="2">
+            <a:schemeClr val="dk1"/>
+          </a:lnRef>
+          <a:fillRef idx="0">
+            <a:schemeClr val="dk1"/>
+          </a:fillRef>
+          <a:effectRef idx="1">
+            <a:schemeClr val="dk1"/>
+          </a:effectRef>
+          <a:fontRef idx="minor">
+            <a:schemeClr val="tx1"/>
+          </a:fontRef>
+        </p:style>
+        <p:txBody>
+          <a:bodyPr rtlCol="0" anchor="ctr"/>
+          <a:lstStyle/>
+          <a:p>
+            <a:pPr algn="ctr"/>
+            <a:endParaRPr lang="en-US"/>
+          </a:p>
+        </p:txBody>
+      </p:sp>
+      <p:sp>
+        <p:nvSpPr>
+          <p:cNvPr id="23" name="Left Brace 22">
+            <a:extLst>
+              <a:ext uri="{FF2B5EF4-FFF2-40B4-BE49-F238E27FC236}">
+                <a16:creationId xmlns:a16="http://schemas.microsoft.com/office/drawing/2014/main" id="{549B9D75-97CC-6E3A-F7CF-69C820AB7CAF}"/>
+              </a:ext>
+            </a:extLst>
+          </p:cNvPr>
+          <p:cNvSpPr/>
+          <p:nvPr/>
+        </p:nvSpPr>
+        <p:spPr>
+          <a:xfrm rot="16200000">
+            <a:off x="5116662" y="3615863"/>
+            <a:ext cx="145119" cy="3337557"/>
+          </a:xfrm>
+          <a:prstGeom prst="leftBrace">
+            <a:avLst/>
+          </a:prstGeom>
+        </p:spPr>
+        <p:style>
+          <a:lnRef idx="2">
+            <a:schemeClr val="dk1"/>
+          </a:lnRef>
+          <a:fillRef idx="0">
+            <a:schemeClr val="dk1"/>
+          </a:fillRef>
+          <a:effectRef idx="1">
+            <a:schemeClr val="dk1"/>
+          </a:effectRef>
+          <a:fontRef idx="minor">
+            <a:schemeClr val="tx1"/>
+          </a:fontRef>
+        </p:style>
+        <p:txBody>
+          <a:bodyPr rtlCol="0" anchor="ctr"/>
+          <a:lstStyle/>
+          <a:p>
+            <a:pPr algn="ctr"/>
+            <a:endParaRPr lang="en-US" dirty="0"/>
+          </a:p>
+        </p:txBody>
+      </p:sp>
+      <p:sp>
+        <p:nvSpPr>
+          <p:cNvPr id="24" name="Left Brace 23">
+            <a:extLst>
+              <a:ext uri="{FF2B5EF4-FFF2-40B4-BE49-F238E27FC236}">
+                <a16:creationId xmlns:a16="http://schemas.microsoft.com/office/drawing/2014/main" id="{0DEB6670-1892-2FD8-6F2C-71C5B5ECCDDA}"/>
+              </a:ext>
+            </a:extLst>
+          </p:cNvPr>
+          <p:cNvSpPr/>
+          <p:nvPr/>
+        </p:nvSpPr>
+        <p:spPr>
+          <a:xfrm rot="16200000">
+            <a:off x="7164878" y="4935083"/>
+            <a:ext cx="145121" cy="688923"/>
+          </a:xfrm>
+          <a:prstGeom prst="leftBrace">
+            <a:avLst/>
+          </a:prstGeom>
+        </p:spPr>
+        <p:style>
+          <a:lnRef idx="2">
+            <a:schemeClr val="dk1"/>
+          </a:lnRef>
+          <a:fillRef idx="0">
+            <a:schemeClr val="dk1"/>
+          </a:fillRef>
+          <a:effectRef idx="1">
+            <a:schemeClr val="dk1"/>
+          </a:effectRef>
+          <a:fontRef idx="minor">
+            <a:schemeClr val="tx1"/>
+          </a:fontRef>
+        </p:style>
+        <p:txBody>
+          <a:bodyPr rtlCol="0" anchor="ctr"/>
+          <a:lstStyle/>
+          <a:p>
+            <a:pPr algn="ctr"/>
+            <a:endParaRPr lang="en-US"/>
+          </a:p>
+        </p:txBody>
+      </p:sp>
+      <p:pic>
+        <p:nvPicPr>
+          <p:cNvPr id="25" name="Graphic 24" descr="Dim (Smaller Sun) with solid fill">
+            <a:extLst>
+              <a:ext uri="{FF2B5EF4-FFF2-40B4-BE49-F238E27FC236}">
+                <a16:creationId xmlns:a16="http://schemas.microsoft.com/office/drawing/2014/main" id="{34DF8DC7-E649-7CCD-DFE1-918609AD813A}"/>
+              </a:ext>
+            </a:extLst>
+          </p:cNvPr>
+          <p:cNvPicPr>
+            <a:picLocks noChangeAspect="1"/>
+          </p:cNvPicPr>
+          <p:nvPr/>
+        </p:nvPicPr>
+        <p:blipFill>
+          <a:blip r:embed="rId4">
+            <a:extLst>
+              <a:ext uri="{96DAC541-7B7A-43D3-8B79-37D633B846F1}">
+                <asvg:svgBlip xmlns:asvg="http://schemas.microsoft.com/office/drawing/2016/SVG/main" r:embed="rId5"/>
+              </a:ext>
+            </a:extLst>
+          </a:blip>
+          <a:stretch>
+            <a:fillRect/>
+          </a:stretch>
+        </p:blipFill>
+        <p:spPr>
+          <a:xfrm>
+            <a:off x="4920291" y="5373294"/>
+            <a:ext cx="537859" cy="431004"/>
+          </a:xfrm>
+          <a:prstGeom prst="rect">
+            <a:avLst/>
+          </a:prstGeom>
+        </p:spPr>
+      </p:pic>
+      <p:pic>
+        <p:nvPicPr>
+          <p:cNvPr id="26" name="Graphic 25" descr="Sunset scene with solid fill">
+            <a:extLst>
+              <a:ext uri="{FF2B5EF4-FFF2-40B4-BE49-F238E27FC236}">
+                <a16:creationId xmlns:a16="http://schemas.microsoft.com/office/drawing/2014/main" id="{3E93944A-2568-2A47-F431-72806A93C41F}"/>
+              </a:ext>
+            </a:extLst>
+          </p:cNvPr>
+          <p:cNvPicPr>
+            <a:picLocks noChangeAspect="1"/>
+          </p:cNvPicPr>
+          <p:nvPr/>
+        </p:nvPicPr>
+        <p:blipFill>
+          <a:blip r:embed="rId6">
+            <a:extLst>
+              <a:ext uri="{96DAC541-7B7A-43D3-8B79-37D633B846F1}">
+                <asvg:svgBlip xmlns:asvg="http://schemas.microsoft.com/office/drawing/2016/SVG/main" r:embed="rId7"/>
+              </a:ext>
+            </a:extLst>
+          </a:blip>
+          <a:stretch>
+            <a:fillRect/>
+          </a:stretch>
+        </p:blipFill>
+        <p:spPr>
+          <a:xfrm>
+            <a:off x="2315631" y="5357201"/>
+            <a:ext cx="448557" cy="448557"/>
+          </a:xfrm>
+          <a:prstGeom prst="rect">
+            <a:avLst/>
+          </a:prstGeom>
+        </p:spPr>
+      </p:pic>
+      <p:pic>
+        <p:nvPicPr>
+          <p:cNvPr id="27" name="Graphic 26" descr="Moon with solid fill">
+            <a:extLst>
+              <a:ext uri="{FF2B5EF4-FFF2-40B4-BE49-F238E27FC236}">
+                <a16:creationId xmlns:a16="http://schemas.microsoft.com/office/drawing/2014/main" id="{EFD9C02F-2080-BFB7-E1CB-F13A93B0D6FD}"/>
+              </a:ext>
+            </a:extLst>
+          </p:cNvPr>
+          <p:cNvPicPr>
+            <a:picLocks noChangeAspect="1"/>
+          </p:cNvPicPr>
+          <p:nvPr/>
+        </p:nvPicPr>
+        <p:blipFill>
+          <a:blip r:embed="rId8">
+            <a:extLst>
+              <a:ext uri="{96DAC541-7B7A-43D3-8B79-37D633B846F1}">
+                <asvg:svgBlip xmlns:asvg="http://schemas.microsoft.com/office/drawing/2016/SVG/main" r:embed="rId9"/>
+              </a:ext>
+            </a:extLst>
+          </a:blip>
+          <a:stretch>
+            <a:fillRect/>
+          </a:stretch>
+        </p:blipFill>
+        <p:spPr>
+          <a:xfrm>
+            <a:off x="7050052" y="5392701"/>
+            <a:ext cx="296536" cy="296536"/>
+          </a:xfrm>
+          <a:prstGeom prst="rect">
+            <a:avLst/>
+          </a:prstGeom>
+        </p:spPr>
+      </p:pic>
+      <p:pic>
+        <p:nvPicPr>
+          <p:cNvPr id="29" name="Picture 28" descr="A black text on a white background&#10;&#10;Description automatically generated">
+            <a:extLst>
+              <a:ext uri="{FF2B5EF4-FFF2-40B4-BE49-F238E27FC236}">
+                <a16:creationId xmlns:a16="http://schemas.microsoft.com/office/drawing/2014/main" id="{6A29DD22-27FA-802B-7F8A-AA43FD584472}"/>
+              </a:ext>
+            </a:extLst>
+          </p:cNvPr>
+          <p:cNvPicPr>
+            <a:picLocks noChangeAspect="1"/>
+          </p:cNvPicPr>
+          <p:nvPr/>
+        </p:nvPicPr>
+        <p:blipFill>
+          <a:blip r:embed="rId10"/>
+          <a:stretch>
+            <a:fillRect/>
+          </a:stretch>
+        </p:blipFill>
+        <p:spPr>
+          <a:xfrm>
+            <a:off x="4260104" y="5909868"/>
+            <a:ext cx="660187" cy="257216"/>
+          </a:xfrm>
+          <a:prstGeom prst="rect">
+            <a:avLst/>
+          </a:prstGeom>
+        </p:spPr>
+      </p:pic>
+      <p:sp>
+        <p:nvSpPr>
+          <p:cNvPr id="30" name="Rectangle 29">
+            <a:extLst>
+              <a:ext uri="{FF2B5EF4-FFF2-40B4-BE49-F238E27FC236}">
+                <a16:creationId xmlns:a16="http://schemas.microsoft.com/office/drawing/2014/main" id="{79237155-8A7D-E590-B6BB-5D3C07B713CE}"/>
+              </a:ext>
+            </a:extLst>
+          </p:cNvPr>
+          <p:cNvSpPr/>
+          <p:nvPr/>
+        </p:nvSpPr>
+        <p:spPr>
+          <a:xfrm>
+            <a:off x="4099389" y="5514245"/>
+            <a:ext cx="781909" cy="238579"/>
+          </a:xfrm>
+          <a:prstGeom prst="rect">
+            <a:avLst/>
+          </a:prstGeom>
+          <a:solidFill>
+            <a:schemeClr val="bg1"/>
+          </a:solidFill>
+          <a:ln>
+            <a:solidFill>
+              <a:schemeClr val="bg1"/>
+            </a:solidFill>
+          </a:ln>
+        </p:spPr>
+        <p:style>
+          <a:lnRef idx="2">
+            <a:schemeClr val="accent1">
+              <a:shade val="15000"/>
+            </a:schemeClr>
+          </a:lnRef>
+          <a:fillRef idx="1">
+            <a:schemeClr val="accent1"/>
+          </a:fillRef>
+          <a:effectRef idx="0">
+            <a:schemeClr val="accent1"/>
+          </a:effectRef>
+          <a:fontRef idx="minor">
+            <a:schemeClr val="lt1"/>
+          </a:fontRef>
+        </p:style>
+        <p:txBody>
+          <a:bodyPr rtlCol="0" anchor="ctr"/>
+          <a:lstStyle/>
+          <a:p>
+            <a:pPr algn="ctr"/>
+            <a:endParaRPr lang="en-US"/>
+          </a:p>
+        </p:txBody>
+      </p:sp>
+      <p:sp>
+        <p:nvSpPr>
+          <p:cNvPr id="31" name="Rectangle 30">
+            <a:extLst>
+              <a:ext uri="{FF2B5EF4-FFF2-40B4-BE49-F238E27FC236}">
+                <a16:creationId xmlns:a16="http://schemas.microsoft.com/office/drawing/2014/main" id="{D3DFB28C-4700-63CF-4944-8A397752612C}"/>
+              </a:ext>
+            </a:extLst>
+          </p:cNvPr>
+          <p:cNvSpPr/>
+          <p:nvPr/>
+        </p:nvSpPr>
+        <p:spPr>
+          <a:xfrm>
+            <a:off x="1566996" y="5113972"/>
+            <a:ext cx="1945828" cy="145120"/>
+          </a:xfrm>
+          <a:prstGeom prst="rect">
+            <a:avLst/>
+          </a:prstGeom>
+          <a:solidFill>
+            <a:schemeClr val="accent5">
+              <a:lumMod val="20000"/>
+              <a:lumOff val="80000"/>
+              <a:alpha val="52157"/>
+            </a:schemeClr>
+          </a:solidFill>
+          <a:ln>
+            <a:noFill/>
+          </a:ln>
+        </p:spPr>
+        <p:style>
+          <a:lnRef idx="2">
+            <a:schemeClr val="accent1">
+              <a:shade val="15000"/>
+            </a:schemeClr>
+          </a:lnRef>
+          <a:fillRef idx="1">
+            <a:schemeClr val="accent1"/>
+          </a:fillRef>
+          <a:effectRef idx="0">
+            <a:schemeClr val="accent1"/>
+          </a:effectRef>
+          <a:fontRef idx="minor">
+            <a:schemeClr val="lt1"/>
+          </a:fontRef>
+        </p:style>
+        <p:txBody>
+          <a:bodyPr rtlCol="0" anchor="ctr"/>
+          <a:lstStyle/>
+          <a:p>
+            <a:pPr algn="ctr"/>
+            <a:endParaRPr lang="en-US"/>
+          </a:p>
+        </p:txBody>
+      </p:sp>
+      <p:sp>
+        <p:nvSpPr>
+          <p:cNvPr id="32" name="Rectangle 31">
+            <a:extLst>
+              <a:ext uri="{FF2B5EF4-FFF2-40B4-BE49-F238E27FC236}">
+                <a16:creationId xmlns:a16="http://schemas.microsoft.com/office/drawing/2014/main" id="{53474B5C-8ED7-D6E8-FD10-ECA191C76425}"/>
+              </a:ext>
+            </a:extLst>
+          </p:cNvPr>
+          <p:cNvSpPr/>
+          <p:nvPr/>
+        </p:nvSpPr>
+        <p:spPr>
+          <a:xfrm>
+            <a:off x="3520443" y="5134248"/>
+            <a:ext cx="3337557" cy="124844"/>
+          </a:xfrm>
+          <a:prstGeom prst="rect">
+            <a:avLst/>
+          </a:prstGeom>
+          <a:solidFill>
+            <a:srgbClr val="FFD579">
+              <a:alpha val="60000"/>
+            </a:srgbClr>
+          </a:solidFill>
+          <a:ln>
+            <a:noFill/>
+          </a:ln>
+        </p:spPr>
+        <p:style>
+          <a:lnRef idx="2">
+            <a:schemeClr val="accent1">
+              <a:shade val="15000"/>
+            </a:schemeClr>
+          </a:lnRef>
+          <a:fillRef idx="1">
+            <a:schemeClr val="accent1"/>
+          </a:fillRef>
+          <a:effectRef idx="0">
+            <a:schemeClr val="accent1"/>
+          </a:effectRef>
+          <a:fontRef idx="minor">
+            <a:schemeClr val="lt1"/>
+          </a:fontRef>
+        </p:style>
+        <p:txBody>
+          <a:bodyPr rtlCol="0" anchor="ctr"/>
+          <a:lstStyle/>
+          <a:p>
+            <a:pPr algn="ctr"/>
+            <a:endParaRPr lang="en-US"/>
+          </a:p>
+        </p:txBody>
+      </p:sp>
+      <p:sp>
+        <p:nvSpPr>
+          <p:cNvPr id="33" name="Rectangle 32">
+            <a:extLst>
+              <a:ext uri="{FF2B5EF4-FFF2-40B4-BE49-F238E27FC236}">
+                <a16:creationId xmlns:a16="http://schemas.microsoft.com/office/drawing/2014/main" id="{E15F381E-EB69-1C0C-6EFD-544538A54806}"/>
+              </a:ext>
+            </a:extLst>
+          </p:cNvPr>
+          <p:cNvSpPr/>
+          <p:nvPr/>
+        </p:nvSpPr>
+        <p:spPr>
+          <a:xfrm>
+            <a:off x="6892977" y="5146818"/>
+            <a:ext cx="688924" cy="121595"/>
+          </a:xfrm>
+          <a:prstGeom prst="rect">
+            <a:avLst/>
+          </a:prstGeom>
+          <a:solidFill>
+            <a:srgbClr val="002060">
+              <a:alpha val="60000"/>
+            </a:srgbClr>
+          </a:solidFill>
+          <a:ln>
+            <a:noFill/>
+          </a:ln>
+        </p:spPr>
+        <p:style>
+          <a:lnRef idx="2">
+            <a:schemeClr val="accent1">
+              <a:shade val="15000"/>
+            </a:schemeClr>
+          </a:lnRef>
+          <a:fillRef idx="1">
+            <a:schemeClr val="accent1"/>
+          </a:fillRef>
+          <a:effectRef idx="0">
+            <a:schemeClr val="accent1"/>
+          </a:effectRef>
+          <a:fontRef idx="minor">
+            <a:schemeClr val="lt1"/>
+          </a:fontRef>
+        </p:style>
+        <p:txBody>
+          <a:bodyPr rtlCol="0" anchor="ctr"/>
+          <a:lstStyle/>
+          <a:p>
+            <a:pPr algn="ctr"/>
+            <a:endParaRPr lang="en-US"/>
+          </a:p>
+        </p:txBody>
+      </p:sp>
+    </p:spTree>
+    <p:extLst>
+      <p:ext uri="{BB962C8B-B14F-4D97-AF65-F5344CB8AC3E}">
+        <p14:creationId xmlns:p14="http://schemas.microsoft.com/office/powerpoint/2010/main" val="2246680622"/>
+      </p:ext>
+    </p:extLst>
+  </p:cSld>
+  <p:clrMapOvr>
+    <a:masterClrMapping/>
+  </p:clrMapOvr>
+</p:sld>
+</file>
+
+<file path=ppt/slides/slide6.xml><?xml version="1.0" encoding="utf-8"?>
+<p:sld xmlns:a="http://schemas.openxmlformats.org/drawingml/2006/main" xmlns:r="http://schemas.openxmlformats.org/officeDocument/2006/relationships" xmlns:p="http://schemas.openxmlformats.org/presentationml/2006/main">
+  <p:cSld>
+    <p:spTree>
+      <p:nvGrpSpPr>
+        <p:cNvPr id="1" name=""/>
+        <p:cNvGrpSpPr/>
+        <p:nvPr/>
+      </p:nvGrpSpPr>
+      <p:grpSpPr>
+        <a:xfrm>
+          <a:off x="0" y="0"/>
+          <a:ext cx="0" cy="0"/>
+          <a:chOff x="0" y="0"/>
+          <a:chExt cx="0" cy="0"/>
+        </a:xfrm>
+      </p:grpSpPr>
+      <p:pic>
+        <p:nvPicPr>
+          <p:cNvPr id="4" name="Picture 3">
+            <a:extLst>
+              <a:ext uri="{FF2B5EF4-FFF2-40B4-BE49-F238E27FC236}">
+                <a16:creationId xmlns:a16="http://schemas.microsoft.com/office/drawing/2014/main" id="{1844EA73-0371-6BBC-A790-292887CC75CC}"/>
+              </a:ext>
+            </a:extLst>
+          </p:cNvPr>
+          <p:cNvPicPr>
+            <a:picLocks noChangeAspect="1"/>
+          </p:cNvPicPr>
+          <p:nvPr/>
+        </p:nvPicPr>
+        <p:blipFill>
+          <a:blip r:embed="rId2"/>
+          <a:stretch>
+            <a:fillRect/>
+          </a:stretch>
+        </p:blipFill>
+        <p:spPr>
+          <a:xfrm>
+            <a:off x="544856" y="424660"/>
+            <a:ext cx="9557816" cy="6008679"/>
+          </a:xfrm>
+          <a:prstGeom prst="rect">
+            <a:avLst/>
+          </a:prstGeom>
+        </p:spPr>
+      </p:pic>
+      <p:sp>
+        <p:nvSpPr>
+          <p:cNvPr id="12" name="Left Brace 11">
+            <a:extLst>
+              <a:ext uri="{FF2B5EF4-FFF2-40B4-BE49-F238E27FC236}">
+                <a16:creationId xmlns:a16="http://schemas.microsoft.com/office/drawing/2014/main" id="{B7E57170-6FFE-D5B1-08D6-55B703ADF37B}"/>
+              </a:ext>
+            </a:extLst>
+          </p:cNvPr>
+          <p:cNvSpPr/>
+          <p:nvPr/>
+        </p:nvSpPr>
+        <p:spPr>
+          <a:xfrm rot="16200000">
+            <a:off x="2531022" y="4329712"/>
+            <a:ext cx="257642" cy="2237569"/>
+          </a:xfrm>
+          <a:prstGeom prst="leftBrace">
+            <a:avLst/>
+          </a:prstGeom>
+          <a:ln w="38100">
+            <a:solidFill>
+              <a:schemeClr val="accent5">
+                <a:lumMod val="40000"/>
+                <a:lumOff val="60000"/>
+              </a:schemeClr>
+            </a:solidFill>
+          </a:ln>
+        </p:spPr>
+        <p:style>
+          <a:lnRef idx="2">
+            <a:schemeClr val="dk1"/>
+          </a:lnRef>
+          <a:fillRef idx="0">
+            <a:schemeClr val="dk1"/>
+          </a:fillRef>
+          <a:effectRef idx="1">
+            <a:schemeClr val="dk1"/>
+          </a:effectRef>
+          <a:fontRef idx="minor">
+            <a:schemeClr val="tx1"/>
+          </a:fontRef>
+        </p:style>
+        <p:txBody>
+          <a:bodyPr rtlCol="0" anchor="ctr"/>
+          <a:lstStyle/>
+          <a:p>
+            <a:pPr algn="ctr"/>
+            <a:endParaRPr lang="en-US"/>
+          </a:p>
+        </p:txBody>
+      </p:sp>
+      <p:sp>
+        <p:nvSpPr>
+          <p:cNvPr id="13" name="Left Brace 12">
+            <a:extLst>
+              <a:ext uri="{FF2B5EF4-FFF2-40B4-BE49-F238E27FC236}">
+                <a16:creationId xmlns:a16="http://schemas.microsoft.com/office/drawing/2014/main" id="{73B5A2D6-20B5-60D9-27BF-6EFEA277A6AE}"/>
+              </a:ext>
+            </a:extLst>
+          </p:cNvPr>
+          <p:cNvSpPr/>
+          <p:nvPr/>
+        </p:nvSpPr>
+        <p:spPr>
+          <a:xfrm rot="16200000">
+            <a:off x="5563692" y="3548060"/>
+            <a:ext cx="223855" cy="3793985"/>
+          </a:xfrm>
+          <a:prstGeom prst="leftBrace">
+            <a:avLst/>
+          </a:prstGeom>
+          <a:ln w="38100">
+            <a:solidFill>
+              <a:srgbClr val="FFC000"/>
+            </a:solidFill>
+          </a:ln>
+        </p:spPr>
+        <p:style>
+          <a:lnRef idx="2">
+            <a:schemeClr val="dk1"/>
+          </a:lnRef>
+          <a:fillRef idx="0">
+            <a:schemeClr val="dk1"/>
+          </a:fillRef>
+          <a:effectRef idx="1">
+            <a:schemeClr val="dk1"/>
+          </a:effectRef>
+          <a:fontRef idx="minor">
+            <a:schemeClr val="tx1"/>
+          </a:fontRef>
+        </p:style>
+        <p:txBody>
+          <a:bodyPr rtlCol="0" anchor="ctr"/>
+          <a:lstStyle/>
+          <a:p>
+            <a:pPr algn="ctr"/>
+            <a:endParaRPr lang="en-US" dirty="0"/>
+          </a:p>
+        </p:txBody>
+      </p:sp>
+      <p:pic>
+        <p:nvPicPr>
+          <p:cNvPr id="14" name="Graphic 13" descr="Dim (Smaller Sun) with solid fill">
+            <a:extLst>
+              <a:ext uri="{FF2B5EF4-FFF2-40B4-BE49-F238E27FC236}">
+                <a16:creationId xmlns:a16="http://schemas.microsoft.com/office/drawing/2014/main" id="{2A17FD34-2ACF-2065-3DD7-C06F4AB0817A}"/>
+              </a:ext>
+            </a:extLst>
+          </p:cNvPr>
+          <p:cNvPicPr>
+            <a:picLocks noChangeAspect="1"/>
+          </p:cNvPicPr>
+          <p:nvPr/>
+        </p:nvPicPr>
+        <p:blipFill>
+          <a:blip r:embed="rId3">
+            <a:extLst>
+              <a:ext uri="{96DAC541-7B7A-43D3-8B79-37D633B846F1}">
+                <asvg:svgBlip xmlns:asvg="http://schemas.microsoft.com/office/drawing/2016/SVG/main" r:embed="rId4"/>
+              </a:ext>
+            </a:extLst>
+          </a:blip>
+          <a:stretch>
+            <a:fillRect/>
+          </a:stretch>
+        </p:blipFill>
+        <p:spPr>
+          <a:xfrm>
+            <a:off x="5406690" y="5531449"/>
+            <a:ext cx="537859" cy="431004"/>
+          </a:xfrm>
+          <a:prstGeom prst="rect">
+            <a:avLst/>
+          </a:prstGeom>
+        </p:spPr>
+      </p:pic>
+      <p:pic>
+        <p:nvPicPr>
+          <p:cNvPr id="15" name="Graphic 14" descr="Sunset scene with solid fill">
+            <a:extLst>
+              <a:ext uri="{FF2B5EF4-FFF2-40B4-BE49-F238E27FC236}">
+                <a16:creationId xmlns:a16="http://schemas.microsoft.com/office/drawing/2014/main" id="{3E515650-8BD2-0DED-8D0A-EA165B4763DD}"/>
+              </a:ext>
+            </a:extLst>
+          </p:cNvPr>
+          <p:cNvPicPr>
+            <a:picLocks noChangeAspect="1"/>
+          </p:cNvPicPr>
+          <p:nvPr/>
+        </p:nvPicPr>
+        <p:blipFill>
+          <a:blip r:embed="rId5">
+            <a:extLst>
+              <a:ext uri="{96DAC541-7B7A-43D3-8B79-37D633B846F1}">
+                <asvg:svgBlip xmlns:asvg="http://schemas.microsoft.com/office/drawing/2016/SVG/main" r:embed="rId6"/>
+              </a:ext>
+            </a:extLst>
+          </a:blip>
+          <a:stretch>
+            <a:fillRect/>
+          </a:stretch>
+        </p:blipFill>
+        <p:spPr>
+          <a:xfrm>
+            <a:off x="2435564" y="5556771"/>
+            <a:ext cx="448557" cy="448557"/>
+          </a:xfrm>
+          <a:prstGeom prst="rect">
+            <a:avLst/>
+          </a:prstGeom>
+        </p:spPr>
+      </p:pic>
+      <p:pic>
+        <p:nvPicPr>
+          <p:cNvPr id="16" name="Graphic 15" descr="Moon with solid fill">
+            <a:extLst>
+              <a:ext uri="{FF2B5EF4-FFF2-40B4-BE49-F238E27FC236}">
+                <a16:creationId xmlns:a16="http://schemas.microsoft.com/office/drawing/2014/main" id="{DB6C1273-1C0C-E18E-8C57-E20E663AAF65}"/>
+              </a:ext>
+            </a:extLst>
+          </p:cNvPr>
+          <p:cNvPicPr>
+            <a:picLocks noChangeAspect="1"/>
+          </p:cNvPicPr>
+          <p:nvPr/>
+        </p:nvPicPr>
+        <p:blipFill>
+          <a:blip r:embed="rId7">
+            <a:extLst>
+              <a:ext uri="{96DAC541-7B7A-43D3-8B79-37D633B846F1}">
+                <asvg:svgBlip xmlns:asvg="http://schemas.microsoft.com/office/drawing/2016/SVG/main" r:embed="rId8"/>
+              </a:ext>
+            </a:extLst>
+          </a:blip>
+          <a:stretch>
+            <a:fillRect/>
+          </a:stretch>
+        </p:blipFill>
+        <p:spPr>
+          <a:xfrm>
+            <a:off x="7825478" y="5598683"/>
+            <a:ext cx="296536" cy="296536"/>
+          </a:xfrm>
+          <a:prstGeom prst="rect">
+            <a:avLst/>
+          </a:prstGeom>
+        </p:spPr>
+      </p:pic>
+      <p:sp>
+        <p:nvSpPr>
+          <p:cNvPr id="17" name="Left Brace 16">
+            <a:extLst>
+              <a:ext uri="{FF2B5EF4-FFF2-40B4-BE49-F238E27FC236}">
+                <a16:creationId xmlns:a16="http://schemas.microsoft.com/office/drawing/2014/main" id="{E077A77C-1BE9-A47C-CD88-50A21D114C2E}"/>
+              </a:ext>
+            </a:extLst>
+          </p:cNvPr>
+          <p:cNvSpPr/>
+          <p:nvPr/>
+        </p:nvSpPr>
+        <p:spPr>
+          <a:xfrm rot="16200000">
+            <a:off x="7846244" y="5081618"/>
+            <a:ext cx="255005" cy="758021"/>
+          </a:xfrm>
+          <a:prstGeom prst="leftBrace">
+            <a:avLst/>
+          </a:prstGeom>
+          <a:ln w="38100">
+            <a:solidFill>
+              <a:srgbClr val="002060"/>
+            </a:solidFill>
+          </a:ln>
+        </p:spPr>
+        <p:style>
+          <a:lnRef idx="2">
+            <a:schemeClr val="dk1"/>
+          </a:lnRef>
+          <a:fillRef idx="0">
+            <a:schemeClr val="dk1"/>
+          </a:fillRef>
+          <a:effectRef idx="1">
+            <a:schemeClr val="dk1"/>
+          </a:effectRef>
+          <a:fontRef idx="minor">
+            <a:schemeClr val="tx1"/>
+          </a:fontRef>
+        </p:style>
+        <p:txBody>
+          <a:bodyPr rtlCol="0" anchor="ctr"/>
+          <a:lstStyle/>
+          <a:p>
+            <a:pPr algn="ctr"/>
+            <a:endParaRPr lang="en-US"/>
+          </a:p>
+        </p:txBody>
+      </p:sp>
+    </p:spTree>
+    <p:extLst>
+      <p:ext uri="{BB962C8B-B14F-4D97-AF65-F5344CB8AC3E}">
         <p14:creationId xmlns:p14="http://schemas.microsoft.com/office/powerpoint/2010/main" val="3851030990"/>
       </p:ext>
     </p:extLst>
@@ -6355,7 +6987,7 @@
 </p:sld>
 </file>
 
-<file path=ppt/slides/slide5.xml><?xml version="1.0" encoding="utf-8"?>
+<file path=ppt/slides/slide7.xml><?xml version="1.0" encoding="utf-8"?>
 <p:sld xmlns:a="http://schemas.openxmlformats.org/drawingml/2006/main" xmlns:r="http://schemas.openxmlformats.org/officeDocument/2006/relationships" xmlns:p="http://schemas.openxmlformats.org/presentationml/2006/main">
   <p:cSld>
     <p:spTree>
@@ -6748,7 +7380,7 @@
 </p:sld>
 </file>
 
-<file path=ppt/slides/slide6.xml><?xml version="1.0" encoding="utf-8"?>
+<file path=ppt/slides/slide8.xml><?xml version="1.0" encoding="utf-8"?>
 <p:sld xmlns:a="http://schemas.openxmlformats.org/drawingml/2006/main" xmlns:r="http://schemas.openxmlformats.org/officeDocument/2006/relationships" xmlns:p="http://schemas.openxmlformats.org/presentationml/2006/main">
   <p:cSld>
     <p:spTree>
@@ -7080,7 +7712,7 @@
 </p:sld>
 </file>
 
-<file path=ppt/slides/slide7.xml><?xml version="1.0" encoding="utf-8"?>
+<file path=ppt/slides/slide9.xml><?xml version="1.0" encoding="utf-8"?>
 <p:sld xmlns:a="http://schemas.openxmlformats.org/drawingml/2006/main" xmlns:r="http://schemas.openxmlformats.org/officeDocument/2006/relationships" xmlns:p="http://schemas.openxmlformats.org/presentationml/2006/main">
   <p:cSld>
     <p:spTree>
@@ -7401,638 +8033,6 @@
     <p:extLst>
       <p:ext uri="{BB962C8B-B14F-4D97-AF65-F5344CB8AC3E}">
         <p14:creationId xmlns:p14="http://schemas.microsoft.com/office/powerpoint/2010/main" val="1904014805"/>
-      </p:ext>
-    </p:extLst>
-  </p:cSld>
-  <p:clrMapOvr>
-    <a:masterClrMapping/>
-  </p:clrMapOvr>
-</p:sld>
-</file>
-
-<file path=ppt/slides/slide8.xml><?xml version="1.0" encoding="utf-8"?>
-<p:sld xmlns:a="http://schemas.openxmlformats.org/drawingml/2006/main" xmlns:r="http://schemas.openxmlformats.org/officeDocument/2006/relationships" xmlns:p="http://schemas.openxmlformats.org/presentationml/2006/main">
-  <p:cSld>
-    <p:spTree>
-      <p:nvGrpSpPr>
-        <p:cNvPr id="1" name=""/>
-        <p:cNvGrpSpPr/>
-        <p:nvPr/>
-      </p:nvGrpSpPr>
-      <p:grpSpPr>
-        <a:xfrm>
-          <a:off x="0" y="0"/>
-          <a:ext cx="0" cy="0"/>
-          <a:chOff x="0" y="0"/>
-          <a:chExt cx="0" cy="0"/>
-        </a:xfrm>
-      </p:grpSpPr>
-      <p:pic>
-        <p:nvPicPr>
-          <p:cNvPr id="4" name="Picture 3">
-            <a:extLst>
-              <a:ext uri="{FF2B5EF4-FFF2-40B4-BE49-F238E27FC236}">
-                <a16:creationId xmlns:a16="http://schemas.microsoft.com/office/drawing/2014/main" id="{3E29D6A6-D834-9BA7-1C59-79E2074C7C61}"/>
-              </a:ext>
-            </a:extLst>
-          </p:cNvPr>
-          <p:cNvPicPr>
-            <a:picLocks noChangeAspect="1"/>
-          </p:cNvPicPr>
-          <p:nvPr/>
-        </p:nvPicPr>
-        <p:blipFill>
-          <a:blip r:embed="rId2"/>
-          <a:srcRect t="8748" b="16505"/>
-          <a:stretch/>
-        </p:blipFill>
-        <p:spPr>
-          <a:xfrm>
-            <a:off x="661398" y="1658471"/>
-            <a:ext cx="9557816" cy="4491318"/>
-          </a:xfrm>
-          <a:prstGeom prst="rect">
-            <a:avLst/>
-          </a:prstGeom>
-        </p:spPr>
-      </p:pic>
-      <p:sp>
-        <p:nvSpPr>
-          <p:cNvPr id="8" name="Rectangle 7">
-            <a:extLst>
-              <a:ext uri="{FF2B5EF4-FFF2-40B4-BE49-F238E27FC236}">
-                <a16:creationId xmlns:a16="http://schemas.microsoft.com/office/drawing/2014/main" id="{737D3D71-A354-CE22-66D7-334FC64CA4B8}"/>
-              </a:ext>
-            </a:extLst>
-          </p:cNvPr>
-          <p:cNvSpPr/>
-          <p:nvPr/>
-        </p:nvSpPr>
-        <p:spPr>
-          <a:xfrm flipH="1">
-            <a:off x="1716608" y="1405574"/>
-            <a:ext cx="6767635" cy="296535"/>
-          </a:xfrm>
-          <a:prstGeom prst="rect">
-            <a:avLst/>
-          </a:prstGeom>
-          <a:gradFill flip="none" rotWithShape="1">
-            <a:gsLst>
-              <a:gs pos="18000">
-                <a:srgbClr val="FF3A74">
-                  <a:alpha val="28235"/>
-                </a:srgbClr>
-              </a:gs>
-              <a:gs pos="96000">
-                <a:srgbClr val="150E22">
-                  <a:alpha val="78821"/>
-                </a:srgbClr>
-              </a:gs>
-              <a:gs pos="87000">
-                <a:srgbClr val="FFEAB5"/>
-              </a:gs>
-              <a:gs pos="37000">
-                <a:srgbClr val="FFEAB5"/>
-              </a:gs>
-            </a:gsLst>
-            <a:lin ang="10800000" scaled="1"/>
-            <a:tileRect/>
-          </a:gradFill>
-          <a:ln>
-            <a:noFill/>
-          </a:ln>
-        </p:spPr>
-        <p:style>
-          <a:lnRef idx="2">
-            <a:schemeClr val="accent1">
-              <a:shade val="15000"/>
-            </a:schemeClr>
-          </a:lnRef>
-          <a:fillRef idx="1">
-            <a:schemeClr val="accent1"/>
-          </a:fillRef>
-          <a:effectRef idx="0">
-            <a:schemeClr val="accent1"/>
-          </a:effectRef>
-          <a:fontRef idx="minor">
-            <a:schemeClr val="lt1"/>
-          </a:fontRef>
-        </p:style>
-        <p:txBody>
-          <a:bodyPr rtlCol="0" anchor="ctr"/>
-          <a:lstStyle/>
-          <a:p>
-            <a:pPr algn="ctr"/>
-            <a:endParaRPr lang="en-US" dirty="0"/>
-          </a:p>
-        </p:txBody>
-      </p:sp>
-      <p:cxnSp>
-        <p:nvCxnSpPr>
-          <p:cNvPr id="10" name="Straight Connector 9">
-            <a:extLst>
-              <a:ext uri="{FF2B5EF4-FFF2-40B4-BE49-F238E27FC236}">
-                <a16:creationId xmlns:a16="http://schemas.microsoft.com/office/drawing/2014/main" id="{6E349895-A86D-B330-664A-914DD46252CE}"/>
-              </a:ext>
-            </a:extLst>
-          </p:cNvPr>
-          <p:cNvCxnSpPr>
-            <a:cxnSpLocks/>
-          </p:cNvCxnSpPr>
-          <p:nvPr/>
-        </p:nvCxnSpPr>
-        <p:spPr>
-          <a:xfrm>
-            <a:off x="3900126" y="1405574"/>
-            <a:ext cx="0" cy="296535"/>
-          </a:xfrm>
-          <a:prstGeom prst="line">
-            <a:avLst/>
-          </a:prstGeom>
-        </p:spPr>
-        <p:style>
-          <a:lnRef idx="2">
-            <a:schemeClr val="dk1"/>
-          </a:lnRef>
-          <a:fillRef idx="0">
-            <a:schemeClr val="dk1"/>
-          </a:fillRef>
-          <a:effectRef idx="1">
-            <a:schemeClr val="dk1"/>
-          </a:effectRef>
-          <a:fontRef idx="minor">
-            <a:schemeClr val="tx1"/>
-          </a:fontRef>
-        </p:style>
-      </p:cxnSp>
-      <p:pic>
-        <p:nvPicPr>
-          <p:cNvPr id="12" name="Graphic 11" descr="Sunset scene with solid fill">
-            <a:extLst>
-              <a:ext uri="{FF2B5EF4-FFF2-40B4-BE49-F238E27FC236}">
-                <a16:creationId xmlns:a16="http://schemas.microsoft.com/office/drawing/2014/main" id="{20FCA15A-7F5F-E96C-DD08-EEC7F7848C2C}"/>
-              </a:ext>
-            </a:extLst>
-          </p:cNvPr>
-          <p:cNvPicPr>
-            <a:picLocks noChangeAspect="1"/>
-          </p:cNvPicPr>
-          <p:nvPr/>
-        </p:nvPicPr>
-        <p:blipFill>
-          <a:blip r:embed="rId3">
-            <a:extLst>
-              <a:ext uri="{96DAC541-7B7A-43D3-8B79-37D633B846F1}">
-                <asvg:svgBlip xmlns:asvg="http://schemas.microsoft.com/office/drawing/2016/SVG/main" r:embed="rId4"/>
-              </a:ext>
-            </a:extLst>
-          </a:blip>
-          <a:stretch>
-            <a:fillRect/>
-          </a:stretch>
-        </p:blipFill>
-        <p:spPr>
-          <a:xfrm>
-            <a:off x="2496505" y="1366748"/>
-            <a:ext cx="374186" cy="374186"/>
-          </a:xfrm>
-          <a:prstGeom prst="rect">
-            <a:avLst/>
-          </a:prstGeom>
-        </p:spPr>
-      </p:pic>
-      <p:cxnSp>
-        <p:nvCxnSpPr>
-          <p:cNvPr id="13" name="Straight Connector 12">
-            <a:extLst>
-              <a:ext uri="{FF2B5EF4-FFF2-40B4-BE49-F238E27FC236}">
-                <a16:creationId xmlns:a16="http://schemas.microsoft.com/office/drawing/2014/main" id="{2826D1D0-BBA6-21C2-A595-6578B092917B}"/>
-              </a:ext>
-            </a:extLst>
-          </p:cNvPr>
-          <p:cNvCxnSpPr>
-            <a:cxnSpLocks/>
-          </p:cNvCxnSpPr>
-          <p:nvPr/>
-        </p:nvCxnSpPr>
-        <p:spPr>
-          <a:xfrm>
-            <a:off x="7702982" y="1405574"/>
-            <a:ext cx="0" cy="296535"/>
-          </a:xfrm>
-          <a:prstGeom prst="line">
-            <a:avLst/>
-          </a:prstGeom>
-        </p:spPr>
-        <p:style>
-          <a:lnRef idx="2">
-            <a:schemeClr val="dk1"/>
-          </a:lnRef>
-          <a:fillRef idx="0">
-            <a:schemeClr val="dk1"/>
-          </a:fillRef>
-          <a:effectRef idx="1">
-            <a:schemeClr val="dk1"/>
-          </a:effectRef>
-          <a:fontRef idx="minor">
-            <a:schemeClr val="tx1"/>
-          </a:fontRef>
-        </p:style>
-      </p:cxnSp>
-      <p:pic>
-        <p:nvPicPr>
-          <p:cNvPr id="15" name="Graphic 14" descr="Dim (Smaller Sun) with solid fill">
-            <a:extLst>
-              <a:ext uri="{FF2B5EF4-FFF2-40B4-BE49-F238E27FC236}">
-                <a16:creationId xmlns:a16="http://schemas.microsoft.com/office/drawing/2014/main" id="{25CB26C9-2361-2B99-3842-7080309F5609}"/>
-              </a:ext>
-            </a:extLst>
-          </p:cNvPr>
-          <p:cNvPicPr>
-            <a:picLocks noChangeAspect="1"/>
-          </p:cNvPicPr>
-          <p:nvPr/>
-        </p:nvPicPr>
-        <p:blipFill>
-          <a:blip r:embed="rId5">
-            <a:extLst>
-              <a:ext uri="{96DAC541-7B7A-43D3-8B79-37D633B846F1}">
-                <asvg:svgBlip xmlns:asvg="http://schemas.microsoft.com/office/drawing/2016/SVG/main" r:embed="rId6"/>
-              </a:ext>
-            </a:extLst>
-          </a:blip>
-          <a:stretch>
-            <a:fillRect/>
-          </a:stretch>
-        </p:blipFill>
-        <p:spPr>
-          <a:xfrm>
-            <a:off x="5355826" y="1383755"/>
-            <a:ext cx="445728" cy="357176"/>
-          </a:xfrm>
-          <a:prstGeom prst="rect">
-            <a:avLst/>
-          </a:prstGeom>
-        </p:spPr>
-      </p:pic>
-      <p:pic>
-        <p:nvPicPr>
-          <p:cNvPr id="16" name="Graphic 15" descr="Moon with solid fill">
-            <a:extLst>
-              <a:ext uri="{FF2B5EF4-FFF2-40B4-BE49-F238E27FC236}">
-                <a16:creationId xmlns:a16="http://schemas.microsoft.com/office/drawing/2014/main" id="{1CF5ED38-48B1-97E6-6163-293297603AE3}"/>
-              </a:ext>
-            </a:extLst>
-          </p:cNvPr>
-          <p:cNvPicPr>
-            <a:picLocks noChangeAspect="1"/>
-          </p:cNvPicPr>
-          <p:nvPr/>
-        </p:nvPicPr>
-        <p:blipFill>
-          <a:blip r:embed="rId7">
-            <a:extLst>
-              <a:ext uri="{96DAC541-7B7A-43D3-8B79-37D633B846F1}">
-                <asvg:svgBlip xmlns:asvg="http://schemas.microsoft.com/office/drawing/2016/SVG/main" r:embed="rId8"/>
-              </a:ext>
-            </a:extLst>
-          </a:blip>
-          <a:stretch>
-            <a:fillRect/>
-          </a:stretch>
-        </p:blipFill>
-        <p:spPr>
-          <a:xfrm>
-            <a:off x="7945345" y="1403277"/>
-            <a:ext cx="296536" cy="296536"/>
-          </a:xfrm>
-          <a:prstGeom prst="rect">
-            <a:avLst/>
-          </a:prstGeom>
-        </p:spPr>
-      </p:pic>
-    </p:spTree>
-    <p:extLst>
-      <p:ext uri="{BB962C8B-B14F-4D97-AF65-F5344CB8AC3E}">
-        <p14:creationId xmlns:p14="http://schemas.microsoft.com/office/powerpoint/2010/main" val="1772071899"/>
-      </p:ext>
-    </p:extLst>
-  </p:cSld>
-  <p:clrMapOvr>
-    <a:masterClrMapping/>
-  </p:clrMapOvr>
-</p:sld>
-</file>
-
-<file path=ppt/slides/slide9.xml><?xml version="1.0" encoding="utf-8"?>
-<p:sld xmlns:a="http://schemas.openxmlformats.org/drawingml/2006/main" xmlns:r="http://schemas.openxmlformats.org/officeDocument/2006/relationships" xmlns:p="http://schemas.openxmlformats.org/presentationml/2006/main">
-  <p:cSld>
-    <p:spTree>
-      <p:nvGrpSpPr>
-        <p:cNvPr id="1" name=""/>
-        <p:cNvGrpSpPr/>
-        <p:nvPr/>
-      </p:nvGrpSpPr>
-      <p:grpSpPr>
-        <a:xfrm>
-          <a:off x="0" y="0"/>
-          <a:ext cx="0" cy="0"/>
-          <a:chOff x="0" y="0"/>
-          <a:chExt cx="0" cy="0"/>
-        </a:xfrm>
-      </p:grpSpPr>
-      <p:pic>
-        <p:nvPicPr>
-          <p:cNvPr id="4" name="Picture 3">
-            <a:extLst>
-              <a:ext uri="{FF2B5EF4-FFF2-40B4-BE49-F238E27FC236}">
-                <a16:creationId xmlns:a16="http://schemas.microsoft.com/office/drawing/2014/main" id="{3E29D6A6-D834-9BA7-1C59-79E2074C7C61}"/>
-              </a:ext>
-            </a:extLst>
-          </p:cNvPr>
-          <p:cNvPicPr>
-            <a:picLocks noChangeAspect="1"/>
-          </p:cNvPicPr>
-          <p:nvPr/>
-        </p:nvPicPr>
-        <p:blipFill>
-          <a:blip r:embed="rId2"/>
-          <a:srcRect t="8748" b="16505"/>
-          <a:stretch/>
-        </p:blipFill>
-        <p:spPr>
-          <a:xfrm>
-            <a:off x="661398" y="1658471"/>
-            <a:ext cx="9557816" cy="4491318"/>
-          </a:xfrm>
-          <a:prstGeom prst="rect">
-            <a:avLst/>
-          </a:prstGeom>
-        </p:spPr>
-      </p:pic>
-      <p:sp>
-        <p:nvSpPr>
-          <p:cNvPr id="2" name="Rectangle 1">
-            <a:extLst>
-              <a:ext uri="{FF2B5EF4-FFF2-40B4-BE49-F238E27FC236}">
-                <a16:creationId xmlns:a16="http://schemas.microsoft.com/office/drawing/2014/main" id="{C818E2F9-12CF-0794-521B-410EDBB7F9F6}"/>
-              </a:ext>
-            </a:extLst>
-          </p:cNvPr>
-          <p:cNvSpPr/>
-          <p:nvPr/>
-        </p:nvSpPr>
-        <p:spPr>
-          <a:xfrm flipH="1">
-            <a:off x="1684427" y="5853254"/>
-            <a:ext cx="6767635" cy="296535"/>
-          </a:xfrm>
-          <a:prstGeom prst="rect">
-            <a:avLst/>
-          </a:prstGeom>
-          <a:gradFill flip="none" rotWithShape="1">
-            <a:gsLst>
-              <a:gs pos="18000">
-                <a:srgbClr val="FF3A74">
-                  <a:alpha val="28235"/>
-                </a:srgbClr>
-              </a:gs>
-              <a:gs pos="96000">
-                <a:srgbClr val="150E22">
-                  <a:alpha val="78821"/>
-                </a:srgbClr>
-              </a:gs>
-              <a:gs pos="86000">
-                <a:srgbClr val="FFEAB5">
-                  <a:alpha val="57446"/>
-                </a:srgbClr>
-              </a:gs>
-              <a:gs pos="37000">
-                <a:srgbClr val="FFEAB5">
-                  <a:alpha val="46000"/>
-                </a:srgbClr>
-              </a:gs>
-            </a:gsLst>
-            <a:lin ang="10800000" scaled="1"/>
-            <a:tileRect/>
-          </a:gradFill>
-          <a:ln>
-            <a:noFill/>
-          </a:ln>
-        </p:spPr>
-        <p:style>
-          <a:lnRef idx="2">
-            <a:schemeClr val="accent1">
-              <a:shade val="15000"/>
-            </a:schemeClr>
-          </a:lnRef>
-          <a:fillRef idx="1">
-            <a:schemeClr val="accent1"/>
-          </a:fillRef>
-          <a:effectRef idx="0">
-            <a:schemeClr val="accent1"/>
-          </a:effectRef>
-          <a:fontRef idx="minor">
-            <a:schemeClr val="lt1"/>
-          </a:fontRef>
-        </p:style>
-        <p:txBody>
-          <a:bodyPr rtlCol="0" anchor="ctr"/>
-          <a:lstStyle/>
-          <a:p>
-            <a:pPr algn="ctr"/>
-            <a:endParaRPr lang="en-US" dirty="0"/>
-          </a:p>
-        </p:txBody>
-      </p:sp>
-      <p:cxnSp>
-        <p:nvCxnSpPr>
-          <p:cNvPr id="3" name="Straight Connector 2">
-            <a:extLst>
-              <a:ext uri="{FF2B5EF4-FFF2-40B4-BE49-F238E27FC236}">
-                <a16:creationId xmlns:a16="http://schemas.microsoft.com/office/drawing/2014/main" id="{69B6E18E-5BBA-CF0F-FAF7-C43177CAE4BE}"/>
-              </a:ext>
-            </a:extLst>
-          </p:cNvPr>
-          <p:cNvCxnSpPr>
-            <a:cxnSpLocks/>
-          </p:cNvCxnSpPr>
-          <p:nvPr/>
-        </p:nvCxnSpPr>
-        <p:spPr>
-          <a:xfrm>
-            <a:off x="3900126" y="5832295"/>
-            <a:ext cx="0" cy="296535"/>
-          </a:xfrm>
-          <a:prstGeom prst="line">
-            <a:avLst/>
-          </a:prstGeom>
-        </p:spPr>
-        <p:style>
-          <a:lnRef idx="2">
-            <a:schemeClr val="dk1"/>
-          </a:lnRef>
-          <a:fillRef idx="0">
-            <a:schemeClr val="dk1"/>
-          </a:fillRef>
-          <a:effectRef idx="1">
-            <a:schemeClr val="dk1"/>
-          </a:effectRef>
-          <a:fontRef idx="minor">
-            <a:schemeClr val="tx1"/>
-          </a:fontRef>
-        </p:style>
-      </p:cxnSp>
-      <p:cxnSp>
-        <p:nvCxnSpPr>
-          <p:cNvPr id="7" name="Straight Connector 6">
-            <a:extLst>
-              <a:ext uri="{FF2B5EF4-FFF2-40B4-BE49-F238E27FC236}">
-                <a16:creationId xmlns:a16="http://schemas.microsoft.com/office/drawing/2014/main" id="{678DA2FA-6DB3-BEC2-015C-8C38DF5CC658}"/>
-              </a:ext>
-            </a:extLst>
-          </p:cNvPr>
-          <p:cNvCxnSpPr>
-            <a:cxnSpLocks/>
-          </p:cNvCxnSpPr>
-          <p:nvPr/>
-        </p:nvCxnSpPr>
-        <p:spPr>
-          <a:xfrm>
-            <a:off x="7496766" y="5832294"/>
-            <a:ext cx="0" cy="296535"/>
-          </a:xfrm>
-          <a:prstGeom prst="line">
-            <a:avLst/>
-          </a:prstGeom>
-        </p:spPr>
-        <p:style>
-          <a:lnRef idx="2">
-            <a:schemeClr val="dk1"/>
-          </a:lnRef>
-          <a:fillRef idx="0">
-            <a:schemeClr val="dk1"/>
-          </a:fillRef>
-          <a:effectRef idx="1">
-            <a:schemeClr val="dk1"/>
-          </a:effectRef>
-          <a:fontRef idx="minor">
-            <a:schemeClr val="tx1"/>
-          </a:fontRef>
-        </p:style>
-      </p:cxnSp>
-      <p:pic>
-        <p:nvPicPr>
-          <p:cNvPr id="11" name="Graphic 10" descr="Sunset scene with solid fill">
-            <a:extLst>
-              <a:ext uri="{FF2B5EF4-FFF2-40B4-BE49-F238E27FC236}">
-                <a16:creationId xmlns:a16="http://schemas.microsoft.com/office/drawing/2014/main" id="{4DB22646-A6B7-6F73-E62F-FFDDCCB1A7F7}"/>
-              </a:ext>
-            </a:extLst>
-          </p:cNvPr>
-          <p:cNvPicPr>
-            <a:picLocks noChangeAspect="1"/>
-          </p:cNvPicPr>
-          <p:nvPr/>
-        </p:nvPicPr>
-        <p:blipFill>
-          <a:blip r:embed="rId3">
-            <a:extLst>
-              <a:ext uri="{96DAC541-7B7A-43D3-8B79-37D633B846F1}">
-                <asvg:svgBlip xmlns:asvg="http://schemas.microsoft.com/office/drawing/2016/SVG/main" r:embed="rId4"/>
-              </a:ext>
-            </a:extLst>
-          </a:blip>
-          <a:stretch>
-            <a:fillRect/>
-          </a:stretch>
-        </p:blipFill>
-        <p:spPr>
-          <a:xfrm>
-            <a:off x="2570645" y="6102019"/>
-            <a:ext cx="374186" cy="374186"/>
-          </a:xfrm>
-          <a:prstGeom prst="rect">
-            <a:avLst/>
-          </a:prstGeom>
-        </p:spPr>
-      </p:pic>
-      <p:pic>
-        <p:nvPicPr>
-          <p:cNvPr id="14" name="Graphic 13" descr="Dim (Smaller Sun) with solid fill">
-            <a:extLst>
-              <a:ext uri="{FF2B5EF4-FFF2-40B4-BE49-F238E27FC236}">
-                <a16:creationId xmlns:a16="http://schemas.microsoft.com/office/drawing/2014/main" id="{35FF74F9-B20D-3C3D-0F50-30602102C4C8}"/>
-              </a:ext>
-            </a:extLst>
-          </p:cNvPr>
-          <p:cNvPicPr>
-            <a:picLocks noChangeAspect="1"/>
-          </p:cNvPicPr>
-          <p:nvPr/>
-        </p:nvPicPr>
-        <p:blipFill>
-          <a:blip r:embed="rId5">
-            <a:extLst>
-              <a:ext uri="{96DAC541-7B7A-43D3-8B79-37D633B846F1}">
-                <asvg:svgBlip xmlns:asvg="http://schemas.microsoft.com/office/drawing/2016/SVG/main" r:embed="rId6"/>
-              </a:ext>
-            </a:extLst>
-          </a:blip>
-          <a:stretch>
-            <a:fillRect/>
-          </a:stretch>
-        </p:blipFill>
-        <p:spPr>
-          <a:xfrm>
-            <a:off x="5355826" y="6128829"/>
-            <a:ext cx="445728" cy="357176"/>
-          </a:xfrm>
-          <a:prstGeom prst="rect">
-            <a:avLst/>
-          </a:prstGeom>
-        </p:spPr>
-      </p:pic>
-      <p:pic>
-        <p:nvPicPr>
-          <p:cNvPr id="18" name="Graphic 17" descr="Moon with solid fill">
-            <a:extLst>
-              <a:ext uri="{FF2B5EF4-FFF2-40B4-BE49-F238E27FC236}">
-                <a16:creationId xmlns:a16="http://schemas.microsoft.com/office/drawing/2014/main" id="{B1B97E20-35E7-72A6-1139-8F7ABC0DCA7C}"/>
-              </a:ext>
-            </a:extLst>
-          </p:cNvPr>
-          <p:cNvPicPr>
-            <a:picLocks noChangeAspect="1"/>
-          </p:cNvPicPr>
-          <p:nvPr/>
-        </p:nvPicPr>
-        <p:blipFill>
-          <a:blip r:embed="rId7">
-            <a:extLst>
-              <a:ext uri="{96DAC541-7B7A-43D3-8B79-37D633B846F1}">
-                <asvg:svgBlip xmlns:asvg="http://schemas.microsoft.com/office/drawing/2016/SVG/main" r:embed="rId8"/>
-              </a:ext>
-            </a:extLst>
-          </a:blip>
-          <a:stretch>
-            <a:fillRect/>
-          </a:stretch>
-        </p:blipFill>
-        <p:spPr>
-          <a:xfrm>
-            <a:off x="7916013" y="6189469"/>
-            <a:ext cx="296536" cy="296536"/>
-          </a:xfrm>
-          <a:prstGeom prst="rect">
-            <a:avLst/>
-          </a:prstGeom>
-        </p:spPr>
-      </p:pic>
-    </p:spTree>
-    <p:extLst>
-      <p:ext uri="{BB962C8B-B14F-4D97-AF65-F5344CB8AC3E}">
-        <p14:creationId xmlns:p14="http://schemas.microsoft.com/office/powerpoint/2010/main" val="3169471280"/>
       </p:ext>
     </p:extLst>
   </p:cSld>

</xml_diff>